<commit_message>
Started planning on Gold Hunters
</commit_message>
<xml_diff>
--- a/docs/Architecture.pptx
+++ b/docs/Architecture.pptx
@@ -11,6 +11,7 @@
     <p:sldId id="259" r:id="rId5"/>
     <p:sldId id="260" r:id="rId6"/>
     <p:sldId id="261" r:id="rId7"/>
+    <p:sldId id="262" r:id="rId8"/>
   </p:sldIdLst>
   <p:sldSz cx="12192000" cy="6858000"/>
   <p:notesSz cx="6858000" cy="9144000"/>
@@ -264,7 +265,7 @@
           <a:p>
             <a:fld id="{6E923454-6E85-4B3A-B554-39B57C774163}" type="datetimeFigureOut">
               <a:rPr lang="en-US" smtClean="0"/>
-              <a:t>3/2/2020</a:t>
+              <a:t>6/24/2020</a:t>
             </a:fld>
             <a:endParaRPr lang="en-US"/>
           </a:p>
@@ -462,7 +463,7 @@
           <a:p>
             <a:fld id="{6E923454-6E85-4B3A-B554-39B57C774163}" type="datetimeFigureOut">
               <a:rPr lang="en-US" smtClean="0"/>
-              <a:t>3/2/2020</a:t>
+              <a:t>6/24/2020</a:t>
             </a:fld>
             <a:endParaRPr lang="en-US"/>
           </a:p>
@@ -670,7 +671,7 @@
           <a:p>
             <a:fld id="{6E923454-6E85-4B3A-B554-39B57C774163}" type="datetimeFigureOut">
               <a:rPr lang="en-US" smtClean="0"/>
-              <a:t>3/2/2020</a:t>
+              <a:t>6/24/2020</a:t>
             </a:fld>
             <a:endParaRPr lang="en-US"/>
           </a:p>
@@ -868,7 +869,7 @@
           <a:p>
             <a:fld id="{6E923454-6E85-4B3A-B554-39B57C774163}" type="datetimeFigureOut">
               <a:rPr lang="en-US" smtClean="0"/>
-              <a:t>3/2/2020</a:t>
+              <a:t>6/24/2020</a:t>
             </a:fld>
             <a:endParaRPr lang="en-US"/>
           </a:p>
@@ -1143,7 +1144,7 @@
           <a:p>
             <a:fld id="{6E923454-6E85-4B3A-B554-39B57C774163}" type="datetimeFigureOut">
               <a:rPr lang="en-US" smtClean="0"/>
-              <a:t>3/2/2020</a:t>
+              <a:t>6/24/2020</a:t>
             </a:fld>
             <a:endParaRPr lang="en-US"/>
           </a:p>
@@ -1408,7 +1409,7 @@
           <a:p>
             <a:fld id="{6E923454-6E85-4B3A-B554-39B57C774163}" type="datetimeFigureOut">
               <a:rPr lang="en-US" smtClean="0"/>
-              <a:t>3/2/2020</a:t>
+              <a:t>6/24/2020</a:t>
             </a:fld>
             <a:endParaRPr lang="en-US"/>
           </a:p>
@@ -1820,7 +1821,7 @@
           <a:p>
             <a:fld id="{6E923454-6E85-4B3A-B554-39B57C774163}" type="datetimeFigureOut">
               <a:rPr lang="en-US" smtClean="0"/>
-              <a:t>3/2/2020</a:t>
+              <a:t>6/24/2020</a:t>
             </a:fld>
             <a:endParaRPr lang="en-US"/>
           </a:p>
@@ -1961,7 +1962,7 @@
           <a:p>
             <a:fld id="{6E923454-6E85-4B3A-B554-39B57C774163}" type="datetimeFigureOut">
               <a:rPr lang="en-US" smtClean="0"/>
-              <a:t>3/2/2020</a:t>
+              <a:t>6/24/2020</a:t>
             </a:fld>
             <a:endParaRPr lang="en-US"/>
           </a:p>
@@ -2074,7 +2075,7 @@
           <a:p>
             <a:fld id="{6E923454-6E85-4B3A-B554-39B57C774163}" type="datetimeFigureOut">
               <a:rPr lang="en-US" smtClean="0"/>
-              <a:t>3/2/2020</a:t>
+              <a:t>6/24/2020</a:t>
             </a:fld>
             <a:endParaRPr lang="en-US"/>
           </a:p>
@@ -2385,7 +2386,7 @@
           <a:p>
             <a:fld id="{6E923454-6E85-4B3A-B554-39B57C774163}" type="datetimeFigureOut">
               <a:rPr lang="en-US" smtClean="0"/>
-              <a:t>3/2/2020</a:t>
+              <a:t>6/24/2020</a:t>
             </a:fld>
             <a:endParaRPr lang="en-US"/>
           </a:p>
@@ -2673,7 +2674,7 @@
           <a:p>
             <a:fld id="{6E923454-6E85-4B3A-B554-39B57C774163}" type="datetimeFigureOut">
               <a:rPr lang="en-US" smtClean="0"/>
-              <a:t>3/2/2020</a:t>
+              <a:t>6/24/2020</a:t>
             </a:fld>
             <a:endParaRPr lang="en-US"/>
           </a:p>
@@ -2914,7 +2915,7 @@
           <a:p>
             <a:fld id="{6E923454-6E85-4B3A-B554-39B57C774163}" type="datetimeFigureOut">
               <a:rPr lang="en-US" smtClean="0"/>
-              <a:t>3/2/2020</a:t>
+              <a:t>6/24/2020</a:t>
             </a:fld>
             <a:endParaRPr lang="en-US"/>
           </a:p>
@@ -3333,10 +3334,10 @@
       </p:grpSpPr>
       <p:sp>
         <p:nvSpPr>
-          <p:cNvPr id="9" name="Rectangle 8">
-            <a:extLst>
-              <a:ext uri="{FF2B5EF4-FFF2-40B4-BE49-F238E27FC236}">
-                <a16:creationId xmlns:a16="http://schemas.microsoft.com/office/drawing/2014/main" id="{107D9647-B007-46B6-93F4-F4168A851BCB}"/>
+          <p:cNvPr id="13" name="Rectangle 12">
+            <a:extLst>
+              <a:ext uri="{FF2B5EF4-FFF2-40B4-BE49-F238E27FC236}">
+                <a16:creationId xmlns:a16="http://schemas.microsoft.com/office/drawing/2014/main" id="{C08A72F9-D8F7-466E-9A6C-DF916FF9F9A8}"/>
               </a:ext>
             </a:extLst>
           </p:cNvPr>
@@ -3345,7 +3346,130 @@
         </p:nvSpPr>
         <p:spPr>
           <a:xfrm>
-            <a:off x="2426793" y="1403928"/>
+            <a:off x="3153713" y="1451295"/>
+            <a:ext cx="1184625" cy="514865"/>
+          </a:xfrm>
+          <a:prstGeom prst="rect">
+            <a:avLst/>
+          </a:prstGeom>
+          <a:solidFill>
+            <a:schemeClr val="accent6"/>
+          </a:solidFill>
+          <a:ln w="19050">
+            <a:noFill/>
+          </a:ln>
+        </p:spPr>
+        <p:style>
+          <a:lnRef idx="2">
+            <a:schemeClr val="accent1">
+              <a:shade val="50000"/>
+            </a:schemeClr>
+          </a:lnRef>
+          <a:fillRef idx="1">
+            <a:schemeClr val="accent1"/>
+          </a:fillRef>
+          <a:effectRef idx="0">
+            <a:schemeClr val="accent1"/>
+          </a:effectRef>
+          <a:fontRef idx="minor">
+            <a:schemeClr val="lt1"/>
+          </a:fontRef>
+        </p:style>
+        <p:txBody>
+          <a:bodyPr rtlCol="0" anchor="ctr"/>
+          <a:lstStyle/>
+          <a:p>
+            <a:pPr algn="ctr"/>
+            <a:r>
+              <a:rPr lang="en-US" sz="1600" dirty="0">
+                <a:solidFill>
+                  <a:schemeClr val="bg1"/>
+                </a:solidFill>
+                <a:latin typeface="Autumn Happiness" panose="03000600000000000000" pitchFamily="66" charset="0"/>
+              </a:rPr>
+              <a:t>Agent</a:t>
+            </a:r>
+          </a:p>
+        </p:txBody>
+      </p:sp>
+      <p:sp>
+        <p:nvSpPr>
+          <p:cNvPr id="14" name="Rectangle 13">
+            <a:extLst>
+              <a:ext uri="{FF2B5EF4-FFF2-40B4-BE49-F238E27FC236}">
+                <a16:creationId xmlns:a16="http://schemas.microsoft.com/office/drawing/2014/main" id="{FD8E6B76-57F5-425C-9F01-F9C5CB021754}"/>
+              </a:ext>
+            </a:extLst>
+          </p:cNvPr>
+          <p:cNvSpPr/>
+          <p:nvPr/>
+        </p:nvSpPr>
+        <p:spPr>
+          <a:xfrm>
+            <a:off x="7065695" y="1451295"/>
+            <a:ext cx="1184625" cy="514865"/>
+          </a:xfrm>
+          <a:prstGeom prst="rect">
+            <a:avLst/>
+          </a:prstGeom>
+          <a:noFill/>
+          <a:ln w="19050">
+            <a:solidFill>
+              <a:srgbClr val="00B0F0"/>
+            </a:solidFill>
+          </a:ln>
+        </p:spPr>
+        <p:style>
+          <a:lnRef idx="2">
+            <a:schemeClr val="accent1">
+              <a:shade val="50000"/>
+            </a:schemeClr>
+          </a:lnRef>
+          <a:fillRef idx="1">
+            <a:schemeClr val="accent1"/>
+          </a:fillRef>
+          <a:effectRef idx="0">
+            <a:schemeClr val="accent1"/>
+          </a:effectRef>
+          <a:fontRef idx="minor">
+            <a:schemeClr val="lt1"/>
+          </a:fontRef>
+        </p:style>
+        <p:txBody>
+          <a:bodyPr rtlCol="0" anchor="ctr"/>
+          <a:lstStyle/>
+          <a:p>
+            <a:pPr algn="ctr"/>
+            <a:r>
+              <a:rPr lang="en-US" sz="1600" dirty="0">
+                <a:solidFill>
+                  <a:schemeClr val="tx1">
+                    <a:lumMod val="65000"/>
+                    <a:lumOff val="35000"/>
+                  </a:schemeClr>
+                </a:solidFill>
+                <a:latin typeface="Autumn Happiness" panose="03000600000000000000" pitchFamily="66" charset="0"/>
+              </a:rPr>
+              <a:t>Trait</a:t>
+            </a:r>
+          </a:p>
+        </p:txBody>
+      </p:sp>
+      <p:sp>
+        <p:nvSpPr>
+          <p:cNvPr id="15" name="Rectangle 14">
+            <a:extLst>
+              <a:ext uri="{FF2B5EF4-FFF2-40B4-BE49-F238E27FC236}">
+                <a16:creationId xmlns:a16="http://schemas.microsoft.com/office/drawing/2014/main" id="{8ECB123E-ABCD-4C06-B2CA-A4A37824C726}"/>
+              </a:ext>
+            </a:extLst>
+          </p:cNvPr>
+          <p:cNvSpPr/>
+          <p:nvPr/>
+        </p:nvSpPr>
+        <p:spPr>
+          <a:xfrm>
+            <a:off x="7065695" y="2752562"/>
             <a:ext cx="1184625" cy="514865"/>
           </a:xfrm>
           <a:prstGeom prst="rect">
@@ -3390,447 +3514,6 @@
                 <a:latin typeface="Autumn Happiness" panose="03000600000000000000" pitchFamily="66" charset="0"/>
               </a:rPr>
               <a:t>Action</a:t>
-            </a:r>
-          </a:p>
-        </p:txBody>
-      </p:sp>
-      <p:sp>
-        <p:nvSpPr>
-          <p:cNvPr id="10" name="Rectangle 9">
-            <a:extLst>
-              <a:ext uri="{FF2B5EF4-FFF2-40B4-BE49-F238E27FC236}">
-                <a16:creationId xmlns:a16="http://schemas.microsoft.com/office/drawing/2014/main" id="{DFC49603-C9D9-44C6-80CD-03BA1EED7803}"/>
-              </a:ext>
-            </a:extLst>
-          </p:cNvPr>
-          <p:cNvSpPr/>
-          <p:nvPr/>
-        </p:nvSpPr>
-        <p:spPr>
-          <a:xfrm>
-            <a:off x="2579193" y="1556328"/>
-            <a:ext cx="1184625" cy="514865"/>
-          </a:xfrm>
-          <a:prstGeom prst="rect">
-            <a:avLst/>
-          </a:prstGeom>
-          <a:noFill/>
-          <a:ln w="19050">
-            <a:solidFill>
-              <a:srgbClr val="00B0F0"/>
-            </a:solidFill>
-          </a:ln>
-        </p:spPr>
-        <p:style>
-          <a:lnRef idx="2">
-            <a:schemeClr val="accent1">
-              <a:shade val="50000"/>
-            </a:schemeClr>
-          </a:lnRef>
-          <a:fillRef idx="1">
-            <a:schemeClr val="accent1"/>
-          </a:fillRef>
-          <a:effectRef idx="0">
-            <a:schemeClr val="accent1"/>
-          </a:effectRef>
-          <a:fontRef idx="minor">
-            <a:schemeClr val="lt1"/>
-          </a:fontRef>
-        </p:style>
-        <p:txBody>
-          <a:bodyPr rtlCol="0" anchor="ctr"/>
-          <a:lstStyle/>
-          <a:p>
-            <a:pPr algn="ctr"/>
-            <a:r>
-              <a:rPr lang="en-US" sz="1600" dirty="0">
-                <a:solidFill>
-                  <a:schemeClr val="tx1">
-                    <a:lumMod val="65000"/>
-                    <a:lumOff val="35000"/>
-                  </a:schemeClr>
-                </a:solidFill>
-                <a:latin typeface="Autumn Happiness" panose="03000600000000000000" pitchFamily="66" charset="0"/>
-              </a:rPr>
-              <a:t>Action</a:t>
-            </a:r>
-          </a:p>
-        </p:txBody>
-      </p:sp>
-      <p:sp>
-        <p:nvSpPr>
-          <p:cNvPr id="11" name="Rectangle 10">
-            <a:extLst>
-              <a:ext uri="{FF2B5EF4-FFF2-40B4-BE49-F238E27FC236}">
-                <a16:creationId xmlns:a16="http://schemas.microsoft.com/office/drawing/2014/main" id="{A0FF9902-F261-4798-BB05-FD7B8069D803}"/>
-              </a:ext>
-            </a:extLst>
-          </p:cNvPr>
-          <p:cNvSpPr/>
-          <p:nvPr/>
-        </p:nvSpPr>
-        <p:spPr>
-          <a:xfrm>
-            <a:off x="2731593" y="1708728"/>
-            <a:ext cx="1184625" cy="514865"/>
-          </a:xfrm>
-          <a:prstGeom prst="rect">
-            <a:avLst/>
-          </a:prstGeom>
-          <a:noFill/>
-          <a:ln w="19050">
-            <a:solidFill>
-              <a:srgbClr val="00B0F0"/>
-            </a:solidFill>
-          </a:ln>
-        </p:spPr>
-        <p:style>
-          <a:lnRef idx="2">
-            <a:schemeClr val="accent1">
-              <a:shade val="50000"/>
-            </a:schemeClr>
-          </a:lnRef>
-          <a:fillRef idx="1">
-            <a:schemeClr val="accent1"/>
-          </a:fillRef>
-          <a:effectRef idx="0">
-            <a:schemeClr val="accent1"/>
-          </a:effectRef>
-          <a:fontRef idx="minor">
-            <a:schemeClr val="lt1"/>
-          </a:fontRef>
-        </p:style>
-        <p:txBody>
-          <a:bodyPr rtlCol="0" anchor="ctr"/>
-          <a:lstStyle/>
-          <a:p>
-            <a:pPr algn="ctr"/>
-            <a:r>
-              <a:rPr lang="en-US" sz="1600" dirty="0">
-                <a:solidFill>
-                  <a:schemeClr val="tx1">
-                    <a:lumMod val="65000"/>
-                    <a:lumOff val="35000"/>
-                  </a:schemeClr>
-                </a:solidFill>
-                <a:latin typeface="Autumn Happiness" panose="03000600000000000000" pitchFamily="66" charset="0"/>
-              </a:rPr>
-              <a:t>Action</a:t>
-            </a:r>
-          </a:p>
-        </p:txBody>
-      </p:sp>
-      <p:sp>
-        <p:nvSpPr>
-          <p:cNvPr id="12" name="Rectangle 11">
-            <a:extLst>
-              <a:ext uri="{FF2B5EF4-FFF2-40B4-BE49-F238E27FC236}">
-                <a16:creationId xmlns:a16="http://schemas.microsoft.com/office/drawing/2014/main" id="{34DDC685-CE03-4843-A50F-67FD1CDEB9A8}"/>
-              </a:ext>
-            </a:extLst>
-          </p:cNvPr>
-          <p:cNvSpPr/>
-          <p:nvPr/>
-        </p:nvSpPr>
-        <p:spPr>
-          <a:xfrm>
-            <a:off x="2883993" y="1861128"/>
-            <a:ext cx="1184625" cy="514865"/>
-          </a:xfrm>
-          <a:prstGeom prst="rect">
-            <a:avLst/>
-          </a:prstGeom>
-          <a:noFill/>
-          <a:ln w="19050">
-            <a:solidFill>
-              <a:srgbClr val="00B0F0"/>
-            </a:solidFill>
-          </a:ln>
-        </p:spPr>
-        <p:style>
-          <a:lnRef idx="2">
-            <a:schemeClr val="accent1">
-              <a:shade val="50000"/>
-            </a:schemeClr>
-          </a:lnRef>
-          <a:fillRef idx="1">
-            <a:schemeClr val="accent1"/>
-          </a:fillRef>
-          <a:effectRef idx="0">
-            <a:schemeClr val="accent1"/>
-          </a:effectRef>
-          <a:fontRef idx="minor">
-            <a:schemeClr val="lt1"/>
-          </a:fontRef>
-        </p:style>
-        <p:txBody>
-          <a:bodyPr rtlCol="0" anchor="ctr"/>
-          <a:lstStyle/>
-          <a:p>
-            <a:pPr algn="ctr"/>
-            <a:r>
-              <a:rPr lang="en-US" sz="1600" dirty="0">
-                <a:solidFill>
-                  <a:schemeClr val="tx1">
-                    <a:lumMod val="65000"/>
-                    <a:lumOff val="35000"/>
-                  </a:schemeClr>
-                </a:solidFill>
-                <a:latin typeface="Autumn Happiness" panose="03000600000000000000" pitchFamily="66" charset="0"/>
-              </a:rPr>
-              <a:t>Action</a:t>
-            </a:r>
-          </a:p>
-        </p:txBody>
-      </p:sp>
-      <p:sp>
-        <p:nvSpPr>
-          <p:cNvPr id="13" name="Rectangle 12">
-            <a:extLst>
-              <a:ext uri="{FF2B5EF4-FFF2-40B4-BE49-F238E27FC236}">
-                <a16:creationId xmlns:a16="http://schemas.microsoft.com/office/drawing/2014/main" id="{C08A72F9-D8F7-466E-9A6C-DF916FF9F9A8}"/>
-              </a:ext>
-            </a:extLst>
-          </p:cNvPr>
-          <p:cNvSpPr/>
-          <p:nvPr/>
-        </p:nvSpPr>
-        <p:spPr>
-          <a:xfrm>
-            <a:off x="3036393" y="2013528"/>
-            <a:ext cx="1184625" cy="514865"/>
-          </a:xfrm>
-          <a:prstGeom prst="rect">
-            <a:avLst/>
-          </a:prstGeom>
-          <a:noFill/>
-          <a:ln w="19050">
-            <a:solidFill>
-              <a:srgbClr val="00B0F0"/>
-            </a:solidFill>
-          </a:ln>
-        </p:spPr>
-        <p:style>
-          <a:lnRef idx="2">
-            <a:schemeClr val="accent1">
-              <a:shade val="50000"/>
-            </a:schemeClr>
-          </a:lnRef>
-          <a:fillRef idx="1">
-            <a:schemeClr val="accent1"/>
-          </a:fillRef>
-          <a:effectRef idx="0">
-            <a:schemeClr val="accent1"/>
-          </a:effectRef>
-          <a:fontRef idx="minor">
-            <a:schemeClr val="lt1"/>
-          </a:fontRef>
-        </p:style>
-        <p:txBody>
-          <a:bodyPr rtlCol="0" anchor="ctr"/>
-          <a:lstStyle/>
-          <a:p>
-            <a:pPr algn="ctr"/>
-            <a:r>
-              <a:rPr lang="en-US" sz="1600" dirty="0">
-                <a:solidFill>
-                  <a:schemeClr val="tx1">
-                    <a:lumMod val="65000"/>
-                    <a:lumOff val="35000"/>
-                  </a:schemeClr>
-                </a:solidFill>
-                <a:latin typeface="Autumn Happiness" panose="03000600000000000000" pitchFamily="66" charset="0"/>
-              </a:rPr>
-              <a:t>Action</a:t>
-            </a:r>
-          </a:p>
-        </p:txBody>
-      </p:sp>
-      <p:sp>
-        <p:nvSpPr>
-          <p:cNvPr id="14" name="Rectangle 13">
-            <a:extLst>
-              <a:ext uri="{FF2B5EF4-FFF2-40B4-BE49-F238E27FC236}">
-                <a16:creationId xmlns:a16="http://schemas.microsoft.com/office/drawing/2014/main" id="{FD8E6B76-57F5-425C-9F01-F9C5CB021754}"/>
-              </a:ext>
-            </a:extLst>
-          </p:cNvPr>
-          <p:cNvSpPr/>
-          <p:nvPr/>
-        </p:nvSpPr>
-        <p:spPr>
-          <a:xfrm>
-            <a:off x="7065695" y="1451295"/>
-            <a:ext cx="1184625" cy="514865"/>
-          </a:xfrm>
-          <a:prstGeom prst="rect">
-            <a:avLst/>
-          </a:prstGeom>
-          <a:noFill/>
-          <a:ln w="19050">
-            <a:solidFill>
-              <a:srgbClr val="00B0F0"/>
-            </a:solidFill>
-          </a:ln>
-        </p:spPr>
-        <p:style>
-          <a:lnRef idx="2">
-            <a:schemeClr val="accent1">
-              <a:shade val="50000"/>
-            </a:schemeClr>
-          </a:lnRef>
-          <a:fillRef idx="1">
-            <a:schemeClr val="accent1"/>
-          </a:fillRef>
-          <a:effectRef idx="0">
-            <a:schemeClr val="accent1"/>
-          </a:effectRef>
-          <a:fontRef idx="minor">
-            <a:schemeClr val="lt1"/>
-          </a:fontRef>
-        </p:style>
-        <p:txBody>
-          <a:bodyPr rtlCol="0" anchor="ctr"/>
-          <a:lstStyle/>
-          <a:p>
-            <a:pPr algn="ctr"/>
-            <a:r>
-              <a:rPr lang="en-US" sz="1600" dirty="0">
-                <a:solidFill>
-                  <a:schemeClr val="tx1">
-                    <a:lumMod val="65000"/>
-                    <a:lumOff val="35000"/>
-                  </a:schemeClr>
-                </a:solidFill>
-                <a:latin typeface="Autumn Happiness" panose="03000600000000000000" pitchFamily="66" charset="0"/>
-              </a:rPr>
-              <a:t>Trait</a:t>
-            </a:r>
-          </a:p>
-        </p:txBody>
-      </p:sp>
-      <p:sp>
-        <p:nvSpPr>
-          <p:cNvPr id="15" name="Rectangle 14">
-            <a:extLst>
-              <a:ext uri="{FF2B5EF4-FFF2-40B4-BE49-F238E27FC236}">
-                <a16:creationId xmlns:a16="http://schemas.microsoft.com/office/drawing/2014/main" id="{8ECB123E-ABCD-4C06-B2CA-A4A37824C726}"/>
-              </a:ext>
-            </a:extLst>
-          </p:cNvPr>
-          <p:cNvSpPr/>
-          <p:nvPr/>
-        </p:nvSpPr>
-        <p:spPr>
-          <a:xfrm>
-            <a:off x="7065695" y="2752562"/>
-            <a:ext cx="1184625" cy="514865"/>
-          </a:xfrm>
-          <a:prstGeom prst="rect">
-            <a:avLst/>
-          </a:prstGeom>
-          <a:noFill/>
-          <a:ln w="19050">
-            <a:solidFill>
-              <a:srgbClr val="00B0F0"/>
-            </a:solidFill>
-          </a:ln>
-        </p:spPr>
-        <p:style>
-          <a:lnRef idx="2">
-            <a:schemeClr val="accent1">
-              <a:shade val="50000"/>
-            </a:schemeClr>
-          </a:lnRef>
-          <a:fillRef idx="1">
-            <a:schemeClr val="accent1"/>
-          </a:fillRef>
-          <a:effectRef idx="0">
-            <a:schemeClr val="accent1"/>
-          </a:effectRef>
-          <a:fontRef idx="minor">
-            <a:schemeClr val="lt1"/>
-          </a:fontRef>
-        </p:style>
-        <p:txBody>
-          <a:bodyPr rtlCol="0" anchor="ctr"/>
-          <a:lstStyle/>
-          <a:p>
-            <a:pPr algn="ctr"/>
-            <a:r>
-              <a:rPr lang="en-US" sz="1600" dirty="0">
-                <a:solidFill>
-                  <a:schemeClr val="tx1">
-                    <a:lumMod val="65000"/>
-                    <a:lumOff val="35000"/>
-                  </a:schemeClr>
-                </a:solidFill>
-                <a:latin typeface="Autumn Happiness" panose="03000600000000000000" pitchFamily="66" charset="0"/>
-              </a:rPr>
-              <a:t>Action</a:t>
-            </a:r>
-          </a:p>
-        </p:txBody>
-      </p:sp>
-      <p:sp>
-        <p:nvSpPr>
-          <p:cNvPr id="16" name="Rectangle 15">
-            <a:extLst>
-              <a:ext uri="{FF2B5EF4-FFF2-40B4-BE49-F238E27FC236}">
-                <a16:creationId xmlns:a16="http://schemas.microsoft.com/office/drawing/2014/main" id="{2B4947B4-C0DB-4982-B30F-BA91D6BA2943}"/>
-              </a:ext>
-            </a:extLst>
-          </p:cNvPr>
-          <p:cNvSpPr/>
-          <p:nvPr/>
-        </p:nvSpPr>
-        <p:spPr>
-          <a:xfrm>
-            <a:off x="6902873" y="4225762"/>
-            <a:ext cx="1510268" cy="514865"/>
-          </a:xfrm>
-          <a:prstGeom prst="rect">
-            <a:avLst/>
-          </a:prstGeom>
-          <a:noFill/>
-          <a:ln w="19050">
-            <a:solidFill>
-              <a:srgbClr val="00B0F0"/>
-            </a:solidFill>
-          </a:ln>
-        </p:spPr>
-        <p:style>
-          <a:lnRef idx="2">
-            <a:schemeClr val="accent1">
-              <a:shade val="50000"/>
-            </a:schemeClr>
-          </a:lnRef>
-          <a:fillRef idx="1">
-            <a:schemeClr val="accent1"/>
-          </a:fillRef>
-          <a:effectRef idx="0">
-            <a:schemeClr val="accent1"/>
-          </a:effectRef>
-          <a:fontRef idx="minor">
-            <a:schemeClr val="lt1"/>
-          </a:fontRef>
-        </p:style>
-        <p:txBody>
-          <a:bodyPr rtlCol="0" anchor="ctr"/>
-          <a:lstStyle/>
-          <a:p>
-            <a:pPr algn="ctr"/>
-            <a:r>
-              <a:rPr lang="en-US" sz="1600" dirty="0">
-                <a:solidFill>
-                  <a:schemeClr val="tx1">
-                    <a:lumMod val="65000"/>
-                    <a:lumOff val="35000"/>
-                  </a:schemeClr>
-                </a:solidFill>
-                <a:latin typeface="Autumn Happiness" panose="03000600000000000000" pitchFamily="66" charset="0"/>
-              </a:rPr>
-              <a:t>Power Action</a:t>
             </a:r>
           </a:p>
         </p:txBody>
@@ -3891,132 +3574,6 @@
       </p:sp>
       <p:sp>
         <p:nvSpPr>
-          <p:cNvPr id="18" name="Rectangle 17">
-            <a:extLst>
-              <a:ext uri="{FF2B5EF4-FFF2-40B4-BE49-F238E27FC236}">
-                <a16:creationId xmlns:a16="http://schemas.microsoft.com/office/drawing/2014/main" id="{27EE6253-7209-406D-B33F-FDBDBFF3EE8B}"/>
-              </a:ext>
-            </a:extLst>
-          </p:cNvPr>
-          <p:cNvSpPr/>
-          <p:nvPr/>
-        </p:nvSpPr>
-        <p:spPr>
-          <a:xfrm>
-            <a:off x="7808006" y="5271971"/>
-            <a:ext cx="1660267" cy="514865"/>
-          </a:xfrm>
-          <a:prstGeom prst="rect">
-            <a:avLst/>
-          </a:prstGeom>
-          <a:noFill/>
-          <a:ln w="19050">
-            <a:solidFill>
-              <a:srgbClr val="00B0F0"/>
-            </a:solidFill>
-          </a:ln>
-        </p:spPr>
-        <p:style>
-          <a:lnRef idx="2">
-            <a:schemeClr val="accent1">
-              <a:shade val="50000"/>
-            </a:schemeClr>
-          </a:lnRef>
-          <a:fillRef idx="1">
-            <a:schemeClr val="accent1"/>
-          </a:fillRef>
-          <a:effectRef idx="0">
-            <a:schemeClr val="accent1"/>
-          </a:effectRef>
-          <a:fontRef idx="minor">
-            <a:schemeClr val="lt1"/>
-          </a:fontRef>
-        </p:style>
-        <p:txBody>
-          <a:bodyPr rtlCol="0" anchor="ctr"/>
-          <a:lstStyle/>
-          <a:p>
-            <a:pPr algn="ctr"/>
-            <a:r>
-              <a:rPr lang="en-US" sz="1600" dirty="0">
-                <a:solidFill>
-                  <a:schemeClr val="tx1">
-                    <a:lumMod val="65000"/>
-                    <a:lumOff val="35000"/>
-                  </a:schemeClr>
-                </a:solidFill>
-                <a:latin typeface="Autumn Happiness" panose="03000600000000000000" pitchFamily="66" charset="0"/>
-              </a:rPr>
-              <a:t>Offensive Action</a:t>
-            </a:r>
-          </a:p>
-        </p:txBody>
-      </p:sp>
-      <p:sp>
-        <p:nvSpPr>
-          <p:cNvPr id="19" name="Rectangle 18">
-            <a:extLst>
-              <a:ext uri="{FF2B5EF4-FFF2-40B4-BE49-F238E27FC236}">
-                <a16:creationId xmlns:a16="http://schemas.microsoft.com/office/drawing/2014/main" id="{F45140E6-5252-424A-91C6-8C38DBDD0F54}"/>
-              </a:ext>
-            </a:extLst>
-          </p:cNvPr>
-          <p:cNvSpPr/>
-          <p:nvPr/>
-        </p:nvSpPr>
-        <p:spPr>
-          <a:xfrm>
-            <a:off x="5916825" y="5277586"/>
-            <a:ext cx="1660267" cy="514865"/>
-          </a:xfrm>
-          <a:prstGeom prst="rect">
-            <a:avLst/>
-          </a:prstGeom>
-          <a:noFill/>
-          <a:ln w="19050">
-            <a:solidFill>
-              <a:srgbClr val="00B0F0"/>
-            </a:solidFill>
-          </a:ln>
-        </p:spPr>
-        <p:style>
-          <a:lnRef idx="2">
-            <a:schemeClr val="accent1">
-              <a:shade val="50000"/>
-            </a:schemeClr>
-          </a:lnRef>
-          <a:fillRef idx="1">
-            <a:schemeClr val="accent1"/>
-          </a:fillRef>
-          <a:effectRef idx="0">
-            <a:schemeClr val="accent1"/>
-          </a:effectRef>
-          <a:fontRef idx="minor">
-            <a:schemeClr val="lt1"/>
-          </a:fontRef>
-        </p:style>
-        <p:txBody>
-          <a:bodyPr rtlCol="0" anchor="ctr"/>
-          <a:lstStyle/>
-          <a:p>
-            <a:pPr algn="ctr"/>
-            <a:r>
-              <a:rPr lang="en-US" sz="1600" dirty="0">
-                <a:solidFill>
-                  <a:schemeClr val="tx1">
-                    <a:lumMod val="65000"/>
-                    <a:lumOff val="35000"/>
-                  </a:schemeClr>
-                </a:solidFill>
-                <a:latin typeface="Autumn Happiness" panose="03000600000000000000" pitchFamily="66" charset="0"/>
-              </a:rPr>
-              <a:t>Defensive Action</a:t>
-            </a:r>
-          </a:p>
-        </p:txBody>
-      </p:sp>
-      <p:sp>
-        <p:nvSpPr>
           <p:cNvPr id="20" name="Diamond 19">
             <a:extLst>
               <a:ext uri="{FF2B5EF4-FFF2-40B4-BE49-F238E27FC236}">
@@ -4071,24 +3628,24 @@
       </p:sp>
       <p:cxnSp>
         <p:nvCxnSpPr>
-          <p:cNvPr id="22" name="Straight Arrow Connector 21">
-            <a:extLst>
-              <a:ext uri="{FF2B5EF4-FFF2-40B4-BE49-F238E27FC236}">
-                <a16:creationId xmlns:a16="http://schemas.microsoft.com/office/drawing/2014/main" id="{803A9A71-D529-4577-9EBC-814E0D665911}"/>
+          <p:cNvPr id="24" name="Straight Arrow Connector 23">
+            <a:extLst>
+              <a:ext uri="{FF2B5EF4-FFF2-40B4-BE49-F238E27FC236}">
+                <a16:creationId xmlns:a16="http://schemas.microsoft.com/office/drawing/2014/main" id="{BBC1BF4E-064A-4E6C-8AB9-417DF8497F95}"/>
               </a:ext>
             </a:extLst>
           </p:cNvPr>
           <p:cNvCxnSpPr>
             <a:cxnSpLocks/>
-            <a:stCxn id="16" idx="2"/>
-            <a:endCxn id="18" idx="0"/>
+            <a:stCxn id="17" idx="3"/>
+            <a:endCxn id="16" idx="0"/>
           </p:cNvCxnSpPr>
           <p:nvPr/>
         </p:nvCxnSpPr>
         <p:spPr>
           <a:xfrm>
-            <a:off x="7658007" y="4740627"/>
-            <a:ext cx="980133" cy="531344"/>
+            <a:off x="7658008" y="3807691"/>
+            <a:ext cx="1420428" cy="418071"/>
           </a:xfrm>
           <a:prstGeom prst="straightConnector1">
             <a:avLst/>
@@ -4120,22 +3677,24 @@
       </p:cxnSp>
       <p:cxnSp>
         <p:nvCxnSpPr>
-          <p:cNvPr id="24" name="Straight Arrow Connector 23">
-            <a:extLst>
-              <a:ext uri="{FF2B5EF4-FFF2-40B4-BE49-F238E27FC236}">
-                <a16:creationId xmlns:a16="http://schemas.microsoft.com/office/drawing/2014/main" id="{BBC1BF4E-064A-4E6C-8AB9-417DF8497F95}"/>
+          <p:cNvPr id="25" name="Straight Arrow Connector 24">
+            <a:extLst>
+              <a:ext uri="{FF2B5EF4-FFF2-40B4-BE49-F238E27FC236}">
+                <a16:creationId xmlns:a16="http://schemas.microsoft.com/office/drawing/2014/main" id="{F50D1924-FD4D-4B20-A116-590B6A7C2B8C}"/>
               </a:ext>
             </a:extLst>
           </p:cNvPr>
           <p:cNvCxnSpPr>
             <a:cxnSpLocks/>
+            <a:stCxn id="17" idx="3"/>
+            <a:endCxn id="23" idx="0"/>
           </p:cNvCxnSpPr>
           <p:nvPr/>
         </p:nvCxnSpPr>
         <p:spPr>
           <a:xfrm flipH="1">
-            <a:off x="7658007" y="3807691"/>
-            <a:ext cx="1" cy="418071"/>
+            <a:off x="5922741" y="3807691"/>
+            <a:ext cx="1735267" cy="418071"/>
           </a:xfrm>
           <a:prstGeom prst="straightConnector1">
             <a:avLst/>
@@ -4165,12 +3724,320 @@
           </a:fontRef>
         </p:style>
       </p:cxnSp>
+      <p:grpSp>
+        <p:nvGrpSpPr>
+          <p:cNvPr id="21" name="Group 20">
+            <a:extLst>
+              <a:ext uri="{FF2B5EF4-FFF2-40B4-BE49-F238E27FC236}">
+                <a16:creationId xmlns:a16="http://schemas.microsoft.com/office/drawing/2014/main" id="{9393E887-694F-4393-8012-B79138CF0C76}"/>
+              </a:ext>
+            </a:extLst>
+          </p:cNvPr>
+          <p:cNvGrpSpPr/>
+          <p:nvPr/>
+        </p:nvGrpSpPr>
+        <p:grpSpPr>
+          <a:xfrm>
+            <a:off x="7337254" y="4225762"/>
+            <a:ext cx="3551448" cy="1566689"/>
+            <a:chOff x="5916825" y="4225762"/>
+            <a:chExt cx="3551448" cy="1566689"/>
+          </a:xfrm>
+        </p:grpSpPr>
+        <p:sp>
+          <p:nvSpPr>
+            <p:cNvPr id="16" name="Rectangle 15">
+              <a:extLst>
+                <a:ext uri="{FF2B5EF4-FFF2-40B4-BE49-F238E27FC236}">
+                  <a16:creationId xmlns:a16="http://schemas.microsoft.com/office/drawing/2014/main" id="{2B4947B4-C0DB-4982-B30F-BA91D6BA2943}"/>
+                </a:ext>
+              </a:extLst>
+            </p:cNvPr>
+            <p:cNvSpPr/>
+            <p:nvPr/>
+          </p:nvSpPr>
+          <p:spPr>
+            <a:xfrm>
+              <a:off x="6902873" y="4225762"/>
+              <a:ext cx="1510268" cy="514865"/>
+            </a:xfrm>
+            <a:prstGeom prst="rect">
+              <a:avLst/>
+            </a:prstGeom>
+            <a:noFill/>
+            <a:ln w="19050">
+              <a:solidFill>
+                <a:srgbClr val="00B0F0"/>
+              </a:solidFill>
+            </a:ln>
+          </p:spPr>
+          <p:style>
+            <a:lnRef idx="2">
+              <a:schemeClr val="accent1">
+                <a:shade val="50000"/>
+              </a:schemeClr>
+            </a:lnRef>
+            <a:fillRef idx="1">
+              <a:schemeClr val="accent1"/>
+            </a:fillRef>
+            <a:effectRef idx="0">
+              <a:schemeClr val="accent1"/>
+            </a:effectRef>
+            <a:fontRef idx="minor">
+              <a:schemeClr val="lt1"/>
+            </a:fontRef>
+          </p:style>
+          <p:txBody>
+            <a:bodyPr rtlCol="0" anchor="ctr"/>
+            <a:lstStyle/>
+            <a:p>
+              <a:pPr algn="ctr"/>
+              <a:r>
+                <a:rPr lang="en-US" sz="1600" dirty="0">
+                  <a:solidFill>
+                    <a:schemeClr val="tx1">
+                      <a:lumMod val="65000"/>
+                      <a:lumOff val="35000"/>
+                    </a:schemeClr>
+                  </a:solidFill>
+                  <a:latin typeface="Autumn Happiness" panose="03000600000000000000" pitchFamily="66" charset="0"/>
+                </a:rPr>
+                <a:t>Power Action</a:t>
+              </a:r>
+            </a:p>
+          </p:txBody>
+        </p:sp>
+        <p:sp>
+          <p:nvSpPr>
+            <p:cNvPr id="18" name="Rectangle 17">
+              <a:extLst>
+                <a:ext uri="{FF2B5EF4-FFF2-40B4-BE49-F238E27FC236}">
+                  <a16:creationId xmlns:a16="http://schemas.microsoft.com/office/drawing/2014/main" id="{27EE6253-7209-406D-B33F-FDBDBFF3EE8B}"/>
+                </a:ext>
+              </a:extLst>
+            </p:cNvPr>
+            <p:cNvSpPr/>
+            <p:nvPr/>
+          </p:nvSpPr>
+          <p:spPr>
+            <a:xfrm>
+              <a:off x="7808006" y="5271971"/>
+              <a:ext cx="1660267" cy="514865"/>
+            </a:xfrm>
+            <a:prstGeom prst="rect">
+              <a:avLst/>
+            </a:prstGeom>
+            <a:noFill/>
+            <a:ln w="19050">
+              <a:solidFill>
+                <a:srgbClr val="00B0F0"/>
+              </a:solidFill>
+            </a:ln>
+          </p:spPr>
+          <p:style>
+            <a:lnRef idx="2">
+              <a:schemeClr val="accent1">
+                <a:shade val="50000"/>
+              </a:schemeClr>
+            </a:lnRef>
+            <a:fillRef idx="1">
+              <a:schemeClr val="accent1"/>
+            </a:fillRef>
+            <a:effectRef idx="0">
+              <a:schemeClr val="accent1"/>
+            </a:effectRef>
+            <a:fontRef idx="minor">
+              <a:schemeClr val="lt1"/>
+            </a:fontRef>
+          </p:style>
+          <p:txBody>
+            <a:bodyPr rtlCol="0" anchor="ctr"/>
+            <a:lstStyle/>
+            <a:p>
+              <a:pPr algn="ctr"/>
+              <a:r>
+                <a:rPr lang="en-US" sz="1600" dirty="0">
+                  <a:solidFill>
+                    <a:schemeClr val="tx1">
+                      <a:lumMod val="65000"/>
+                      <a:lumOff val="35000"/>
+                    </a:schemeClr>
+                  </a:solidFill>
+                  <a:latin typeface="Autumn Happiness" panose="03000600000000000000" pitchFamily="66" charset="0"/>
+                </a:rPr>
+                <a:t>Offensive Action</a:t>
+              </a:r>
+            </a:p>
+          </p:txBody>
+        </p:sp>
+        <p:sp>
+          <p:nvSpPr>
+            <p:cNvPr id="19" name="Rectangle 18">
+              <a:extLst>
+                <a:ext uri="{FF2B5EF4-FFF2-40B4-BE49-F238E27FC236}">
+                  <a16:creationId xmlns:a16="http://schemas.microsoft.com/office/drawing/2014/main" id="{F45140E6-5252-424A-91C6-8C38DBDD0F54}"/>
+                </a:ext>
+              </a:extLst>
+            </p:cNvPr>
+            <p:cNvSpPr/>
+            <p:nvPr/>
+          </p:nvSpPr>
+          <p:spPr>
+            <a:xfrm>
+              <a:off x="5916825" y="5277586"/>
+              <a:ext cx="1660267" cy="514865"/>
+            </a:xfrm>
+            <a:prstGeom prst="rect">
+              <a:avLst/>
+            </a:prstGeom>
+            <a:noFill/>
+            <a:ln w="19050">
+              <a:solidFill>
+                <a:srgbClr val="00B0F0"/>
+              </a:solidFill>
+            </a:ln>
+          </p:spPr>
+          <p:style>
+            <a:lnRef idx="2">
+              <a:schemeClr val="accent1">
+                <a:shade val="50000"/>
+              </a:schemeClr>
+            </a:lnRef>
+            <a:fillRef idx="1">
+              <a:schemeClr val="accent1"/>
+            </a:fillRef>
+            <a:effectRef idx="0">
+              <a:schemeClr val="accent1"/>
+            </a:effectRef>
+            <a:fontRef idx="minor">
+              <a:schemeClr val="lt1"/>
+            </a:fontRef>
+          </p:style>
+          <p:txBody>
+            <a:bodyPr rtlCol="0" anchor="ctr"/>
+            <a:lstStyle/>
+            <a:p>
+              <a:pPr algn="ctr"/>
+              <a:r>
+                <a:rPr lang="en-US" sz="1600" dirty="0">
+                  <a:solidFill>
+                    <a:schemeClr val="tx1">
+                      <a:lumMod val="65000"/>
+                      <a:lumOff val="35000"/>
+                    </a:schemeClr>
+                  </a:solidFill>
+                  <a:latin typeface="Autumn Happiness" panose="03000600000000000000" pitchFamily="66" charset="0"/>
+                </a:rPr>
+                <a:t>Defensive Action</a:t>
+              </a:r>
+            </a:p>
+          </p:txBody>
+        </p:sp>
+        <p:cxnSp>
+          <p:nvCxnSpPr>
+            <p:cNvPr id="22" name="Straight Arrow Connector 21">
+              <a:extLst>
+                <a:ext uri="{FF2B5EF4-FFF2-40B4-BE49-F238E27FC236}">
+                  <a16:creationId xmlns:a16="http://schemas.microsoft.com/office/drawing/2014/main" id="{803A9A71-D529-4577-9EBC-814E0D665911}"/>
+                </a:ext>
+              </a:extLst>
+            </p:cNvPr>
+            <p:cNvCxnSpPr>
+              <a:cxnSpLocks/>
+              <a:stCxn id="16" idx="2"/>
+              <a:endCxn id="18" idx="0"/>
+            </p:cNvCxnSpPr>
+            <p:nvPr/>
+          </p:nvCxnSpPr>
+          <p:spPr>
+            <a:xfrm>
+              <a:off x="7658007" y="4740627"/>
+              <a:ext cx="980133" cy="531344"/>
+            </a:xfrm>
+            <a:prstGeom prst="straightConnector1">
+              <a:avLst/>
+            </a:prstGeom>
+            <a:ln w="15875">
+              <a:solidFill>
+                <a:schemeClr val="tx1">
+                  <a:lumMod val="50000"/>
+                  <a:lumOff val="50000"/>
+                </a:schemeClr>
+              </a:solidFill>
+              <a:tailEnd type="triangle"/>
+            </a:ln>
+          </p:spPr>
+          <p:style>
+            <a:lnRef idx="1">
+              <a:schemeClr val="accent1"/>
+            </a:lnRef>
+            <a:fillRef idx="0">
+              <a:schemeClr val="accent1"/>
+            </a:fillRef>
+            <a:effectRef idx="0">
+              <a:schemeClr val="accent1"/>
+            </a:effectRef>
+            <a:fontRef idx="minor">
+              <a:schemeClr val="tx1"/>
+            </a:fontRef>
+          </p:style>
+        </p:cxnSp>
+        <p:cxnSp>
+          <p:nvCxnSpPr>
+            <p:cNvPr id="26" name="Straight Arrow Connector 25">
+              <a:extLst>
+                <a:ext uri="{FF2B5EF4-FFF2-40B4-BE49-F238E27FC236}">
+                  <a16:creationId xmlns:a16="http://schemas.microsoft.com/office/drawing/2014/main" id="{AF29DCC0-F2B6-4FBF-8A99-C3466B5C75B4}"/>
+                </a:ext>
+              </a:extLst>
+            </p:cNvPr>
+            <p:cNvCxnSpPr>
+              <a:cxnSpLocks/>
+              <a:stCxn id="16" idx="2"/>
+              <a:endCxn id="19" idx="0"/>
+            </p:cNvCxnSpPr>
+            <p:nvPr/>
+          </p:nvCxnSpPr>
+          <p:spPr>
+            <a:xfrm flipH="1">
+              <a:off x="6746959" y="4740627"/>
+              <a:ext cx="911048" cy="536959"/>
+            </a:xfrm>
+            <a:prstGeom prst="straightConnector1">
+              <a:avLst/>
+            </a:prstGeom>
+            <a:ln w="15875">
+              <a:solidFill>
+                <a:schemeClr val="tx1">
+                  <a:lumMod val="50000"/>
+                  <a:lumOff val="50000"/>
+                </a:schemeClr>
+              </a:solidFill>
+              <a:tailEnd type="triangle"/>
+            </a:ln>
+          </p:spPr>
+          <p:style>
+            <a:lnRef idx="1">
+              <a:schemeClr val="accent1"/>
+            </a:lnRef>
+            <a:fillRef idx="0">
+              <a:schemeClr val="accent1"/>
+            </a:fillRef>
+            <a:effectRef idx="0">
+              <a:schemeClr val="accent1"/>
+            </a:effectRef>
+            <a:fontRef idx="minor">
+              <a:schemeClr val="tx1"/>
+            </a:fontRef>
+          </p:style>
+        </p:cxnSp>
+      </p:grpSp>
       <p:cxnSp>
         <p:nvCxnSpPr>
-          <p:cNvPr id="25" name="Straight Arrow Connector 24">
-            <a:extLst>
-              <a:ext uri="{FF2B5EF4-FFF2-40B4-BE49-F238E27FC236}">
-                <a16:creationId xmlns:a16="http://schemas.microsoft.com/office/drawing/2014/main" id="{F50D1924-FD4D-4B20-A116-590B6A7C2B8C}"/>
+          <p:cNvPr id="27" name="Straight Arrow Connector 26">
+            <a:extLst>
+              <a:ext uri="{FF2B5EF4-FFF2-40B4-BE49-F238E27FC236}">
+                <a16:creationId xmlns:a16="http://schemas.microsoft.com/office/drawing/2014/main" id="{7347AA31-7770-4C3F-9310-DDB9BF6F0C32}"/>
               </a:ext>
             </a:extLst>
           </p:cNvPr>
@@ -4181,8 +4048,8 @@
         </p:nvCxnSpPr>
         <p:spPr>
           <a:xfrm>
-            <a:off x="10835255" y="1987003"/>
-            <a:ext cx="0" cy="504567"/>
+            <a:off x="7658007" y="2512698"/>
+            <a:ext cx="0" cy="239864"/>
           </a:xfrm>
           <a:prstGeom prst="straightConnector1">
             <a:avLst/>
@@ -4214,24 +4081,281 @@
       </p:cxnSp>
       <p:cxnSp>
         <p:nvCxnSpPr>
-          <p:cNvPr id="26" name="Straight Arrow Connector 25">
-            <a:extLst>
-              <a:ext uri="{FF2B5EF4-FFF2-40B4-BE49-F238E27FC236}">
-                <a16:creationId xmlns:a16="http://schemas.microsoft.com/office/drawing/2014/main" id="{AF29DCC0-F2B6-4FBF-8A99-C3466B5C75B4}"/>
+          <p:cNvPr id="33" name="Straight Connector 32">
+            <a:extLst>
+              <a:ext uri="{FF2B5EF4-FFF2-40B4-BE49-F238E27FC236}">
+                <a16:creationId xmlns:a16="http://schemas.microsoft.com/office/drawing/2014/main" id="{4C74F5AD-6552-46FC-9899-F04C85D75C99}"/>
               </a:ext>
             </a:extLst>
           </p:cNvPr>
           <p:cNvCxnSpPr>
             <a:cxnSpLocks/>
-            <a:stCxn id="16" idx="2"/>
-            <a:endCxn id="19" idx="0"/>
+            <a:stCxn id="13" idx="3"/>
+            <a:endCxn id="28" idx="1"/>
           </p:cNvCxnSpPr>
           <p:nvPr/>
         </p:nvCxnSpPr>
         <p:spPr>
-          <a:xfrm flipH="1">
-            <a:off x="6746959" y="4740627"/>
-            <a:ext cx="911048" cy="536959"/>
+          <a:xfrm flipV="1">
+            <a:off x="4338338" y="1708207"/>
+            <a:ext cx="1101224" cy="521"/>
+          </a:xfrm>
+          <a:prstGeom prst="line">
+            <a:avLst/>
+          </a:prstGeom>
+          <a:ln w="15875">
+            <a:solidFill>
+              <a:schemeClr val="tx1">
+                <a:lumMod val="50000"/>
+                <a:lumOff val="50000"/>
+              </a:schemeClr>
+            </a:solidFill>
+          </a:ln>
+        </p:spPr>
+        <p:style>
+          <a:lnRef idx="1">
+            <a:schemeClr val="accent1"/>
+          </a:lnRef>
+          <a:fillRef idx="0">
+            <a:schemeClr val="accent1"/>
+          </a:fillRef>
+          <a:effectRef idx="0">
+            <a:schemeClr val="accent1"/>
+          </a:effectRef>
+          <a:fontRef idx="minor">
+            <a:schemeClr val="tx1"/>
+          </a:fontRef>
+        </p:style>
+      </p:cxnSp>
+      <p:cxnSp>
+        <p:nvCxnSpPr>
+          <p:cNvPr id="34" name="Straight Connector 33">
+            <a:extLst>
+              <a:ext uri="{FF2B5EF4-FFF2-40B4-BE49-F238E27FC236}">
+                <a16:creationId xmlns:a16="http://schemas.microsoft.com/office/drawing/2014/main" id="{B0805414-4E73-4BDD-9888-B6F1EC0C1BFF}"/>
+              </a:ext>
+            </a:extLst>
+          </p:cNvPr>
+          <p:cNvCxnSpPr>
+            <a:cxnSpLocks/>
+          </p:cNvCxnSpPr>
+          <p:nvPr/>
+        </p:nvCxnSpPr>
+        <p:spPr>
+          <a:xfrm>
+            <a:off x="7658007" y="3267427"/>
+            <a:ext cx="0" cy="281646"/>
+          </a:xfrm>
+          <a:prstGeom prst="line">
+            <a:avLst/>
+          </a:prstGeom>
+          <a:ln w="15875">
+            <a:solidFill>
+              <a:schemeClr val="tx1">
+                <a:lumMod val="50000"/>
+                <a:lumOff val="50000"/>
+              </a:schemeClr>
+            </a:solidFill>
+          </a:ln>
+        </p:spPr>
+        <p:style>
+          <a:lnRef idx="1">
+            <a:schemeClr val="accent1"/>
+          </a:lnRef>
+          <a:fillRef idx="0">
+            <a:schemeClr val="accent1"/>
+          </a:fillRef>
+          <a:effectRef idx="0">
+            <a:schemeClr val="accent1"/>
+          </a:effectRef>
+          <a:fontRef idx="minor">
+            <a:schemeClr val="tx1"/>
+          </a:fontRef>
+        </p:style>
+      </p:cxnSp>
+      <p:cxnSp>
+        <p:nvCxnSpPr>
+          <p:cNvPr id="35" name="Straight Connector 34">
+            <a:extLst>
+              <a:ext uri="{FF2B5EF4-FFF2-40B4-BE49-F238E27FC236}">
+                <a16:creationId xmlns:a16="http://schemas.microsoft.com/office/drawing/2014/main" id="{2149297C-C38F-4F67-992F-8E027D565559}"/>
+              </a:ext>
+            </a:extLst>
+          </p:cNvPr>
+          <p:cNvCxnSpPr>
+            <a:cxnSpLocks/>
+          </p:cNvCxnSpPr>
+          <p:nvPr/>
+        </p:nvCxnSpPr>
+        <p:spPr>
+          <a:xfrm>
+            <a:off x="7658007" y="1966160"/>
+            <a:ext cx="0" cy="273127"/>
+          </a:xfrm>
+          <a:prstGeom prst="line">
+            <a:avLst/>
+          </a:prstGeom>
+          <a:ln w="15875">
+            <a:solidFill>
+              <a:schemeClr val="tx1">
+                <a:lumMod val="50000"/>
+                <a:lumOff val="50000"/>
+              </a:schemeClr>
+            </a:solidFill>
+          </a:ln>
+        </p:spPr>
+        <p:style>
+          <a:lnRef idx="1">
+            <a:schemeClr val="accent1"/>
+          </a:lnRef>
+          <a:fillRef idx="0">
+            <a:schemeClr val="accent1"/>
+          </a:fillRef>
+          <a:effectRef idx="0">
+            <a:schemeClr val="accent1"/>
+          </a:effectRef>
+          <a:fontRef idx="minor">
+            <a:schemeClr val="tx1"/>
+          </a:fontRef>
+        </p:style>
+      </p:cxnSp>
+      <p:sp>
+        <p:nvSpPr>
+          <p:cNvPr id="23" name="Rectangle 22">
+            <a:extLst>
+              <a:ext uri="{FF2B5EF4-FFF2-40B4-BE49-F238E27FC236}">
+                <a16:creationId xmlns:a16="http://schemas.microsoft.com/office/drawing/2014/main" id="{958CF612-82CE-49D6-9DE3-5C5DAF937575}"/>
+              </a:ext>
+            </a:extLst>
+          </p:cNvPr>
+          <p:cNvSpPr/>
+          <p:nvPr/>
+        </p:nvSpPr>
+        <p:spPr>
+          <a:xfrm>
+            <a:off x="5167607" y="4225762"/>
+            <a:ext cx="1510268" cy="514865"/>
+          </a:xfrm>
+          <a:prstGeom prst="rect">
+            <a:avLst/>
+          </a:prstGeom>
+          <a:noFill/>
+          <a:ln w="19050">
+            <a:solidFill>
+              <a:srgbClr val="00B0F0"/>
+            </a:solidFill>
+          </a:ln>
+        </p:spPr>
+        <p:style>
+          <a:lnRef idx="2">
+            <a:schemeClr val="accent1">
+              <a:shade val="50000"/>
+            </a:schemeClr>
+          </a:lnRef>
+          <a:fillRef idx="1">
+            <a:schemeClr val="accent1"/>
+          </a:fillRef>
+          <a:effectRef idx="0">
+            <a:schemeClr val="accent1"/>
+          </a:effectRef>
+          <a:fontRef idx="minor">
+            <a:schemeClr val="lt1"/>
+          </a:fontRef>
+        </p:style>
+        <p:txBody>
+          <a:bodyPr rtlCol="0" anchor="ctr"/>
+          <a:lstStyle/>
+          <a:p>
+            <a:pPr algn="ctr"/>
+            <a:r>
+              <a:rPr lang="en-US" sz="1600" dirty="0">
+                <a:solidFill>
+                  <a:schemeClr val="tx1">
+                    <a:lumMod val="65000"/>
+                    <a:lumOff val="35000"/>
+                  </a:schemeClr>
+                </a:solidFill>
+                <a:latin typeface="Autumn Happiness" panose="03000600000000000000" pitchFamily="66" charset="0"/>
+              </a:rPr>
+              <a:t>Move Action</a:t>
+            </a:r>
+          </a:p>
+        </p:txBody>
+      </p:sp>
+      <p:sp>
+        <p:nvSpPr>
+          <p:cNvPr id="28" name="Diamond 27">
+            <a:extLst>
+              <a:ext uri="{FF2B5EF4-FFF2-40B4-BE49-F238E27FC236}">
+                <a16:creationId xmlns:a16="http://schemas.microsoft.com/office/drawing/2014/main" id="{97118753-5AC3-4DDA-9D05-63ABB3A3869D}"/>
+              </a:ext>
+            </a:extLst>
+          </p:cNvPr>
+          <p:cNvSpPr/>
+          <p:nvPr/>
+        </p:nvSpPr>
+        <p:spPr>
+          <a:xfrm>
+            <a:off x="5439562" y="1571501"/>
+            <a:ext cx="273411" cy="273411"/>
+          </a:xfrm>
+          <a:prstGeom prst="diamond">
+            <a:avLst/>
+          </a:prstGeom>
+          <a:solidFill>
+            <a:srgbClr val="00B0F0"/>
+          </a:solidFill>
+          <a:ln>
+            <a:solidFill>
+              <a:srgbClr val="00B0F0"/>
+            </a:solidFill>
+          </a:ln>
+        </p:spPr>
+        <p:style>
+          <a:lnRef idx="2">
+            <a:schemeClr val="accent1">
+              <a:shade val="50000"/>
+            </a:schemeClr>
+          </a:lnRef>
+          <a:fillRef idx="1">
+            <a:schemeClr val="accent1"/>
+          </a:fillRef>
+          <a:effectRef idx="0">
+            <a:schemeClr val="accent1"/>
+          </a:effectRef>
+          <a:fontRef idx="minor">
+            <a:schemeClr val="lt1"/>
+          </a:fontRef>
+        </p:style>
+        <p:txBody>
+          <a:bodyPr rtlCol="0" anchor="ctr"/>
+          <a:lstStyle/>
+          <a:p>
+            <a:pPr algn="ctr"/>
+            <a:endParaRPr lang="en-US"/>
+          </a:p>
+        </p:txBody>
+      </p:sp>
+      <p:cxnSp>
+        <p:nvCxnSpPr>
+          <p:cNvPr id="30" name="Straight Arrow Connector 29">
+            <a:extLst>
+              <a:ext uri="{FF2B5EF4-FFF2-40B4-BE49-F238E27FC236}">
+                <a16:creationId xmlns:a16="http://schemas.microsoft.com/office/drawing/2014/main" id="{4B080922-2229-49F5-A799-CDFAAA60F3BA}"/>
+              </a:ext>
+            </a:extLst>
+          </p:cNvPr>
+          <p:cNvCxnSpPr>
+            <a:cxnSpLocks/>
+            <a:stCxn id="28" idx="3"/>
+            <a:endCxn id="14" idx="1"/>
+          </p:cNvCxnSpPr>
+          <p:nvPr/>
+        </p:nvCxnSpPr>
+        <p:spPr>
+          <a:xfrm>
+            <a:off x="5712973" y="1708207"/>
+            <a:ext cx="1352722" cy="521"/>
           </a:xfrm>
           <a:prstGeom prst="straightConnector1">
             <a:avLst/>
@@ -4244,233 +4368,6 @@
               </a:schemeClr>
             </a:solidFill>
             <a:tailEnd type="triangle"/>
-          </a:ln>
-        </p:spPr>
-        <p:style>
-          <a:lnRef idx="1">
-            <a:schemeClr val="accent1"/>
-          </a:lnRef>
-          <a:fillRef idx="0">
-            <a:schemeClr val="accent1"/>
-          </a:fillRef>
-          <a:effectRef idx="0">
-            <a:schemeClr val="accent1"/>
-          </a:effectRef>
-          <a:fontRef idx="minor">
-            <a:schemeClr val="tx1"/>
-          </a:fontRef>
-        </p:style>
-      </p:cxnSp>
-      <p:cxnSp>
-        <p:nvCxnSpPr>
-          <p:cNvPr id="27" name="Straight Arrow Connector 26">
-            <a:extLst>
-              <a:ext uri="{FF2B5EF4-FFF2-40B4-BE49-F238E27FC236}">
-                <a16:creationId xmlns:a16="http://schemas.microsoft.com/office/drawing/2014/main" id="{7347AA31-7770-4C3F-9310-DDB9BF6F0C32}"/>
-              </a:ext>
-            </a:extLst>
-          </p:cNvPr>
-          <p:cNvCxnSpPr>
-            <a:cxnSpLocks/>
-          </p:cNvCxnSpPr>
-          <p:nvPr/>
-        </p:nvCxnSpPr>
-        <p:spPr>
-          <a:xfrm>
-            <a:off x="7658007" y="2512698"/>
-            <a:ext cx="0" cy="239864"/>
-          </a:xfrm>
-          <a:prstGeom prst="straightConnector1">
-            <a:avLst/>
-          </a:prstGeom>
-          <a:ln w="15875">
-            <a:solidFill>
-              <a:schemeClr val="tx1">
-                <a:lumMod val="50000"/>
-                <a:lumOff val="50000"/>
-              </a:schemeClr>
-            </a:solidFill>
-            <a:tailEnd type="triangle"/>
-          </a:ln>
-        </p:spPr>
-        <p:style>
-          <a:lnRef idx="1">
-            <a:schemeClr val="accent1"/>
-          </a:lnRef>
-          <a:fillRef idx="0">
-            <a:schemeClr val="accent1"/>
-          </a:fillRef>
-          <a:effectRef idx="0">
-            <a:schemeClr val="accent1"/>
-          </a:effectRef>
-          <a:fontRef idx="minor">
-            <a:schemeClr val="tx1"/>
-          </a:fontRef>
-        </p:style>
-      </p:cxnSp>
-      <p:cxnSp>
-        <p:nvCxnSpPr>
-          <p:cNvPr id="32" name="Straight Connector 31">
-            <a:extLst>
-              <a:ext uri="{FF2B5EF4-FFF2-40B4-BE49-F238E27FC236}">
-                <a16:creationId xmlns:a16="http://schemas.microsoft.com/office/drawing/2014/main" id="{7C034870-E146-4CDA-9D53-1C3C56E98C86}"/>
-              </a:ext>
-            </a:extLst>
-          </p:cNvPr>
-          <p:cNvCxnSpPr/>
-          <p:nvPr/>
-        </p:nvCxnSpPr>
-        <p:spPr>
-          <a:xfrm>
-            <a:off x="5898730" y="1451295"/>
-            <a:ext cx="0" cy="522916"/>
-          </a:xfrm>
-          <a:prstGeom prst="line">
-            <a:avLst/>
-          </a:prstGeom>
-          <a:ln w="15875">
-            <a:solidFill>
-              <a:schemeClr val="tx1">
-                <a:lumMod val="50000"/>
-                <a:lumOff val="50000"/>
-              </a:schemeClr>
-            </a:solidFill>
-          </a:ln>
-        </p:spPr>
-        <p:style>
-          <a:lnRef idx="1">
-            <a:schemeClr val="accent1"/>
-          </a:lnRef>
-          <a:fillRef idx="0">
-            <a:schemeClr val="accent1"/>
-          </a:fillRef>
-          <a:effectRef idx="0">
-            <a:schemeClr val="accent1"/>
-          </a:effectRef>
-          <a:fontRef idx="minor">
-            <a:schemeClr val="tx1"/>
-          </a:fontRef>
-        </p:style>
-      </p:cxnSp>
-      <p:cxnSp>
-        <p:nvCxnSpPr>
-          <p:cNvPr id="33" name="Straight Connector 32">
-            <a:extLst>
-              <a:ext uri="{FF2B5EF4-FFF2-40B4-BE49-F238E27FC236}">
-                <a16:creationId xmlns:a16="http://schemas.microsoft.com/office/drawing/2014/main" id="{4C74F5AD-6552-46FC-9899-F04C85D75C99}"/>
-              </a:ext>
-            </a:extLst>
-          </p:cNvPr>
-          <p:cNvCxnSpPr/>
-          <p:nvPr/>
-        </p:nvCxnSpPr>
-        <p:spPr>
-          <a:xfrm>
-            <a:off x="6051130" y="1603695"/>
-            <a:ext cx="0" cy="522916"/>
-          </a:xfrm>
-          <a:prstGeom prst="line">
-            <a:avLst/>
-          </a:prstGeom>
-          <a:ln w="15875">
-            <a:solidFill>
-              <a:schemeClr val="tx1">
-                <a:lumMod val="50000"/>
-                <a:lumOff val="50000"/>
-              </a:schemeClr>
-            </a:solidFill>
-          </a:ln>
-        </p:spPr>
-        <p:style>
-          <a:lnRef idx="1">
-            <a:schemeClr val="accent1"/>
-          </a:lnRef>
-          <a:fillRef idx="0">
-            <a:schemeClr val="accent1"/>
-          </a:fillRef>
-          <a:effectRef idx="0">
-            <a:schemeClr val="accent1"/>
-          </a:effectRef>
-          <a:fontRef idx="minor">
-            <a:schemeClr val="tx1"/>
-          </a:fontRef>
-        </p:style>
-      </p:cxnSp>
-      <p:cxnSp>
-        <p:nvCxnSpPr>
-          <p:cNvPr id="34" name="Straight Connector 33">
-            <a:extLst>
-              <a:ext uri="{FF2B5EF4-FFF2-40B4-BE49-F238E27FC236}">
-                <a16:creationId xmlns:a16="http://schemas.microsoft.com/office/drawing/2014/main" id="{B0805414-4E73-4BDD-9888-B6F1EC0C1BFF}"/>
-              </a:ext>
-            </a:extLst>
-          </p:cNvPr>
-          <p:cNvCxnSpPr>
-            <a:cxnSpLocks/>
-          </p:cNvCxnSpPr>
-          <p:nvPr/>
-        </p:nvCxnSpPr>
-        <p:spPr>
-          <a:xfrm>
-            <a:off x="7658007" y="3267427"/>
-            <a:ext cx="0" cy="281646"/>
-          </a:xfrm>
-          <a:prstGeom prst="line">
-            <a:avLst/>
-          </a:prstGeom>
-          <a:ln w="15875">
-            <a:solidFill>
-              <a:schemeClr val="tx1">
-                <a:lumMod val="50000"/>
-                <a:lumOff val="50000"/>
-              </a:schemeClr>
-            </a:solidFill>
-          </a:ln>
-        </p:spPr>
-        <p:style>
-          <a:lnRef idx="1">
-            <a:schemeClr val="accent1"/>
-          </a:lnRef>
-          <a:fillRef idx="0">
-            <a:schemeClr val="accent1"/>
-          </a:fillRef>
-          <a:effectRef idx="0">
-            <a:schemeClr val="accent1"/>
-          </a:effectRef>
-          <a:fontRef idx="minor">
-            <a:schemeClr val="tx1"/>
-          </a:fontRef>
-        </p:style>
-      </p:cxnSp>
-      <p:cxnSp>
-        <p:nvCxnSpPr>
-          <p:cNvPr id="35" name="Straight Connector 34">
-            <a:extLst>
-              <a:ext uri="{FF2B5EF4-FFF2-40B4-BE49-F238E27FC236}">
-                <a16:creationId xmlns:a16="http://schemas.microsoft.com/office/drawing/2014/main" id="{2149297C-C38F-4F67-992F-8E027D565559}"/>
-              </a:ext>
-            </a:extLst>
-          </p:cNvPr>
-          <p:cNvCxnSpPr>
-            <a:cxnSpLocks/>
-          </p:cNvCxnSpPr>
-          <p:nvPr/>
-        </p:nvCxnSpPr>
-        <p:spPr>
-          <a:xfrm>
-            <a:off x="7658007" y="1966160"/>
-            <a:ext cx="0" cy="273127"/>
-          </a:xfrm>
-          <a:prstGeom prst="line">
-            <a:avLst/>
-          </a:prstGeom>
-          <a:ln w="15875">
-            <a:solidFill>
-              <a:schemeClr val="tx1">
-                <a:lumMod val="50000"/>
-                <a:lumOff val="50000"/>
-              </a:schemeClr>
-            </a:solidFill>
           </a:ln>
         </p:spPr>
         <p:style>
@@ -7285,6 +7182,1693 @@
 </p:sld>
 </file>
 
+<file path=ppt/slides/slide7.xml><?xml version="1.0" encoding="utf-8"?>
+<p:sld xmlns:a="http://schemas.openxmlformats.org/drawingml/2006/main" xmlns:r="http://schemas.openxmlformats.org/officeDocument/2006/relationships" xmlns:p="http://schemas.openxmlformats.org/presentationml/2006/main">
+  <p:cSld>
+    <p:spTree>
+      <p:nvGrpSpPr>
+        <p:cNvPr id="1" name=""/>
+        <p:cNvGrpSpPr/>
+        <p:nvPr/>
+      </p:nvGrpSpPr>
+      <p:grpSpPr>
+        <a:xfrm>
+          <a:off x="0" y="0"/>
+          <a:ext cx="0" cy="0"/>
+          <a:chOff x="0" y="0"/>
+          <a:chExt cx="0" cy="0"/>
+        </a:xfrm>
+      </p:grpSpPr>
+      <p:graphicFrame>
+        <p:nvGraphicFramePr>
+          <p:cNvPr id="4" name="Table 4">
+            <a:extLst>
+              <a:ext uri="{FF2B5EF4-FFF2-40B4-BE49-F238E27FC236}">
+                <a16:creationId xmlns:a16="http://schemas.microsoft.com/office/drawing/2014/main" id="{ECD6114C-848F-4429-B966-2C70AFDC855B}"/>
+              </a:ext>
+            </a:extLst>
+          </p:cNvPr>
+          <p:cNvGraphicFramePr>
+            <a:graphicFrameLocks noGrp="1"/>
+          </p:cNvGraphicFramePr>
+          <p:nvPr>
+            <p:extLst>
+              <p:ext uri="{D42A27DB-BD31-4B8C-83A1-F6EECF244321}">
+                <p14:modId xmlns:p14="http://schemas.microsoft.com/office/powerpoint/2010/main" val="3039135554"/>
+              </p:ext>
+            </p:extLst>
+          </p:nvPr>
+        </p:nvGraphicFramePr>
+        <p:xfrm>
+          <a:off x="2032000" y="719664"/>
+          <a:ext cx="5158916" cy="5033064"/>
+        </p:xfrm>
+        <a:graphic>
+          <a:graphicData uri="http://schemas.openxmlformats.org/drawingml/2006/table">
+            <a:tbl>
+              <a:tblPr firstRow="1" bandRow="1">
+                <a:tableStyleId>{8799B23B-EC83-4686-B30A-512413B5E67A}</a:tableStyleId>
+              </a:tblPr>
+              <a:tblGrid>
+                <a:gridCol w="736988">
+                  <a:extLst>
+                    <a:ext uri="{9D8B030D-6E8A-4147-A177-3AD203B41FA5}">
+                      <a16:colId xmlns:a16="http://schemas.microsoft.com/office/drawing/2014/main" val="1341759314"/>
+                    </a:ext>
+                  </a:extLst>
+                </a:gridCol>
+                <a:gridCol w="736988">
+                  <a:extLst>
+                    <a:ext uri="{9D8B030D-6E8A-4147-A177-3AD203B41FA5}">
+                      <a16:colId xmlns:a16="http://schemas.microsoft.com/office/drawing/2014/main" val="2603281598"/>
+                    </a:ext>
+                  </a:extLst>
+                </a:gridCol>
+                <a:gridCol w="736988">
+                  <a:extLst>
+                    <a:ext uri="{9D8B030D-6E8A-4147-A177-3AD203B41FA5}">
+                      <a16:colId xmlns:a16="http://schemas.microsoft.com/office/drawing/2014/main" val="3166620574"/>
+                    </a:ext>
+                  </a:extLst>
+                </a:gridCol>
+                <a:gridCol w="736988">
+                  <a:extLst>
+                    <a:ext uri="{9D8B030D-6E8A-4147-A177-3AD203B41FA5}">
+                      <a16:colId xmlns:a16="http://schemas.microsoft.com/office/drawing/2014/main" val="3756706871"/>
+                    </a:ext>
+                  </a:extLst>
+                </a:gridCol>
+                <a:gridCol w="736988">
+                  <a:extLst>
+                    <a:ext uri="{9D8B030D-6E8A-4147-A177-3AD203B41FA5}">
+                      <a16:colId xmlns:a16="http://schemas.microsoft.com/office/drawing/2014/main" val="540176328"/>
+                    </a:ext>
+                  </a:extLst>
+                </a:gridCol>
+                <a:gridCol w="736988">
+                  <a:extLst>
+                    <a:ext uri="{9D8B030D-6E8A-4147-A177-3AD203B41FA5}">
+                      <a16:colId xmlns:a16="http://schemas.microsoft.com/office/drawing/2014/main" val="2930165247"/>
+                    </a:ext>
+                  </a:extLst>
+                </a:gridCol>
+                <a:gridCol w="736988">
+                  <a:extLst>
+                    <a:ext uri="{9D8B030D-6E8A-4147-A177-3AD203B41FA5}">
+                      <a16:colId xmlns:a16="http://schemas.microsoft.com/office/drawing/2014/main" val="4031564219"/>
+                    </a:ext>
+                  </a:extLst>
+                </a:gridCol>
+              </a:tblGrid>
+              <a:tr h="629133">
+                <a:tc>
+                  <a:txBody>
+                    <a:bodyPr/>
+                    <a:lstStyle/>
+                    <a:p>
+                      <a:endParaRPr lang="en-US"/>
+                    </a:p>
+                  </a:txBody>
+                  <a:tcPr/>
+                </a:tc>
+                <a:tc>
+                  <a:txBody>
+                    <a:bodyPr/>
+                    <a:lstStyle/>
+                    <a:p>
+                      <a:endParaRPr lang="en-US"/>
+                    </a:p>
+                  </a:txBody>
+                  <a:tcPr/>
+                </a:tc>
+                <a:tc>
+                  <a:txBody>
+                    <a:bodyPr/>
+                    <a:lstStyle/>
+                    <a:p>
+                      <a:endParaRPr lang="en-US"/>
+                    </a:p>
+                  </a:txBody>
+                  <a:tcPr/>
+                </a:tc>
+                <a:tc>
+                  <a:txBody>
+                    <a:bodyPr/>
+                    <a:lstStyle/>
+                    <a:p>
+                      <a:endParaRPr lang="en-US"/>
+                    </a:p>
+                  </a:txBody>
+                  <a:tcPr/>
+                </a:tc>
+                <a:tc>
+                  <a:txBody>
+                    <a:bodyPr/>
+                    <a:lstStyle/>
+                    <a:p>
+                      <a:endParaRPr lang="en-US"/>
+                    </a:p>
+                  </a:txBody>
+                  <a:tcPr/>
+                </a:tc>
+                <a:tc>
+                  <a:txBody>
+                    <a:bodyPr/>
+                    <a:lstStyle/>
+                    <a:p>
+                      <a:endParaRPr lang="en-US"/>
+                    </a:p>
+                  </a:txBody>
+                  <a:tcPr/>
+                </a:tc>
+                <a:tc>
+                  <a:txBody>
+                    <a:bodyPr/>
+                    <a:lstStyle/>
+                    <a:p>
+                      <a:endParaRPr lang="en-US"/>
+                    </a:p>
+                  </a:txBody>
+                  <a:tcPr/>
+                </a:tc>
+                <a:extLst>
+                  <a:ext uri="{0D108BD9-81ED-4DB2-BD59-A6C34878D82A}">
+                    <a16:rowId xmlns:a16="http://schemas.microsoft.com/office/drawing/2014/main" val="3076864120"/>
+                  </a:ext>
+                </a:extLst>
+              </a:tr>
+              <a:tr h="629133">
+                <a:tc>
+                  <a:txBody>
+                    <a:bodyPr/>
+                    <a:lstStyle/>
+                    <a:p>
+                      <a:endParaRPr lang="en-US" dirty="0"/>
+                    </a:p>
+                  </a:txBody>
+                  <a:tcPr/>
+                </a:tc>
+                <a:tc>
+                  <a:txBody>
+                    <a:bodyPr/>
+                    <a:lstStyle/>
+                    <a:p>
+                      <a:endParaRPr lang="en-US"/>
+                    </a:p>
+                  </a:txBody>
+                  <a:tcPr/>
+                </a:tc>
+                <a:tc>
+                  <a:txBody>
+                    <a:bodyPr/>
+                    <a:lstStyle/>
+                    <a:p>
+                      <a:endParaRPr lang="en-US"/>
+                    </a:p>
+                  </a:txBody>
+                  <a:tcPr/>
+                </a:tc>
+                <a:tc>
+                  <a:txBody>
+                    <a:bodyPr/>
+                    <a:lstStyle/>
+                    <a:p>
+                      <a:endParaRPr lang="en-US"/>
+                    </a:p>
+                  </a:txBody>
+                  <a:tcPr/>
+                </a:tc>
+                <a:tc>
+                  <a:txBody>
+                    <a:bodyPr/>
+                    <a:lstStyle/>
+                    <a:p>
+                      <a:endParaRPr lang="en-US"/>
+                    </a:p>
+                  </a:txBody>
+                  <a:tcPr/>
+                </a:tc>
+                <a:tc>
+                  <a:txBody>
+                    <a:bodyPr/>
+                    <a:lstStyle/>
+                    <a:p>
+                      <a:endParaRPr lang="en-US"/>
+                    </a:p>
+                  </a:txBody>
+                  <a:tcPr/>
+                </a:tc>
+                <a:tc>
+                  <a:txBody>
+                    <a:bodyPr/>
+                    <a:lstStyle/>
+                    <a:p>
+                      <a:endParaRPr lang="en-US"/>
+                    </a:p>
+                  </a:txBody>
+                  <a:tcPr/>
+                </a:tc>
+                <a:extLst>
+                  <a:ext uri="{0D108BD9-81ED-4DB2-BD59-A6C34878D82A}">
+                    <a16:rowId xmlns:a16="http://schemas.microsoft.com/office/drawing/2014/main" val="3805616097"/>
+                  </a:ext>
+                </a:extLst>
+              </a:tr>
+              <a:tr h="629133">
+                <a:tc>
+                  <a:txBody>
+                    <a:bodyPr/>
+                    <a:lstStyle/>
+                    <a:p>
+                      <a:endParaRPr lang="en-US"/>
+                    </a:p>
+                  </a:txBody>
+                  <a:tcPr/>
+                </a:tc>
+                <a:tc>
+                  <a:txBody>
+                    <a:bodyPr/>
+                    <a:lstStyle/>
+                    <a:p>
+                      <a:endParaRPr lang="en-US"/>
+                    </a:p>
+                  </a:txBody>
+                  <a:tcPr/>
+                </a:tc>
+                <a:tc>
+                  <a:txBody>
+                    <a:bodyPr/>
+                    <a:lstStyle/>
+                    <a:p>
+                      <a:endParaRPr lang="en-US"/>
+                    </a:p>
+                  </a:txBody>
+                  <a:tcPr/>
+                </a:tc>
+                <a:tc>
+                  <a:txBody>
+                    <a:bodyPr/>
+                    <a:lstStyle/>
+                    <a:p>
+                      <a:endParaRPr lang="en-US"/>
+                    </a:p>
+                  </a:txBody>
+                  <a:tcPr/>
+                </a:tc>
+                <a:tc>
+                  <a:txBody>
+                    <a:bodyPr/>
+                    <a:lstStyle/>
+                    <a:p>
+                      <a:endParaRPr lang="en-US"/>
+                    </a:p>
+                  </a:txBody>
+                  <a:tcPr/>
+                </a:tc>
+                <a:tc>
+                  <a:txBody>
+                    <a:bodyPr/>
+                    <a:lstStyle/>
+                    <a:p>
+                      <a:endParaRPr lang="en-US"/>
+                    </a:p>
+                  </a:txBody>
+                  <a:tcPr/>
+                </a:tc>
+                <a:tc>
+                  <a:txBody>
+                    <a:bodyPr/>
+                    <a:lstStyle/>
+                    <a:p>
+                      <a:endParaRPr lang="en-US"/>
+                    </a:p>
+                  </a:txBody>
+                  <a:tcPr/>
+                </a:tc>
+                <a:extLst>
+                  <a:ext uri="{0D108BD9-81ED-4DB2-BD59-A6C34878D82A}">
+                    <a16:rowId xmlns:a16="http://schemas.microsoft.com/office/drawing/2014/main" val="27235849"/>
+                  </a:ext>
+                </a:extLst>
+              </a:tr>
+              <a:tr h="629133">
+                <a:tc>
+                  <a:txBody>
+                    <a:bodyPr/>
+                    <a:lstStyle/>
+                    <a:p>
+                      <a:endParaRPr lang="en-US"/>
+                    </a:p>
+                  </a:txBody>
+                  <a:tcPr/>
+                </a:tc>
+                <a:tc>
+                  <a:txBody>
+                    <a:bodyPr/>
+                    <a:lstStyle/>
+                    <a:p>
+                      <a:endParaRPr lang="en-US"/>
+                    </a:p>
+                  </a:txBody>
+                  <a:tcPr/>
+                </a:tc>
+                <a:tc>
+                  <a:txBody>
+                    <a:bodyPr/>
+                    <a:lstStyle/>
+                    <a:p>
+                      <a:endParaRPr lang="en-US"/>
+                    </a:p>
+                  </a:txBody>
+                  <a:tcPr/>
+                </a:tc>
+                <a:tc>
+                  <a:txBody>
+                    <a:bodyPr/>
+                    <a:lstStyle/>
+                    <a:p>
+                      <a:endParaRPr lang="en-US"/>
+                    </a:p>
+                  </a:txBody>
+                  <a:tcPr/>
+                </a:tc>
+                <a:tc>
+                  <a:txBody>
+                    <a:bodyPr/>
+                    <a:lstStyle/>
+                    <a:p>
+                      <a:endParaRPr lang="en-US"/>
+                    </a:p>
+                  </a:txBody>
+                  <a:tcPr/>
+                </a:tc>
+                <a:tc>
+                  <a:txBody>
+                    <a:bodyPr/>
+                    <a:lstStyle/>
+                    <a:p>
+                      <a:endParaRPr lang="en-US"/>
+                    </a:p>
+                  </a:txBody>
+                  <a:tcPr/>
+                </a:tc>
+                <a:tc>
+                  <a:txBody>
+                    <a:bodyPr/>
+                    <a:lstStyle/>
+                    <a:p>
+                      <a:endParaRPr lang="en-US"/>
+                    </a:p>
+                  </a:txBody>
+                  <a:tcPr/>
+                </a:tc>
+                <a:extLst>
+                  <a:ext uri="{0D108BD9-81ED-4DB2-BD59-A6C34878D82A}">
+                    <a16:rowId xmlns:a16="http://schemas.microsoft.com/office/drawing/2014/main" val="3712690486"/>
+                  </a:ext>
+                </a:extLst>
+              </a:tr>
+              <a:tr h="629133">
+                <a:tc>
+                  <a:txBody>
+                    <a:bodyPr/>
+                    <a:lstStyle/>
+                    <a:p>
+                      <a:endParaRPr lang="en-US"/>
+                    </a:p>
+                  </a:txBody>
+                  <a:tcPr/>
+                </a:tc>
+                <a:tc>
+                  <a:txBody>
+                    <a:bodyPr/>
+                    <a:lstStyle/>
+                    <a:p>
+                      <a:endParaRPr lang="en-US"/>
+                    </a:p>
+                  </a:txBody>
+                  <a:tcPr/>
+                </a:tc>
+                <a:tc>
+                  <a:txBody>
+                    <a:bodyPr/>
+                    <a:lstStyle/>
+                    <a:p>
+                      <a:endParaRPr lang="en-US"/>
+                    </a:p>
+                  </a:txBody>
+                  <a:tcPr/>
+                </a:tc>
+                <a:tc>
+                  <a:txBody>
+                    <a:bodyPr/>
+                    <a:lstStyle/>
+                    <a:p>
+                      <a:endParaRPr lang="en-US"/>
+                    </a:p>
+                  </a:txBody>
+                  <a:tcPr/>
+                </a:tc>
+                <a:tc>
+                  <a:txBody>
+                    <a:bodyPr/>
+                    <a:lstStyle/>
+                    <a:p>
+                      <a:endParaRPr lang="en-US"/>
+                    </a:p>
+                  </a:txBody>
+                  <a:tcPr/>
+                </a:tc>
+                <a:tc>
+                  <a:txBody>
+                    <a:bodyPr/>
+                    <a:lstStyle/>
+                    <a:p>
+                      <a:endParaRPr lang="en-US"/>
+                    </a:p>
+                  </a:txBody>
+                  <a:tcPr/>
+                </a:tc>
+                <a:tc>
+                  <a:txBody>
+                    <a:bodyPr/>
+                    <a:lstStyle/>
+                    <a:p>
+                      <a:endParaRPr lang="en-US"/>
+                    </a:p>
+                  </a:txBody>
+                  <a:tcPr/>
+                </a:tc>
+                <a:extLst>
+                  <a:ext uri="{0D108BD9-81ED-4DB2-BD59-A6C34878D82A}">
+                    <a16:rowId xmlns:a16="http://schemas.microsoft.com/office/drawing/2014/main" val="957283354"/>
+                  </a:ext>
+                </a:extLst>
+              </a:tr>
+              <a:tr h="629133">
+                <a:tc>
+                  <a:txBody>
+                    <a:bodyPr/>
+                    <a:lstStyle/>
+                    <a:p>
+                      <a:endParaRPr lang="en-US"/>
+                    </a:p>
+                  </a:txBody>
+                  <a:tcPr/>
+                </a:tc>
+                <a:tc>
+                  <a:txBody>
+                    <a:bodyPr/>
+                    <a:lstStyle/>
+                    <a:p>
+                      <a:endParaRPr lang="en-US"/>
+                    </a:p>
+                  </a:txBody>
+                  <a:tcPr/>
+                </a:tc>
+                <a:tc>
+                  <a:txBody>
+                    <a:bodyPr/>
+                    <a:lstStyle/>
+                    <a:p>
+                      <a:endParaRPr lang="en-US"/>
+                    </a:p>
+                  </a:txBody>
+                  <a:tcPr/>
+                </a:tc>
+                <a:tc>
+                  <a:txBody>
+                    <a:bodyPr/>
+                    <a:lstStyle/>
+                    <a:p>
+                      <a:endParaRPr lang="en-US"/>
+                    </a:p>
+                  </a:txBody>
+                  <a:tcPr/>
+                </a:tc>
+                <a:tc>
+                  <a:txBody>
+                    <a:bodyPr/>
+                    <a:lstStyle/>
+                    <a:p>
+                      <a:endParaRPr lang="en-US"/>
+                    </a:p>
+                  </a:txBody>
+                  <a:tcPr/>
+                </a:tc>
+                <a:tc>
+                  <a:txBody>
+                    <a:bodyPr/>
+                    <a:lstStyle/>
+                    <a:p>
+                      <a:endParaRPr lang="en-US"/>
+                    </a:p>
+                  </a:txBody>
+                  <a:tcPr/>
+                </a:tc>
+                <a:tc>
+                  <a:txBody>
+                    <a:bodyPr/>
+                    <a:lstStyle/>
+                    <a:p>
+                      <a:endParaRPr lang="en-US"/>
+                    </a:p>
+                  </a:txBody>
+                  <a:tcPr/>
+                </a:tc>
+                <a:extLst>
+                  <a:ext uri="{0D108BD9-81ED-4DB2-BD59-A6C34878D82A}">
+                    <a16:rowId xmlns:a16="http://schemas.microsoft.com/office/drawing/2014/main" val="4070635010"/>
+                  </a:ext>
+                </a:extLst>
+              </a:tr>
+              <a:tr h="629133">
+                <a:tc>
+                  <a:txBody>
+                    <a:bodyPr/>
+                    <a:lstStyle/>
+                    <a:p>
+                      <a:endParaRPr lang="en-US"/>
+                    </a:p>
+                  </a:txBody>
+                  <a:tcPr/>
+                </a:tc>
+                <a:tc>
+                  <a:txBody>
+                    <a:bodyPr/>
+                    <a:lstStyle/>
+                    <a:p>
+                      <a:endParaRPr lang="en-US"/>
+                    </a:p>
+                  </a:txBody>
+                  <a:tcPr/>
+                </a:tc>
+                <a:tc>
+                  <a:txBody>
+                    <a:bodyPr/>
+                    <a:lstStyle/>
+                    <a:p>
+                      <a:endParaRPr lang="en-US" dirty="0"/>
+                    </a:p>
+                  </a:txBody>
+                  <a:tcPr/>
+                </a:tc>
+                <a:tc>
+                  <a:txBody>
+                    <a:bodyPr/>
+                    <a:lstStyle/>
+                    <a:p>
+                      <a:endParaRPr lang="en-US" dirty="0"/>
+                    </a:p>
+                  </a:txBody>
+                  <a:tcPr/>
+                </a:tc>
+                <a:tc>
+                  <a:txBody>
+                    <a:bodyPr/>
+                    <a:lstStyle/>
+                    <a:p>
+                      <a:endParaRPr lang="en-US"/>
+                    </a:p>
+                  </a:txBody>
+                  <a:tcPr/>
+                </a:tc>
+                <a:tc>
+                  <a:txBody>
+                    <a:bodyPr/>
+                    <a:lstStyle/>
+                    <a:p>
+                      <a:endParaRPr lang="en-US"/>
+                    </a:p>
+                  </a:txBody>
+                  <a:tcPr/>
+                </a:tc>
+                <a:tc>
+                  <a:txBody>
+                    <a:bodyPr/>
+                    <a:lstStyle/>
+                    <a:p>
+                      <a:endParaRPr lang="en-US"/>
+                    </a:p>
+                  </a:txBody>
+                  <a:tcPr/>
+                </a:tc>
+                <a:extLst>
+                  <a:ext uri="{0D108BD9-81ED-4DB2-BD59-A6C34878D82A}">
+                    <a16:rowId xmlns:a16="http://schemas.microsoft.com/office/drawing/2014/main" val="3555388192"/>
+                  </a:ext>
+                </a:extLst>
+              </a:tr>
+              <a:tr h="629133">
+                <a:tc>
+                  <a:txBody>
+                    <a:bodyPr/>
+                    <a:lstStyle/>
+                    <a:p>
+                      <a:endParaRPr lang="en-US"/>
+                    </a:p>
+                  </a:txBody>
+                  <a:tcPr/>
+                </a:tc>
+                <a:tc>
+                  <a:txBody>
+                    <a:bodyPr/>
+                    <a:lstStyle/>
+                    <a:p>
+                      <a:endParaRPr lang="en-US"/>
+                    </a:p>
+                  </a:txBody>
+                  <a:tcPr/>
+                </a:tc>
+                <a:tc>
+                  <a:txBody>
+                    <a:bodyPr/>
+                    <a:lstStyle/>
+                    <a:p>
+                      <a:endParaRPr lang="en-US"/>
+                    </a:p>
+                  </a:txBody>
+                  <a:tcPr/>
+                </a:tc>
+                <a:tc>
+                  <a:txBody>
+                    <a:bodyPr/>
+                    <a:lstStyle/>
+                    <a:p>
+                      <a:endParaRPr lang="en-US"/>
+                    </a:p>
+                  </a:txBody>
+                  <a:tcPr/>
+                </a:tc>
+                <a:tc>
+                  <a:txBody>
+                    <a:bodyPr/>
+                    <a:lstStyle/>
+                    <a:p>
+                      <a:endParaRPr lang="en-US"/>
+                    </a:p>
+                  </a:txBody>
+                  <a:tcPr/>
+                </a:tc>
+                <a:tc>
+                  <a:txBody>
+                    <a:bodyPr/>
+                    <a:lstStyle/>
+                    <a:p>
+                      <a:endParaRPr lang="en-US"/>
+                    </a:p>
+                  </a:txBody>
+                  <a:tcPr/>
+                </a:tc>
+                <a:tc>
+                  <a:txBody>
+                    <a:bodyPr/>
+                    <a:lstStyle/>
+                    <a:p>
+                      <a:endParaRPr lang="en-US" dirty="0"/>
+                    </a:p>
+                  </a:txBody>
+                  <a:tcPr/>
+                </a:tc>
+                <a:extLst>
+                  <a:ext uri="{0D108BD9-81ED-4DB2-BD59-A6C34878D82A}">
+                    <a16:rowId xmlns:a16="http://schemas.microsoft.com/office/drawing/2014/main" val="1261802608"/>
+                  </a:ext>
+                </a:extLst>
+              </a:tr>
+            </a:tbl>
+          </a:graphicData>
+        </a:graphic>
+      </p:graphicFrame>
+      <p:pic>
+        <p:nvPicPr>
+          <p:cNvPr id="7" name="Graphic 6" descr="Gold bars">
+            <a:extLst>
+              <a:ext uri="{FF2B5EF4-FFF2-40B4-BE49-F238E27FC236}">
+                <a16:creationId xmlns:a16="http://schemas.microsoft.com/office/drawing/2014/main" id="{0BB5A287-5DE3-4DB1-AAA5-7536DA872E5E}"/>
+              </a:ext>
+            </a:extLst>
+          </p:cNvPr>
+          <p:cNvPicPr>
+            <a:picLocks noChangeAspect="1"/>
+          </p:cNvPicPr>
+          <p:nvPr/>
+        </p:nvPicPr>
+        <p:blipFill>
+          <a:blip r:embed="rId2">
+            <a:extLst>
+              <a:ext uri="{28A0092B-C50C-407E-A947-70E740481C1C}">
+                <a14:useLocalDpi xmlns:a14="http://schemas.microsoft.com/office/drawing/2010/main" val="0"/>
+              </a:ext>
+              <a:ext uri="{96DAC541-7B7A-43D3-8B79-37D633B846F1}">
+                <asvg:svgBlip xmlns:asvg="http://schemas.microsoft.com/office/drawing/2016/SVG/main" r:embed="rId3"/>
+              </a:ext>
+            </a:extLst>
+          </a:blip>
+          <a:stretch>
+            <a:fillRect/>
+          </a:stretch>
+        </p:blipFill>
+        <p:spPr>
+          <a:xfrm>
+            <a:off x="3738979" y="3429000"/>
+            <a:ext cx="286305" cy="286305"/>
+          </a:xfrm>
+          <a:prstGeom prst="rect">
+            <a:avLst/>
+          </a:prstGeom>
+        </p:spPr>
+      </p:pic>
+      <p:pic>
+        <p:nvPicPr>
+          <p:cNvPr id="9" name="Graphic 8" descr="Gold bars">
+            <a:extLst>
+              <a:ext uri="{FF2B5EF4-FFF2-40B4-BE49-F238E27FC236}">
+                <a16:creationId xmlns:a16="http://schemas.microsoft.com/office/drawing/2014/main" id="{60A971DB-B0D3-43ED-8546-50FDAA7CB53D}"/>
+              </a:ext>
+            </a:extLst>
+          </p:cNvPr>
+          <p:cNvPicPr>
+            <a:picLocks noChangeAspect="1"/>
+          </p:cNvPicPr>
+          <p:nvPr/>
+        </p:nvPicPr>
+        <p:blipFill>
+          <a:blip r:embed="rId4">
+            <a:extLst>
+              <a:ext uri="{28A0092B-C50C-407E-A947-70E740481C1C}">
+                <a14:useLocalDpi xmlns:a14="http://schemas.microsoft.com/office/drawing/2010/main" val="0"/>
+              </a:ext>
+              <a:ext uri="{96DAC541-7B7A-43D3-8B79-37D633B846F1}">
+                <asvg:svgBlip xmlns:asvg="http://schemas.microsoft.com/office/drawing/2016/SVG/main" r:embed="rId5"/>
+              </a:ext>
+            </a:extLst>
+          </a:blip>
+          <a:stretch>
+            <a:fillRect/>
+          </a:stretch>
+        </p:blipFill>
+        <p:spPr>
+          <a:xfrm>
+            <a:off x="5952847" y="1530659"/>
+            <a:ext cx="286305" cy="286305"/>
+          </a:xfrm>
+          <a:prstGeom prst="rect">
+            <a:avLst/>
+          </a:prstGeom>
+        </p:spPr>
+      </p:pic>
+      <p:pic>
+        <p:nvPicPr>
+          <p:cNvPr id="10" name="Graphic 9" descr="Gold bars">
+            <a:extLst>
+              <a:ext uri="{FF2B5EF4-FFF2-40B4-BE49-F238E27FC236}">
+                <a16:creationId xmlns:a16="http://schemas.microsoft.com/office/drawing/2014/main" id="{D476480C-8BBA-4A04-B7B9-0DC4465AF58C}"/>
+              </a:ext>
+            </a:extLst>
+          </p:cNvPr>
+          <p:cNvPicPr>
+            <a:picLocks noChangeAspect="1"/>
+          </p:cNvPicPr>
+          <p:nvPr/>
+        </p:nvPicPr>
+        <p:blipFill>
+          <a:blip r:embed="rId4">
+            <a:extLst>
+              <a:ext uri="{28A0092B-C50C-407E-A947-70E740481C1C}">
+                <a14:useLocalDpi xmlns:a14="http://schemas.microsoft.com/office/drawing/2010/main" val="0"/>
+              </a:ext>
+              <a:ext uri="{96DAC541-7B7A-43D3-8B79-37D633B846F1}">
+                <asvg:svgBlip xmlns:asvg="http://schemas.microsoft.com/office/drawing/2016/SVG/main" r:embed="rId5"/>
+              </a:ext>
+            </a:extLst>
+          </a:blip>
+          <a:stretch>
+            <a:fillRect/>
+          </a:stretch>
+        </p:blipFill>
+        <p:spPr>
+          <a:xfrm>
+            <a:off x="5952847" y="4026763"/>
+            <a:ext cx="286305" cy="286305"/>
+          </a:xfrm>
+          <a:prstGeom prst="rect">
+            <a:avLst/>
+          </a:prstGeom>
+        </p:spPr>
+      </p:pic>
+      <p:pic>
+        <p:nvPicPr>
+          <p:cNvPr id="11" name="Graphic 10" descr="Gold bars">
+            <a:extLst>
+              <a:ext uri="{FF2B5EF4-FFF2-40B4-BE49-F238E27FC236}">
+                <a16:creationId xmlns:a16="http://schemas.microsoft.com/office/drawing/2014/main" id="{C25BE33C-9128-4E97-A1D7-AA2179C24F7D}"/>
+              </a:ext>
+            </a:extLst>
+          </p:cNvPr>
+          <p:cNvPicPr>
+            <a:picLocks noChangeAspect="1"/>
+          </p:cNvPicPr>
+          <p:nvPr/>
+        </p:nvPicPr>
+        <p:blipFill>
+          <a:blip r:embed="rId4">
+            <a:extLst>
+              <a:ext uri="{28A0092B-C50C-407E-A947-70E740481C1C}">
+                <a14:useLocalDpi xmlns:a14="http://schemas.microsoft.com/office/drawing/2010/main" val="0"/>
+              </a:ext>
+              <a:ext uri="{96DAC541-7B7A-43D3-8B79-37D633B846F1}">
+                <asvg:svgBlip xmlns:asvg="http://schemas.microsoft.com/office/drawing/2016/SVG/main" r:embed="rId5"/>
+              </a:ext>
+            </a:extLst>
+          </a:blip>
+          <a:stretch>
+            <a:fillRect/>
+          </a:stretch>
+        </p:blipFill>
+        <p:spPr>
+          <a:xfrm>
+            <a:off x="6673418" y="5297749"/>
+            <a:ext cx="286305" cy="286305"/>
+          </a:xfrm>
+          <a:prstGeom prst="rect">
+            <a:avLst/>
+          </a:prstGeom>
+        </p:spPr>
+      </p:pic>
+      <p:pic>
+        <p:nvPicPr>
+          <p:cNvPr id="12" name="Graphic 11" descr="Gold bars">
+            <a:extLst>
+              <a:ext uri="{FF2B5EF4-FFF2-40B4-BE49-F238E27FC236}">
+                <a16:creationId xmlns:a16="http://schemas.microsoft.com/office/drawing/2014/main" id="{18A99839-79E2-4E45-A21F-63E714C724BB}"/>
+              </a:ext>
+            </a:extLst>
+          </p:cNvPr>
+          <p:cNvPicPr>
+            <a:picLocks noChangeAspect="1"/>
+          </p:cNvPicPr>
+          <p:nvPr/>
+        </p:nvPicPr>
+        <p:blipFill>
+          <a:blip r:embed="rId4">
+            <a:extLst>
+              <a:ext uri="{28A0092B-C50C-407E-A947-70E740481C1C}">
+                <a14:useLocalDpi xmlns:a14="http://schemas.microsoft.com/office/drawing/2010/main" val="0"/>
+              </a:ext>
+              <a:ext uri="{96DAC541-7B7A-43D3-8B79-37D633B846F1}">
+                <asvg:svgBlip xmlns:asvg="http://schemas.microsoft.com/office/drawing/2016/SVG/main" r:embed="rId5"/>
+              </a:ext>
+            </a:extLst>
+          </a:blip>
+          <a:stretch>
+            <a:fillRect/>
+          </a:stretch>
+        </p:blipFill>
+        <p:spPr>
+          <a:xfrm>
+            <a:off x="4468305" y="2147656"/>
+            <a:ext cx="286305" cy="286305"/>
+          </a:xfrm>
+          <a:prstGeom prst="rect">
+            <a:avLst/>
+          </a:prstGeom>
+        </p:spPr>
+      </p:pic>
+      <p:pic>
+        <p:nvPicPr>
+          <p:cNvPr id="14" name="Graphic 13" descr="Robber">
+            <a:extLst>
+              <a:ext uri="{FF2B5EF4-FFF2-40B4-BE49-F238E27FC236}">
+                <a16:creationId xmlns:a16="http://schemas.microsoft.com/office/drawing/2014/main" id="{1C326312-C9AF-4772-A897-A39625883246}"/>
+              </a:ext>
+            </a:extLst>
+          </p:cNvPr>
+          <p:cNvPicPr>
+            <a:picLocks noChangeAspect="1"/>
+          </p:cNvPicPr>
+          <p:nvPr/>
+        </p:nvPicPr>
+        <p:blipFill>
+          <a:blip r:embed="rId6">
+            <a:extLst>
+              <a:ext uri="{28A0092B-C50C-407E-A947-70E740481C1C}">
+                <a14:useLocalDpi xmlns:a14="http://schemas.microsoft.com/office/drawing/2010/main" val="0"/>
+              </a:ext>
+              <a:ext uri="{96DAC541-7B7A-43D3-8B79-37D633B846F1}">
+                <asvg:svgBlip xmlns:asvg="http://schemas.microsoft.com/office/drawing/2016/SVG/main" r:embed="rId7"/>
+              </a:ext>
+            </a:extLst>
+          </a:blip>
+          <a:stretch>
+            <a:fillRect/>
+          </a:stretch>
+        </p:blipFill>
+        <p:spPr>
+          <a:xfrm>
+            <a:off x="2868967" y="4587536"/>
+            <a:ext cx="457200" cy="457200"/>
+          </a:xfrm>
+          <a:prstGeom prst="rect">
+            <a:avLst/>
+          </a:prstGeom>
+        </p:spPr>
+      </p:pic>
+      <p:pic>
+        <p:nvPicPr>
+          <p:cNvPr id="15" name="Graphic 14" descr="Robber">
+            <a:extLst>
+              <a:ext uri="{FF2B5EF4-FFF2-40B4-BE49-F238E27FC236}">
+                <a16:creationId xmlns:a16="http://schemas.microsoft.com/office/drawing/2014/main" id="{8EEB7EC0-12B8-4AD5-8C1A-EEE79CCD8DEB}"/>
+              </a:ext>
+            </a:extLst>
+          </p:cNvPr>
+          <p:cNvPicPr>
+            <a:picLocks noChangeAspect="1"/>
+          </p:cNvPicPr>
+          <p:nvPr/>
+        </p:nvPicPr>
+        <p:blipFill>
+          <a:blip r:embed="rId6">
+            <a:extLst>
+              <a:ext uri="{28A0092B-C50C-407E-A947-70E740481C1C}">
+                <a14:useLocalDpi xmlns:a14="http://schemas.microsoft.com/office/drawing/2010/main" val="0"/>
+              </a:ext>
+              <a:ext uri="{96DAC541-7B7A-43D3-8B79-37D633B846F1}">
+                <asvg:svgBlip xmlns:asvg="http://schemas.microsoft.com/office/drawing/2016/SVG/main" r:embed="rId8"/>
+              </a:ext>
+            </a:extLst>
+          </a:blip>
+          <a:stretch>
+            <a:fillRect/>
+          </a:stretch>
+        </p:blipFill>
+        <p:spPr>
+          <a:xfrm>
+            <a:off x="6587970" y="1445211"/>
+            <a:ext cx="457200" cy="457200"/>
+          </a:xfrm>
+          <a:prstGeom prst="rect">
+            <a:avLst/>
+          </a:prstGeom>
+        </p:spPr>
+      </p:pic>
+      <p:pic>
+        <p:nvPicPr>
+          <p:cNvPr id="17" name="Graphic 16" descr="Construction worker">
+            <a:extLst>
+              <a:ext uri="{FF2B5EF4-FFF2-40B4-BE49-F238E27FC236}">
+                <a16:creationId xmlns:a16="http://schemas.microsoft.com/office/drawing/2014/main" id="{13407DBC-507B-486C-B6B8-4AC64BF24D7C}"/>
+              </a:ext>
+            </a:extLst>
+          </p:cNvPr>
+          <p:cNvPicPr>
+            <a:picLocks noChangeAspect="1"/>
+          </p:cNvPicPr>
+          <p:nvPr/>
+        </p:nvPicPr>
+        <p:blipFill>
+          <a:blip r:embed="rId9">
+            <a:extLst>
+              <a:ext uri="{28A0092B-C50C-407E-A947-70E740481C1C}">
+                <a14:useLocalDpi xmlns:a14="http://schemas.microsoft.com/office/drawing/2010/main" val="0"/>
+              </a:ext>
+              <a:ext uri="{96DAC541-7B7A-43D3-8B79-37D633B846F1}">
+                <asvg:svgBlip xmlns:asvg="http://schemas.microsoft.com/office/drawing/2016/SVG/main" r:embed="rId10"/>
+              </a:ext>
+            </a:extLst>
+          </a:blip>
+          <a:stretch>
+            <a:fillRect/>
+          </a:stretch>
+        </p:blipFill>
+        <p:spPr>
+          <a:xfrm>
+            <a:off x="2213499" y="903119"/>
+            <a:ext cx="371753" cy="371753"/>
+          </a:xfrm>
+          <a:prstGeom prst="rect">
+            <a:avLst/>
+          </a:prstGeom>
+        </p:spPr>
+      </p:pic>
+      <p:pic>
+        <p:nvPicPr>
+          <p:cNvPr id="18" name="Graphic 17" descr="Construction worker">
+            <a:extLst>
+              <a:ext uri="{FF2B5EF4-FFF2-40B4-BE49-F238E27FC236}">
+                <a16:creationId xmlns:a16="http://schemas.microsoft.com/office/drawing/2014/main" id="{ECF47917-F07C-444E-A465-27000B631FF2}"/>
+              </a:ext>
+            </a:extLst>
+          </p:cNvPr>
+          <p:cNvPicPr>
+            <a:picLocks noChangeAspect="1"/>
+          </p:cNvPicPr>
+          <p:nvPr/>
+        </p:nvPicPr>
+        <p:blipFill>
+          <a:blip r:embed="rId9">
+            <a:extLst>
+              <a:ext uri="{28A0092B-C50C-407E-A947-70E740481C1C}">
+                <a14:useLocalDpi xmlns:a14="http://schemas.microsoft.com/office/drawing/2010/main" val="0"/>
+              </a:ext>
+              <a:ext uri="{96DAC541-7B7A-43D3-8B79-37D633B846F1}">
+                <asvg:svgBlip xmlns:asvg="http://schemas.microsoft.com/office/drawing/2016/SVG/main" r:embed="rId10"/>
+              </a:ext>
+            </a:extLst>
+          </a:blip>
+          <a:stretch>
+            <a:fillRect/>
+          </a:stretch>
+        </p:blipFill>
+        <p:spPr>
+          <a:xfrm>
+            <a:off x="3669437" y="3984038"/>
+            <a:ext cx="371753" cy="371753"/>
+          </a:xfrm>
+          <a:prstGeom prst="rect">
+            <a:avLst/>
+          </a:prstGeom>
+        </p:spPr>
+      </p:pic>
+      <p:sp>
+        <p:nvSpPr>
+          <p:cNvPr id="19" name="TextBox 18">
+            <a:extLst>
+              <a:ext uri="{FF2B5EF4-FFF2-40B4-BE49-F238E27FC236}">
+                <a16:creationId xmlns:a16="http://schemas.microsoft.com/office/drawing/2014/main" id="{ED353EC7-0B4D-4635-8159-A3F70959EAD7}"/>
+              </a:ext>
+            </a:extLst>
+          </p:cNvPr>
+          <p:cNvSpPr txBox="1"/>
+          <p:nvPr/>
+        </p:nvSpPr>
+        <p:spPr>
+          <a:xfrm>
+            <a:off x="7803472" y="746870"/>
+            <a:ext cx="3611237" cy="400110"/>
+          </a:xfrm>
+          <a:prstGeom prst="rect">
+            <a:avLst/>
+          </a:prstGeom>
+          <a:noFill/>
+        </p:spPr>
+        <p:txBody>
+          <a:bodyPr wrap="square" rtlCol="0">
+            <a:spAutoFit/>
+          </a:bodyPr>
+          <a:lstStyle/>
+          <a:p>
+            <a:r>
+              <a:rPr lang="en-US" sz="2000" b="1" dirty="0">
+                <a:latin typeface="Berlin Sans FB Demi" panose="020E0802020502020306" pitchFamily="34" charset="0"/>
+              </a:rPr>
+              <a:t>Gold Hunters</a:t>
+            </a:r>
+          </a:p>
+        </p:txBody>
+      </p:sp>
+      <p:pic>
+        <p:nvPicPr>
+          <p:cNvPr id="20" name="Graphic 19" descr="Construction worker">
+            <a:extLst>
+              <a:ext uri="{FF2B5EF4-FFF2-40B4-BE49-F238E27FC236}">
+                <a16:creationId xmlns:a16="http://schemas.microsoft.com/office/drawing/2014/main" id="{8385339E-E7F4-4CC6-A7D7-125A2CC7199E}"/>
+              </a:ext>
+            </a:extLst>
+          </p:cNvPr>
+          <p:cNvPicPr>
+            <a:picLocks noChangeAspect="1"/>
+          </p:cNvPicPr>
+          <p:nvPr/>
+        </p:nvPicPr>
+        <p:blipFill>
+          <a:blip r:embed="rId9">
+            <a:extLst>
+              <a:ext uri="{28A0092B-C50C-407E-A947-70E740481C1C}">
+                <a14:useLocalDpi xmlns:a14="http://schemas.microsoft.com/office/drawing/2010/main" val="0"/>
+              </a:ext>
+              <a:ext uri="{96DAC541-7B7A-43D3-8B79-37D633B846F1}">
+                <asvg:svgBlip xmlns:asvg="http://schemas.microsoft.com/office/drawing/2016/SVG/main" r:embed="rId10"/>
+              </a:ext>
+            </a:extLst>
+          </a:blip>
+          <a:stretch>
+            <a:fillRect/>
+          </a:stretch>
+        </p:blipFill>
+        <p:spPr>
+          <a:xfrm>
+            <a:off x="4611457" y="2147656"/>
+            <a:ext cx="371753" cy="371753"/>
+          </a:xfrm>
+          <a:prstGeom prst="rect">
+            <a:avLst/>
+          </a:prstGeom>
+        </p:spPr>
+      </p:pic>
+      <p:sp>
+        <p:nvSpPr>
+          <p:cNvPr id="21" name="Rectangle: Rounded Corners 20">
+            <a:extLst>
+              <a:ext uri="{FF2B5EF4-FFF2-40B4-BE49-F238E27FC236}">
+                <a16:creationId xmlns:a16="http://schemas.microsoft.com/office/drawing/2014/main" id="{2A1C8294-1DAD-4144-9057-3A7169E5BA7C}"/>
+              </a:ext>
+            </a:extLst>
+          </p:cNvPr>
+          <p:cNvSpPr/>
+          <p:nvPr/>
+        </p:nvSpPr>
+        <p:spPr>
+          <a:xfrm>
+            <a:off x="2112885" y="3925005"/>
+            <a:ext cx="2041865" cy="1757779"/>
+          </a:xfrm>
+          <a:prstGeom prst="roundRect">
+            <a:avLst/>
+          </a:prstGeom>
+          <a:solidFill>
+            <a:schemeClr val="accent1">
+              <a:alpha val="13000"/>
+            </a:schemeClr>
+          </a:solidFill>
+          <a:ln>
+            <a:solidFill>
+              <a:schemeClr val="accent5"/>
+            </a:solidFill>
+            <a:prstDash val="dash"/>
+          </a:ln>
+        </p:spPr>
+        <p:style>
+          <a:lnRef idx="2">
+            <a:schemeClr val="accent1">
+              <a:shade val="50000"/>
+            </a:schemeClr>
+          </a:lnRef>
+          <a:fillRef idx="1">
+            <a:schemeClr val="accent1"/>
+          </a:fillRef>
+          <a:effectRef idx="0">
+            <a:schemeClr val="accent1"/>
+          </a:effectRef>
+          <a:fontRef idx="minor">
+            <a:schemeClr val="lt1"/>
+          </a:fontRef>
+        </p:style>
+        <p:txBody>
+          <a:bodyPr rtlCol="0" anchor="ctr"/>
+          <a:lstStyle/>
+          <a:p>
+            <a:pPr algn="ctr"/>
+            <a:endParaRPr lang="en-US"/>
+          </a:p>
+        </p:txBody>
+      </p:sp>
+      <p:sp>
+        <p:nvSpPr>
+          <p:cNvPr id="24" name="Rectangle: Rounded Corners 23">
+            <a:extLst>
+              <a:ext uri="{FF2B5EF4-FFF2-40B4-BE49-F238E27FC236}">
+                <a16:creationId xmlns:a16="http://schemas.microsoft.com/office/drawing/2014/main" id="{6AEC9462-1C1E-433B-A640-924A64179883}"/>
+              </a:ext>
+            </a:extLst>
+          </p:cNvPr>
+          <p:cNvSpPr/>
+          <p:nvPr/>
+        </p:nvSpPr>
+        <p:spPr>
+          <a:xfrm>
+            <a:off x="5761607" y="761630"/>
+            <a:ext cx="2041865" cy="1757779"/>
+          </a:xfrm>
+          <a:prstGeom prst="roundRect">
+            <a:avLst/>
+          </a:prstGeom>
+          <a:solidFill>
+            <a:schemeClr val="accent1">
+              <a:alpha val="13000"/>
+            </a:schemeClr>
+          </a:solidFill>
+          <a:ln>
+            <a:solidFill>
+              <a:schemeClr val="accent5"/>
+            </a:solidFill>
+            <a:prstDash val="dash"/>
+          </a:ln>
+        </p:spPr>
+        <p:style>
+          <a:lnRef idx="2">
+            <a:schemeClr val="accent1">
+              <a:shade val="50000"/>
+            </a:schemeClr>
+          </a:lnRef>
+          <a:fillRef idx="1">
+            <a:schemeClr val="accent1"/>
+          </a:fillRef>
+          <a:effectRef idx="0">
+            <a:schemeClr val="accent1"/>
+          </a:effectRef>
+          <a:fontRef idx="minor">
+            <a:schemeClr val="lt1"/>
+          </a:fontRef>
+        </p:style>
+        <p:txBody>
+          <a:bodyPr rtlCol="0" anchor="ctr"/>
+          <a:lstStyle/>
+          <a:p>
+            <a:pPr algn="ctr"/>
+            <a:endParaRPr lang="en-US"/>
+          </a:p>
+        </p:txBody>
+      </p:sp>
+      <p:sp>
+        <p:nvSpPr>
+          <p:cNvPr id="25" name="Rectangle: Rounded Corners 24">
+            <a:extLst>
+              <a:ext uri="{FF2B5EF4-FFF2-40B4-BE49-F238E27FC236}">
+                <a16:creationId xmlns:a16="http://schemas.microsoft.com/office/drawing/2014/main" id="{DC77D5D1-3BB8-41B0-A3B0-30DA8DD895EE}"/>
+              </a:ext>
+            </a:extLst>
+          </p:cNvPr>
+          <p:cNvSpPr/>
+          <p:nvPr/>
+        </p:nvSpPr>
+        <p:spPr>
+          <a:xfrm>
+            <a:off x="1376120" y="144632"/>
+            <a:ext cx="2041865" cy="1757779"/>
+          </a:xfrm>
+          <a:prstGeom prst="roundRect">
+            <a:avLst/>
+          </a:prstGeom>
+          <a:solidFill>
+            <a:srgbClr val="C00000">
+              <a:alpha val="13000"/>
+            </a:srgbClr>
+          </a:solidFill>
+          <a:ln>
+            <a:solidFill>
+              <a:schemeClr val="accent5"/>
+            </a:solidFill>
+            <a:prstDash val="dash"/>
+          </a:ln>
+        </p:spPr>
+        <p:style>
+          <a:lnRef idx="2">
+            <a:schemeClr val="accent1">
+              <a:shade val="50000"/>
+            </a:schemeClr>
+          </a:lnRef>
+          <a:fillRef idx="1">
+            <a:schemeClr val="accent1"/>
+          </a:fillRef>
+          <a:effectRef idx="0">
+            <a:schemeClr val="accent1"/>
+          </a:effectRef>
+          <a:fontRef idx="minor">
+            <a:schemeClr val="lt1"/>
+          </a:fontRef>
+        </p:style>
+        <p:txBody>
+          <a:bodyPr rtlCol="0" anchor="ctr"/>
+          <a:lstStyle/>
+          <a:p>
+            <a:pPr algn="ctr"/>
+            <a:endParaRPr lang="en-US"/>
+          </a:p>
+        </p:txBody>
+      </p:sp>
+      <p:sp>
+        <p:nvSpPr>
+          <p:cNvPr id="26" name="Rectangle: Rounded Corners 25">
+            <a:extLst>
+              <a:ext uri="{FF2B5EF4-FFF2-40B4-BE49-F238E27FC236}">
+                <a16:creationId xmlns:a16="http://schemas.microsoft.com/office/drawing/2014/main" id="{6548A195-2DDB-4805-B493-613CF6BE285F}"/>
+              </a:ext>
+            </a:extLst>
+          </p:cNvPr>
+          <p:cNvSpPr/>
+          <p:nvPr/>
+        </p:nvSpPr>
+        <p:spPr>
+          <a:xfrm>
+            <a:off x="4249274" y="1992152"/>
+            <a:ext cx="693847" cy="597312"/>
+          </a:xfrm>
+          <a:prstGeom prst="roundRect">
+            <a:avLst/>
+          </a:prstGeom>
+          <a:solidFill>
+            <a:srgbClr val="C00000">
+              <a:alpha val="13000"/>
+            </a:srgbClr>
+          </a:solidFill>
+          <a:ln>
+            <a:solidFill>
+              <a:schemeClr val="accent5"/>
+            </a:solidFill>
+            <a:prstDash val="dash"/>
+          </a:ln>
+        </p:spPr>
+        <p:style>
+          <a:lnRef idx="2">
+            <a:schemeClr val="accent1">
+              <a:shade val="50000"/>
+            </a:schemeClr>
+          </a:lnRef>
+          <a:fillRef idx="1">
+            <a:schemeClr val="accent1"/>
+          </a:fillRef>
+          <a:effectRef idx="0">
+            <a:schemeClr val="accent1"/>
+          </a:effectRef>
+          <a:fontRef idx="minor">
+            <a:schemeClr val="lt1"/>
+          </a:fontRef>
+        </p:style>
+        <p:txBody>
+          <a:bodyPr rtlCol="0" anchor="ctr"/>
+          <a:lstStyle/>
+          <a:p>
+            <a:pPr algn="ctr"/>
+            <a:endParaRPr lang="en-US"/>
+          </a:p>
+        </p:txBody>
+      </p:sp>
+      <p:sp>
+        <p:nvSpPr>
+          <p:cNvPr id="27" name="Rectangle: Rounded Corners 26">
+            <a:extLst>
+              <a:ext uri="{FF2B5EF4-FFF2-40B4-BE49-F238E27FC236}">
+                <a16:creationId xmlns:a16="http://schemas.microsoft.com/office/drawing/2014/main" id="{D7A8E04A-B588-4568-A743-684DF05AD542}"/>
+              </a:ext>
+            </a:extLst>
+          </p:cNvPr>
+          <p:cNvSpPr/>
+          <p:nvPr/>
+        </p:nvSpPr>
+        <p:spPr>
+          <a:xfrm>
+            <a:off x="2868967" y="3300848"/>
+            <a:ext cx="2041865" cy="1757779"/>
+          </a:xfrm>
+          <a:prstGeom prst="roundRect">
+            <a:avLst/>
+          </a:prstGeom>
+          <a:solidFill>
+            <a:srgbClr val="C00000">
+              <a:alpha val="13000"/>
+            </a:srgbClr>
+          </a:solidFill>
+          <a:ln>
+            <a:solidFill>
+              <a:schemeClr val="accent5"/>
+            </a:solidFill>
+            <a:prstDash val="dash"/>
+          </a:ln>
+        </p:spPr>
+        <p:style>
+          <a:lnRef idx="2">
+            <a:schemeClr val="accent1">
+              <a:shade val="50000"/>
+            </a:schemeClr>
+          </a:lnRef>
+          <a:fillRef idx="1">
+            <a:schemeClr val="accent1"/>
+          </a:fillRef>
+          <a:effectRef idx="0">
+            <a:schemeClr val="accent1"/>
+          </a:effectRef>
+          <a:fontRef idx="minor">
+            <a:schemeClr val="lt1"/>
+          </a:fontRef>
+        </p:style>
+        <p:txBody>
+          <a:bodyPr rtlCol="0" anchor="ctr"/>
+          <a:lstStyle/>
+          <a:p>
+            <a:pPr algn="ctr"/>
+            <a:endParaRPr lang="en-US"/>
+          </a:p>
+        </p:txBody>
+      </p:sp>
+      <p:pic>
+        <p:nvPicPr>
+          <p:cNvPr id="28" name="Graphic 27" descr="Robber">
+            <a:extLst>
+              <a:ext uri="{FF2B5EF4-FFF2-40B4-BE49-F238E27FC236}">
+                <a16:creationId xmlns:a16="http://schemas.microsoft.com/office/drawing/2014/main" id="{A8563C7C-E9AD-4DC6-A29D-AF6D148527EB}"/>
+              </a:ext>
+            </a:extLst>
+          </p:cNvPr>
+          <p:cNvPicPr>
+            <a:picLocks noChangeAspect="1"/>
+          </p:cNvPicPr>
+          <p:nvPr/>
+        </p:nvPicPr>
+        <p:blipFill>
+          <a:blip r:embed="rId6">
+            <a:extLst>
+              <a:ext uri="{28A0092B-C50C-407E-A947-70E740481C1C}">
+                <a14:useLocalDpi xmlns:a14="http://schemas.microsoft.com/office/drawing/2010/main" val="0"/>
+              </a:ext>
+              <a:ext uri="{96DAC541-7B7A-43D3-8B79-37D633B846F1}">
+                <asvg:svgBlip xmlns:asvg="http://schemas.microsoft.com/office/drawing/2016/SVG/main" r:embed="rId8"/>
+              </a:ext>
+            </a:extLst>
+          </a:blip>
+          <a:stretch>
+            <a:fillRect/>
+          </a:stretch>
+        </p:blipFill>
+        <p:spPr>
+          <a:xfrm>
+            <a:off x="8320939" y="3526838"/>
+            <a:ext cx="457200" cy="457200"/>
+          </a:xfrm>
+          <a:prstGeom prst="rect">
+            <a:avLst/>
+          </a:prstGeom>
+        </p:spPr>
+      </p:pic>
+      <p:pic>
+        <p:nvPicPr>
+          <p:cNvPr id="29" name="Graphic 28" descr="Construction worker">
+            <a:extLst>
+              <a:ext uri="{FF2B5EF4-FFF2-40B4-BE49-F238E27FC236}">
+                <a16:creationId xmlns:a16="http://schemas.microsoft.com/office/drawing/2014/main" id="{696B7986-41B3-44C2-9FD7-0629A6C4563C}"/>
+              </a:ext>
+            </a:extLst>
+          </p:cNvPr>
+          <p:cNvPicPr>
+            <a:picLocks noChangeAspect="1"/>
+          </p:cNvPicPr>
+          <p:nvPr/>
+        </p:nvPicPr>
+        <p:blipFill>
+          <a:blip r:embed="rId9">
+            <a:extLst>
+              <a:ext uri="{28A0092B-C50C-407E-A947-70E740481C1C}">
+                <a14:useLocalDpi xmlns:a14="http://schemas.microsoft.com/office/drawing/2010/main" val="0"/>
+              </a:ext>
+              <a:ext uri="{96DAC541-7B7A-43D3-8B79-37D633B846F1}">
+                <asvg:svgBlip xmlns:asvg="http://schemas.microsoft.com/office/drawing/2016/SVG/main" r:embed="rId10"/>
+              </a:ext>
+            </a:extLst>
+          </a:blip>
+          <a:stretch>
+            <a:fillRect/>
+          </a:stretch>
+        </p:blipFill>
+        <p:spPr>
+          <a:xfrm>
+            <a:off x="8363663" y="3027217"/>
+            <a:ext cx="371753" cy="371753"/>
+          </a:xfrm>
+          <a:prstGeom prst="rect">
+            <a:avLst/>
+          </a:prstGeom>
+        </p:spPr>
+      </p:pic>
+      <p:sp>
+        <p:nvSpPr>
+          <p:cNvPr id="30" name="TextBox 29">
+            <a:extLst>
+              <a:ext uri="{FF2B5EF4-FFF2-40B4-BE49-F238E27FC236}">
+                <a16:creationId xmlns:a16="http://schemas.microsoft.com/office/drawing/2014/main" id="{6AEAA78D-64C0-4688-BDA5-A4D2E010F686}"/>
+              </a:ext>
+            </a:extLst>
+          </p:cNvPr>
+          <p:cNvSpPr txBox="1"/>
+          <p:nvPr/>
+        </p:nvSpPr>
+        <p:spPr>
+          <a:xfrm>
+            <a:off x="8959273" y="3027217"/>
+            <a:ext cx="1126836" cy="369332"/>
+          </a:xfrm>
+          <a:prstGeom prst="rect">
+            <a:avLst/>
+          </a:prstGeom>
+          <a:noFill/>
+        </p:spPr>
+        <p:txBody>
+          <a:bodyPr wrap="square" rtlCol="0">
+            <a:spAutoFit/>
+          </a:bodyPr>
+          <a:lstStyle/>
+          <a:p>
+            <a:r>
+              <a:rPr lang="en-US" dirty="0"/>
+              <a:t>Diggers</a:t>
+            </a:r>
+          </a:p>
+        </p:txBody>
+      </p:sp>
+      <p:sp>
+        <p:nvSpPr>
+          <p:cNvPr id="31" name="TextBox 30">
+            <a:extLst>
+              <a:ext uri="{FF2B5EF4-FFF2-40B4-BE49-F238E27FC236}">
+                <a16:creationId xmlns:a16="http://schemas.microsoft.com/office/drawing/2014/main" id="{46065960-76A0-4AC6-B4B4-2369BD71B7AF}"/>
+              </a:ext>
+            </a:extLst>
+          </p:cNvPr>
+          <p:cNvSpPr txBox="1"/>
+          <p:nvPr/>
+        </p:nvSpPr>
+        <p:spPr>
+          <a:xfrm>
+            <a:off x="8952279" y="3614706"/>
+            <a:ext cx="1126836" cy="369332"/>
+          </a:xfrm>
+          <a:prstGeom prst="rect">
+            <a:avLst/>
+          </a:prstGeom>
+          <a:noFill/>
+        </p:spPr>
+        <p:txBody>
+          <a:bodyPr wrap="square" rtlCol="0">
+            <a:spAutoFit/>
+          </a:bodyPr>
+          <a:lstStyle/>
+          <a:p>
+            <a:r>
+              <a:rPr lang="en-US" dirty="0"/>
+              <a:t>Robbers</a:t>
+            </a:r>
+          </a:p>
+        </p:txBody>
+      </p:sp>
+      <p:pic>
+        <p:nvPicPr>
+          <p:cNvPr id="32" name="Graphic 31" descr="Robber">
+            <a:extLst>
+              <a:ext uri="{FF2B5EF4-FFF2-40B4-BE49-F238E27FC236}">
+                <a16:creationId xmlns:a16="http://schemas.microsoft.com/office/drawing/2014/main" id="{C4764B2A-981F-4A3E-A1F2-3B584AA64BF6}"/>
+              </a:ext>
+            </a:extLst>
+          </p:cNvPr>
+          <p:cNvPicPr>
+            <a:picLocks noChangeAspect="1"/>
+          </p:cNvPicPr>
+          <p:nvPr/>
+        </p:nvPicPr>
+        <p:blipFill>
+          <a:blip r:embed="rId6">
+            <a:extLst>
+              <a:ext uri="{28A0092B-C50C-407E-A947-70E740481C1C}">
+                <a14:useLocalDpi xmlns:a14="http://schemas.microsoft.com/office/drawing/2010/main" val="0"/>
+              </a:ext>
+              <a:ext uri="{96DAC541-7B7A-43D3-8B79-37D633B846F1}">
+                <asvg:svgBlip xmlns:asvg="http://schemas.microsoft.com/office/drawing/2016/SVG/main" r:embed="rId8"/>
+              </a:ext>
+            </a:extLst>
+          </a:blip>
+          <a:stretch>
+            <a:fillRect/>
+          </a:stretch>
+        </p:blipFill>
+        <p:spPr>
+          <a:xfrm>
+            <a:off x="5838418" y="2028648"/>
+            <a:ext cx="457200" cy="457200"/>
+          </a:xfrm>
+          <a:prstGeom prst="rect">
+            <a:avLst/>
+          </a:prstGeom>
+        </p:spPr>
+      </p:pic>
+      <p:sp>
+        <p:nvSpPr>
+          <p:cNvPr id="33" name="Rectangle: Rounded Corners 32">
+            <a:extLst>
+              <a:ext uri="{FF2B5EF4-FFF2-40B4-BE49-F238E27FC236}">
+                <a16:creationId xmlns:a16="http://schemas.microsoft.com/office/drawing/2014/main" id="{EC73B3F9-5B5D-4C97-BDE4-388B687327F3}"/>
+              </a:ext>
+            </a:extLst>
+          </p:cNvPr>
+          <p:cNvSpPr/>
+          <p:nvPr/>
+        </p:nvSpPr>
+        <p:spPr>
+          <a:xfrm>
+            <a:off x="5046085" y="1411918"/>
+            <a:ext cx="2041865" cy="1757779"/>
+          </a:xfrm>
+          <a:prstGeom prst="roundRect">
+            <a:avLst/>
+          </a:prstGeom>
+          <a:solidFill>
+            <a:schemeClr val="accent1">
+              <a:alpha val="13000"/>
+            </a:schemeClr>
+          </a:solidFill>
+          <a:ln>
+            <a:solidFill>
+              <a:schemeClr val="accent5"/>
+            </a:solidFill>
+            <a:prstDash val="dash"/>
+          </a:ln>
+        </p:spPr>
+        <p:style>
+          <a:lnRef idx="2">
+            <a:schemeClr val="accent1">
+              <a:shade val="50000"/>
+            </a:schemeClr>
+          </a:lnRef>
+          <a:fillRef idx="1">
+            <a:schemeClr val="accent1"/>
+          </a:fillRef>
+          <a:effectRef idx="0">
+            <a:schemeClr val="accent1"/>
+          </a:effectRef>
+          <a:fontRef idx="minor">
+            <a:schemeClr val="lt1"/>
+          </a:fontRef>
+        </p:style>
+        <p:txBody>
+          <a:bodyPr rtlCol="0" anchor="ctr"/>
+          <a:lstStyle/>
+          <a:p>
+            <a:pPr algn="ctr"/>
+            <a:endParaRPr lang="en-US"/>
+          </a:p>
+        </p:txBody>
+      </p:sp>
+    </p:spTree>
+    <p:extLst>
+      <p:ext uri="{BB962C8B-B14F-4D97-AF65-F5344CB8AC3E}">
+        <p14:creationId xmlns:p14="http://schemas.microsoft.com/office/powerpoint/2010/main" val="3220102889"/>
+      </p:ext>
+    </p:extLst>
+  </p:cSld>
+  <p:clrMapOvr>
+    <a:masterClrMapping/>
+  </p:clrMapOvr>
+</p:sld>
+</file>
+
 <file path=ppt/theme/theme1.xml><?xml version="1.0" encoding="utf-8"?>
 <a:theme xmlns:a="http://schemas.openxmlformats.org/drawingml/2006/main" name="Office Theme">
   <a:themeElements>

</xml_diff>

<commit_message>
working on world definitions
</commit_message>
<xml_diff>
--- a/docs/Architecture.pptx
+++ b/docs/Architecture.pptx
@@ -13,6 +13,7 @@
     <p:sldId id="261" r:id="rId7"/>
     <p:sldId id="262" r:id="rId8"/>
     <p:sldId id="263" r:id="rId9"/>
+    <p:sldId id="264" r:id="rId10"/>
   </p:sldIdLst>
   <p:sldSz cx="12192000" cy="6858000"/>
   <p:notesSz cx="6858000" cy="9144000"/>
@@ -266,7 +267,7 @@
           <a:p>
             <a:fld id="{6E923454-6E85-4B3A-B554-39B57C774163}" type="datetimeFigureOut">
               <a:rPr lang="en-US" smtClean="0"/>
-              <a:t>6/29/2020</a:t>
+              <a:t>6/30/2020</a:t>
             </a:fld>
             <a:endParaRPr lang="en-US"/>
           </a:p>
@@ -464,7 +465,7 @@
           <a:p>
             <a:fld id="{6E923454-6E85-4B3A-B554-39B57C774163}" type="datetimeFigureOut">
               <a:rPr lang="en-US" smtClean="0"/>
-              <a:t>6/29/2020</a:t>
+              <a:t>6/30/2020</a:t>
             </a:fld>
             <a:endParaRPr lang="en-US"/>
           </a:p>
@@ -672,7 +673,7 @@
           <a:p>
             <a:fld id="{6E923454-6E85-4B3A-B554-39B57C774163}" type="datetimeFigureOut">
               <a:rPr lang="en-US" smtClean="0"/>
-              <a:t>6/29/2020</a:t>
+              <a:t>6/30/2020</a:t>
             </a:fld>
             <a:endParaRPr lang="en-US"/>
           </a:p>
@@ -870,7 +871,7 @@
           <a:p>
             <a:fld id="{6E923454-6E85-4B3A-B554-39B57C774163}" type="datetimeFigureOut">
               <a:rPr lang="en-US" smtClean="0"/>
-              <a:t>6/29/2020</a:t>
+              <a:t>6/30/2020</a:t>
             </a:fld>
             <a:endParaRPr lang="en-US"/>
           </a:p>
@@ -1145,7 +1146,7 @@
           <a:p>
             <a:fld id="{6E923454-6E85-4B3A-B554-39B57C774163}" type="datetimeFigureOut">
               <a:rPr lang="en-US" smtClean="0"/>
-              <a:t>6/29/2020</a:t>
+              <a:t>6/30/2020</a:t>
             </a:fld>
             <a:endParaRPr lang="en-US"/>
           </a:p>
@@ -1410,7 +1411,7 @@
           <a:p>
             <a:fld id="{6E923454-6E85-4B3A-B554-39B57C774163}" type="datetimeFigureOut">
               <a:rPr lang="en-US" smtClean="0"/>
-              <a:t>6/29/2020</a:t>
+              <a:t>6/30/2020</a:t>
             </a:fld>
             <a:endParaRPr lang="en-US"/>
           </a:p>
@@ -1822,7 +1823,7 @@
           <a:p>
             <a:fld id="{6E923454-6E85-4B3A-B554-39B57C774163}" type="datetimeFigureOut">
               <a:rPr lang="en-US" smtClean="0"/>
-              <a:t>6/29/2020</a:t>
+              <a:t>6/30/2020</a:t>
             </a:fld>
             <a:endParaRPr lang="en-US"/>
           </a:p>
@@ -1963,7 +1964,7 @@
           <a:p>
             <a:fld id="{6E923454-6E85-4B3A-B554-39B57C774163}" type="datetimeFigureOut">
               <a:rPr lang="en-US" smtClean="0"/>
-              <a:t>6/29/2020</a:t>
+              <a:t>6/30/2020</a:t>
             </a:fld>
             <a:endParaRPr lang="en-US"/>
           </a:p>
@@ -2076,7 +2077,7 @@
           <a:p>
             <a:fld id="{6E923454-6E85-4B3A-B554-39B57C774163}" type="datetimeFigureOut">
               <a:rPr lang="en-US" smtClean="0"/>
-              <a:t>6/29/2020</a:t>
+              <a:t>6/30/2020</a:t>
             </a:fld>
             <a:endParaRPr lang="en-US"/>
           </a:p>
@@ -2387,7 +2388,7 @@
           <a:p>
             <a:fld id="{6E923454-6E85-4B3A-B554-39B57C774163}" type="datetimeFigureOut">
               <a:rPr lang="en-US" smtClean="0"/>
-              <a:t>6/29/2020</a:t>
+              <a:t>6/30/2020</a:t>
             </a:fld>
             <a:endParaRPr lang="en-US"/>
           </a:p>
@@ -2675,7 +2676,7 @@
           <a:p>
             <a:fld id="{6E923454-6E85-4B3A-B554-39B57C774163}" type="datetimeFigureOut">
               <a:rPr lang="en-US" smtClean="0"/>
-              <a:t>6/29/2020</a:t>
+              <a:t>6/30/2020</a:t>
             </a:fld>
             <a:endParaRPr lang="en-US"/>
           </a:p>
@@ -2916,7 +2917,7 @@
           <a:p>
             <a:fld id="{6E923454-6E85-4B3A-B554-39B57C774163}" type="datetimeFigureOut">
               <a:rPr lang="en-US" smtClean="0"/>
-              <a:t>6/29/2020</a:t>
+              <a:t>6/30/2020</a:t>
             </a:fld>
             <a:endParaRPr lang="en-US"/>
           </a:p>
@@ -9106,8 +9107,8 @@
         </p:nvSpPr>
         <p:spPr>
           <a:xfrm>
-            <a:off x="5459558" y="4739800"/>
-            <a:ext cx="1740232" cy="276999"/>
+            <a:off x="4785064" y="4739800"/>
+            <a:ext cx="2414726" cy="276999"/>
           </a:xfrm>
           <a:prstGeom prst="rect">
             <a:avLst/>
@@ -9143,6 +9144,18 @@
           <a:p>
             <a:pPr algn="ctr"/>
             <a:r>
+              <a:rPr lang="en-US" sz="1200" b="1" dirty="0" err="1">
+                <a:solidFill>
+                  <a:schemeClr val="tx1">
+                    <a:lumMod val="65000"/>
+                    <a:lumOff val="35000"/>
+                  </a:schemeClr>
+                </a:solidFill>
+                <a:latin typeface="Autumn Happiness" panose="03000600000000000000" pitchFamily="66" charset="0"/>
+              </a:rPr>
+              <a:t>takeTurn</a:t>
+            </a:r>
+            <a:r>
               <a:rPr lang="en-US" sz="1200" dirty="0">
                 <a:solidFill>
                   <a:schemeClr val="tx1">
@@ -9152,7 +9165,7 @@
                 </a:solidFill>
                 <a:latin typeface="Autumn Happiness" panose="03000600000000000000" pitchFamily="66" charset="0"/>
               </a:rPr>
-              <a:t>stateBeforeTurn, world</a:t>
+              <a:t>: stateBeforeTurn, world</a:t>
             </a:r>
           </a:p>
         </p:txBody>
@@ -9858,6 +9871,106 @@
     <p:extLst>
       <p:ext uri="{BB962C8B-B14F-4D97-AF65-F5344CB8AC3E}">
         <p14:creationId xmlns:p14="http://schemas.microsoft.com/office/powerpoint/2010/main" val="1848345511"/>
+      </p:ext>
+    </p:extLst>
+  </p:cSld>
+  <p:clrMapOvr>
+    <a:masterClrMapping/>
+  </p:clrMapOvr>
+</p:sld>
+</file>
+
+<file path=ppt/slides/slide9.xml><?xml version="1.0" encoding="utf-8"?>
+<p:sld xmlns:a="http://schemas.openxmlformats.org/drawingml/2006/main" xmlns:r="http://schemas.openxmlformats.org/officeDocument/2006/relationships" xmlns:p="http://schemas.openxmlformats.org/presentationml/2006/main">
+  <p:cSld>
+    <p:spTree>
+      <p:nvGrpSpPr>
+        <p:cNvPr id="1" name=""/>
+        <p:cNvGrpSpPr/>
+        <p:nvPr/>
+      </p:nvGrpSpPr>
+      <p:grpSpPr>
+        <a:xfrm>
+          <a:off x="0" y="0"/>
+          <a:ext cx="0" cy="0"/>
+          <a:chOff x="0" y="0"/>
+          <a:chExt cx="0" cy="0"/>
+        </a:xfrm>
+      </p:grpSpPr>
+      <p:sp>
+        <p:nvSpPr>
+          <p:cNvPr id="2" name="Title 1">
+            <a:extLst>
+              <a:ext uri="{FF2B5EF4-FFF2-40B4-BE49-F238E27FC236}">
+                <a16:creationId xmlns:a16="http://schemas.microsoft.com/office/drawing/2014/main" id="{9FE12167-031B-4758-8BB8-AA2ECB02E181}"/>
+              </a:ext>
+            </a:extLst>
+          </p:cNvPr>
+          <p:cNvSpPr>
+            <a:spLocks noGrp="1"/>
+          </p:cNvSpPr>
+          <p:nvPr>
+            <p:ph type="title"/>
+          </p:nvPr>
+        </p:nvSpPr>
+        <p:spPr/>
+        <p:txBody>
+          <a:bodyPr/>
+          <a:lstStyle/>
+          <a:p>
+            <a:r>
+              <a:rPr lang="en-US" dirty="0"/>
+              <a:t>Object locations</a:t>
+            </a:r>
+          </a:p>
+        </p:txBody>
+      </p:sp>
+      <p:sp>
+        <p:nvSpPr>
+          <p:cNvPr id="3" name="Content Placeholder 2">
+            <a:extLst>
+              <a:ext uri="{FF2B5EF4-FFF2-40B4-BE49-F238E27FC236}">
+                <a16:creationId xmlns:a16="http://schemas.microsoft.com/office/drawing/2014/main" id="{0E50C394-A9AD-459C-B2A3-D8789970D140}"/>
+              </a:ext>
+            </a:extLst>
+          </p:cNvPr>
+          <p:cNvSpPr>
+            <a:spLocks noGrp="1"/>
+          </p:cNvSpPr>
+          <p:nvPr>
+            <p:ph idx="1"/>
+          </p:nvPr>
+        </p:nvSpPr>
+        <p:spPr/>
+        <p:txBody>
+          <a:bodyPr/>
+          <a:lstStyle/>
+          <a:p>
+            <a:r>
+              <a:rPr lang="en-US" dirty="0"/>
+              <a:t>In each agent or resource, we will have a position property. But how will the game know about object positions? If we have iterate through the positions </a:t>
+            </a:r>
+            <a:r>
+              <a:rPr lang="en-US" dirty="0" err="1"/>
+              <a:t>everytime</a:t>
+            </a:r>
+            <a:r>
+              <a:rPr lang="en-US" dirty="0"/>
+              <a:t> we need it, it would be very slow. Can we raise an event if the position is changed in an object? A pub-sub architecture.</a:t>
+            </a:r>
+          </a:p>
+          <a:p>
+            <a:r>
+              <a:rPr lang="en-US" dirty="0"/>
+              <a:t>We cannot use reactive programming as we don’t have control over event synchronization. We can use async programming to create coroutines and wait for all the tasks in a turn to be completed.</a:t>
+            </a:r>
+          </a:p>
+        </p:txBody>
+      </p:sp>
+    </p:spTree>
+    <p:extLst>
+      <p:ext uri="{BB962C8B-B14F-4D97-AF65-F5344CB8AC3E}">
+        <p14:creationId xmlns:p14="http://schemas.microsoft.com/office/powerpoint/2010/main" val="1241753297"/>
       </p:ext>
     </p:extLst>
   </p:cSld>

</xml_diff>

<commit_message>
added TODOS for all members
</commit_message>
<xml_diff>
--- a/docs/Architecture.pptx
+++ b/docs/Architecture.pptx
@@ -12,8 +12,9 @@
     <p:sldId id="260" r:id="rId6"/>
     <p:sldId id="261" r:id="rId7"/>
     <p:sldId id="262" r:id="rId8"/>
-    <p:sldId id="263" r:id="rId9"/>
-    <p:sldId id="264" r:id="rId10"/>
+    <p:sldId id="265" r:id="rId9"/>
+    <p:sldId id="263" r:id="rId10"/>
+    <p:sldId id="264" r:id="rId11"/>
   </p:sldIdLst>
   <p:sldSz cx="12192000" cy="6858000"/>
   <p:notesSz cx="6858000" cy="9144000"/>
@@ -267,7 +268,7 @@
           <a:p>
             <a:fld id="{6E923454-6E85-4B3A-B554-39B57C774163}" type="datetimeFigureOut">
               <a:rPr lang="en-US" smtClean="0"/>
-              <a:t>6/30/2020</a:t>
+              <a:t>7/14/2020</a:t>
             </a:fld>
             <a:endParaRPr lang="en-US"/>
           </a:p>
@@ -465,7 +466,7 @@
           <a:p>
             <a:fld id="{6E923454-6E85-4B3A-B554-39B57C774163}" type="datetimeFigureOut">
               <a:rPr lang="en-US" smtClean="0"/>
-              <a:t>6/30/2020</a:t>
+              <a:t>7/14/2020</a:t>
             </a:fld>
             <a:endParaRPr lang="en-US"/>
           </a:p>
@@ -673,7 +674,7 @@
           <a:p>
             <a:fld id="{6E923454-6E85-4B3A-B554-39B57C774163}" type="datetimeFigureOut">
               <a:rPr lang="en-US" smtClean="0"/>
-              <a:t>6/30/2020</a:t>
+              <a:t>7/14/2020</a:t>
             </a:fld>
             <a:endParaRPr lang="en-US"/>
           </a:p>
@@ -871,7 +872,7 @@
           <a:p>
             <a:fld id="{6E923454-6E85-4B3A-B554-39B57C774163}" type="datetimeFigureOut">
               <a:rPr lang="en-US" smtClean="0"/>
-              <a:t>6/30/2020</a:t>
+              <a:t>7/14/2020</a:t>
             </a:fld>
             <a:endParaRPr lang="en-US"/>
           </a:p>
@@ -1146,7 +1147,7 @@
           <a:p>
             <a:fld id="{6E923454-6E85-4B3A-B554-39B57C774163}" type="datetimeFigureOut">
               <a:rPr lang="en-US" smtClean="0"/>
-              <a:t>6/30/2020</a:t>
+              <a:t>7/14/2020</a:t>
             </a:fld>
             <a:endParaRPr lang="en-US"/>
           </a:p>
@@ -1411,7 +1412,7 @@
           <a:p>
             <a:fld id="{6E923454-6E85-4B3A-B554-39B57C774163}" type="datetimeFigureOut">
               <a:rPr lang="en-US" smtClean="0"/>
-              <a:t>6/30/2020</a:t>
+              <a:t>7/14/2020</a:t>
             </a:fld>
             <a:endParaRPr lang="en-US"/>
           </a:p>
@@ -1823,7 +1824,7 @@
           <a:p>
             <a:fld id="{6E923454-6E85-4B3A-B554-39B57C774163}" type="datetimeFigureOut">
               <a:rPr lang="en-US" smtClean="0"/>
-              <a:t>6/30/2020</a:t>
+              <a:t>7/14/2020</a:t>
             </a:fld>
             <a:endParaRPr lang="en-US"/>
           </a:p>
@@ -1964,7 +1965,7 @@
           <a:p>
             <a:fld id="{6E923454-6E85-4B3A-B554-39B57C774163}" type="datetimeFigureOut">
               <a:rPr lang="en-US" smtClean="0"/>
-              <a:t>6/30/2020</a:t>
+              <a:t>7/14/2020</a:t>
             </a:fld>
             <a:endParaRPr lang="en-US"/>
           </a:p>
@@ -2077,7 +2078,7 @@
           <a:p>
             <a:fld id="{6E923454-6E85-4B3A-B554-39B57C774163}" type="datetimeFigureOut">
               <a:rPr lang="en-US" smtClean="0"/>
-              <a:t>6/30/2020</a:t>
+              <a:t>7/14/2020</a:t>
             </a:fld>
             <a:endParaRPr lang="en-US"/>
           </a:p>
@@ -2388,7 +2389,7 @@
           <a:p>
             <a:fld id="{6E923454-6E85-4B3A-B554-39B57C774163}" type="datetimeFigureOut">
               <a:rPr lang="en-US" smtClean="0"/>
-              <a:t>6/30/2020</a:t>
+              <a:t>7/14/2020</a:t>
             </a:fld>
             <a:endParaRPr lang="en-US"/>
           </a:p>
@@ -2676,7 +2677,7 @@
           <a:p>
             <a:fld id="{6E923454-6E85-4B3A-B554-39B57C774163}" type="datetimeFigureOut">
               <a:rPr lang="en-US" smtClean="0"/>
-              <a:t>6/30/2020</a:t>
+              <a:t>7/14/2020</a:t>
             </a:fld>
             <a:endParaRPr lang="en-US"/>
           </a:p>
@@ -2917,7 +2918,7 @@
           <a:p>
             <a:fld id="{6E923454-6E85-4B3A-B554-39B57C774163}" type="datetimeFigureOut">
               <a:rPr lang="en-US" smtClean="0"/>
-              <a:t>6/30/2020</a:t>
+              <a:t>7/14/2020</a:t>
             </a:fld>
             <a:endParaRPr lang="en-US"/>
           </a:p>
@@ -4391,6 +4392,106 @@
     <p:extLst>
       <p:ext uri="{BB962C8B-B14F-4D97-AF65-F5344CB8AC3E}">
         <p14:creationId xmlns:p14="http://schemas.microsoft.com/office/powerpoint/2010/main" val="1595045332"/>
+      </p:ext>
+    </p:extLst>
+  </p:cSld>
+  <p:clrMapOvr>
+    <a:masterClrMapping/>
+  </p:clrMapOvr>
+</p:sld>
+</file>
+
+<file path=ppt/slides/slide10.xml><?xml version="1.0" encoding="utf-8"?>
+<p:sld xmlns:a="http://schemas.openxmlformats.org/drawingml/2006/main" xmlns:r="http://schemas.openxmlformats.org/officeDocument/2006/relationships" xmlns:p="http://schemas.openxmlformats.org/presentationml/2006/main">
+  <p:cSld>
+    <p:spTree>
+      <p:nvGrpSpPr>
+        <p:cNvPr id="1" name=""/>
+        <p:cNvGrpSpPr/>
+        <p:nvPr/>
+      </p:nvGrpSpPr>
+      <p:grpSpPr>
+        <a:xfrm>
+          <a:off x="0" y="0"/>
+          <a:ext cx="0" cy="0"/>
+          <a:chOff x="0" y="0"/>
+          <a:chExt cx="0" cy="0"/>
+        </a:xfrm>
+      </p:grpSpPr>
+      <p:sp>
+        <p:nvSpPr>
+          <p:cNvPr id="2" name="Title 1">
+            <a:extLst>
+              <a:ext uri="{FF2B5EF4-FFF2-40B4-BE49-F238E27FC236}">
+                <a16:creationId xmlns:a16="http://schemas.microsoft.com/office/drawing/2014/main" id="{9FE12167-031B-4758-8BB8-AA2ECB02E181}"/>
+              </a:ext>
+            </a:extLst>
+          </p:cNvPr>
+          <p:cNvSpPr>
+            <a:spLocks noGrp="1"/>
+          </p:cNvSpPr>
+          <p:nvPr>
+            <p:ph type="title"/>
+          </p:nvPr>
+        </p:nvSpPr>
+        <p:spPr/>
+        <p:txBody>
+          <a:bodyPr/>
+          <a:lstStyle/>
+          <a:p>
+            <a:r>
+              <a:rPr lang="en-US" dirty="0"/>
+              <a:t>Object locations</a:t>
+            </a:r>
+          </a:p>
+        </p:txBody>
+      </p:sp>
+      <p:sp>
+        <p:nvSpPr>
+          <p:cNvPr id="3" name="Content Placeholder 2">
+            <a:extLst>
+              <a:ext uri="{FF2B5EF4-FFF2-40B4-BE49-F238E27FC236}">
+                <a16:creationId xmlns:a16="http://schemas.microsoft.com/office/drawing/2014/main" id="{0E50C394-A9AD-459C-B2A3-D8789970D140}"/>
+              </a:ext>
+            </a:extLst>
+          </p:cNvPr>
+          <p:cNvSpPr>
+            <a:spLocks noGrp="1"/>
+          </p:cNvSpPr>
+          <p:nvPr>
+            <p:ph idx="1"/>
+          </p:nvPr>
+        </p:nvSpPr>
+        <p:spPr/>
+        <p:txBody>
+          <a:bodyPr/>
+          <a:lstStyle/>
+          <a:p>
+            <a:r>
+              <a:rPr lang="en-US" dirty="0"/>
+              <a:t>In each agent or resource, we will have a position property. But how will the game know about object positions? If we have iterate through the positions </a:t>
+            </a:r>
+            <a:r>
+              <a:rPr lang="en-US" dirty="0" err="1"/>
+              <a:t>everytime</a:t>
+            </a:r>
+            <a:r>
+              <a:rPr lang="en-US" dirty="0"/>
+              <a:t> we need it, it would be very slow. Can we raise an event if the position is changed in an object? A pub-sub architecture.</a:t>
+            </a:r>
+          </a:p>
+          <a:p>
+            <a:r>
+              <a:rPr lang="en-US" dirty="0"/>
+              <a:t>We cannot use reactive programming as we don’t have control over event synchronization. We can use async programming to create coroutines and wait for all the tasks in a turn to be completed.</a:t>
+            </a:r>
+          </a:p>
+        </p:txBody>
+      </p:sp>
+    </p:spTree>
+    <p:extLst>
+      <p:ext uri="{BB962C8B-B14F-4D97-AF65-F5344CB8AC3E}">
+        <p14:creationId xmlns:p14="http://schemas.microsoft.com/office/powerpoint/2010/main" val="1241753297"/>
       </p:ext>
     </p:extLst>
   </p:cSld>
@@ -8888,6 +8989,1684 @@
           <a:chExt cx="0" cy="0"/>
         </a:xfrm>
       </p:grpSpPr>
+      <p:graphicFrame>
+        <p:nvGraphicFramePr>
+          <p:cNvPr id="4" name="Table 4">
+            <a:extLst>
+              <a:ext uri="{FF2B5EF4-FFF2-40B4-BE49-F238E27FC236}">
+                <a16:creationId xmlns:a16="http://schemas.microsoft.com/office/drawing/2014/main" id="{ECD6114C-848F-4429-B966-2C70AFDC855B}"/>
+              </a:ext>
+            </a:extLst>
+          </p:cNvPr>
+          <p:cNvGraphicFramePr>
+            <a:graphicFrameLocks noGrp="1"/>
+          </p:cNvGraphicFramePr>
+          <p:nvPr/>
+        </p:nvGraphicFramePr>
+        <p:xfrm>
+          <a:off x="2032000" y="719664"/>
+          <a:ext cx="5158916" cy="5033064"/>
+        </p:xfrm>
+        <a:graphic>
+          <a:graphicData uri="http://schemas.openxmlformats.org/drawingml/2006/table">
+            <a:tbl>
+              <a:tblPr firstRow="1" bandRow="1">
+                <a:tableStyleId>{8799B23B-EC83-4686-B30A-512413B5E67A}</a:tableStyleId>
+              </a:tblPr>
+              <a:tblGrid>
+                <a:gridCol w="736988">
+                  <a:extLst>
+                    <a:ext uri="{9D8B030D-6E8A-4147-A177-3AD203B41FA5}">
+                      <a16:colId xmlns:a16="http://schemas.microsoft.com/office/drawing/2014/main" val="1341759314"/>
+                    </a:ext>
+                  </a:extLst>
+                </a:gridCol>
+                <a:gridCol w="736988">
+                  <a:extLst>
+                    <a:ext uri="{9D8B030D-6E8A-4147-A177-3AD203B41FA5}">
+                      <a16:colId xmlns:a16="http://schemas.microsoft.com/office/drawing/2014/main" val="2603281598"/>
+                    </a:ext>
+                  </a:extLst>
+                </a:gridCol>
+                <a:gridCol w="736988">
+                  <a:extLst>
+                    <a:ext uri="{9D8B030D-6E8A-4147-A177-3AD203B41FA5}">
+                      <a16:colId xmlns:a16="http://schemas.microsoft.com/office/drawing/2014/main" val="3166620574"/>
+                    </a:ext>
+                  </a:extLst>
+                </a:gridCol>
+                <a:gridCol w="736988">
+                  <a:extLst>
+                    <a:ext uri="{9D8B030D-6E8A-4147-A177-3AD203B41FA5}">
+                      <a16:colId xmlns:a16="http://schemas.microsoft.com/office/drawing/2014/main" val="3756706871"/>
+                    </a:ext>
+                  </a:extLst>
+                </a:gridCol>
+                <a:gridCol w="736988">
+                  <a:extLst>
+                    <a:ext uri="{9D8B030D-6E8A-4147-A177-3AD203B41FA5}">
+                      <a16:colId xmlns:a16="http://schemas.microsoft.com/office/drawing/2014/main" val="540176328"/>
+                    </a:ext>
+                  </a:extLst>
+                </a:gridCol>
+                <a:gridCol w="736988">
+                  <a:extLst>
+                    <a:ext uri="{9D8B030D-6E8A-4147-A177-3AD203B41FA5}">
+                      <a16:colId xmlns:a16="http://schemas.microsoft.com/office/drawing/2014/main" val="2930165247"/>
+                    </a:ext>
+                  </a:extLst>
+                </a:gridCol>
+                <a:gridCol w="736988">
+                  <a:extLst>
+                    <a:ext uri="{9D8B030D-6E8A-4147-A177-3AD203B41FA5}">
+                      <a16:colId xmlns:a16="http://schemas.microsoft.com/office/drawing/2014/main" val="4031564219"/>
+                    </a:ext>
+                  </a:extLst>
+                </a:gridCol>
+              </a:tblGrid>
+              <a:tr h="629133">
+                <a:tc>
+                  <a:txBody>
+                    <a:bodyPr/>
+                    <a:lstStyle/>
+                    <a:p>
+                      <a:endParaRPr lang="en-US"/>
+                    </a:p>
+                  </a:txBody>
+                  <a:tcPr/>
+                </a:tc>
+                <a:tc>
+                  <a:txBody>
+                    <a:bodyPr/>
+                    <a:lstStyle/>
+                    <a:p>
+                      <a:endParaRPr lang="en-US"/>
+                    </a:p>
+                  </a:txBody>
+                  <a:tcPr/>
+                </a:tc>
+                <a:tc>
+                  <a:txBody>
+                    <a:bodyPr/>
+                    <a:lstStyle/>
+                    <a:p>
+                      <a:endParaRPr lang="en-US"/>
+                    </a:p>
+                  </a:txBody>
+                  <a:tcPr/>
+                </a:tc>
+                <a:tc>
+                  <a:txBody>
+                    <a:bodyPr/>
+                    <a:lstStyle/>
+                    <a:p>
+                      <a:endParaRPr lang="en-US"/>
+                    </a:p>
+                  </a:txBody>
+                  <a:tcPr/>
+                </a:tc>
+                <a:tc>
+                  <a:txBody>
+                    <a:bodyPr/>
+                    <a:lstStyle/>
+                    <a:p>
+                      <a:endParaRPr lang="en-US"/>
+                    </a:p>
+                  </a:txBody>
+                  <a:tcPr/>
+                </a:tc>
+                <a:tc>
+                  <a:txBody>
+                    <a:bodyPr/>
+                    <a:lstStyle/>
+                    <a:p>
+                      <a:endParaRPr lang="en-US"/>
+                    </a:p>
+                  </a:txBody>
+                  <a:tcPr/>
+                </a:tc>
+                <a:tc>
+                  <a:txBody>
+                    <a:bodyPr/>
+                    <a:lstStyle/>
+                    <a:p>
+                      <a:endParaRPr lang="en-US"/>
+                    </a:p>
+                  </a:txBody>
+                  <a:tcPr/>
+                </a:tc>
+                <a:extLst>
+                  <a:ext uri="{0D108BD9-81ED-4DB2-BD59-A6C34878D82A}">
+                    <a16:rowId xmlns:a16="http://schemas.microsoft.com/office/drawing/2014/main" val="3076864120"/>
+                  </a:ext>
+                </a:extLst>
+              </a:tr>
+              <a:tr h="629133">
+                <a:tc>
+                  <a:txBody>
+                    <a:bodyPr/>
+                    <a:lstStyle/>
+                    <a:p>
+                      <a:endParaRPr lang="en-US" dirty="0"/>
+                    </a:p>
+                  </a:txBody>
+                  <a:tcPr/>
+                </a:tc>
+                <a:tc>
+                  <a:txBody>
+                    <a:bodyPr/>
+                    <a:lstStyle/>
+                    <a:p>
+                      <a:endParaRPr lang="en-US"/>
+                    </a:p>
+                  </a:txBody>
+                  <a:tcPr/>
+                </a:tc>
+                <a:tc>
+                  <a:txBody>
+                    <a:bodyPr/>
+                    <a:lstStyle/>
+                    <a:p>
+                      <a:endParaRPr lang="en-US"/>
+                    </a:p>
+                  </a:txBody>
+                  <a:tcPr/>
+                </a:tc>
+                <a:tc>
+                  <a:txBody>
+                    <a:bodyPr/>
+                    <a:lstStyle/>
+                    <a:p>
+                      <a:endParaRPr lang="en-US"/>
+                    </a:p>
+                  </a:txBody>
+                  <a:tcPr/>
+                </a:tc>
+                <a:tc>
+                  <a:txBody>
+                    <a:bodyPr/>
+                    <a:lstStyle/>
+                    <a:p>
+                      <a:endParaRPr lang="en-US"/>
+                    </a:p>
+                  </a:txBody>
+                  <a:tcPr/>
+                </a:tc>
+                <a:tc>
+                  <a:txBody>
+                    <a:bodyPr/>
+                    <a:lstStyle/>
+                    <a:p>
+                      <a:endParaRPr lang="en-US"/>
+                    </a:p>
+                  </a:txBody>
+                  <a:tcPr/>
+                </a:tc>
+                <a:tc>
+                  <a:txBody>
+                    <a:bodyPr/>
+                    <a:lstStyle/>
+                    <a:p>
+                      <a:endParaRPr lang="en-US"/>
+                    </a:p>
+                  </a:txBody>
+                  <a:tcPr/>
+                </a:tc>
+                <a:extLst>
+                  <a:ext uri="{0D108BD9-81ED-4DB2-BD59-A6C34878D82A}">
+                    <a16:rowId xmlns:a16="http://schemas.microsoft.com/office/drawing/2014/main" val="3805616097"/>
+                  </a:ext>
+                </a:extLst>
+              </a:tr>
+              <a:tr h="629133">
+                <a:tc>
+                  <a:txBody>
+                    <a:bodyPr/>
+                    <a:lstStyle/>
+                    <a:p>
+                      <a:endParaRPr lang="en-US"/>
+                    </a:p>
+                  </a:txBody>
+                  <a:tcPr/>
+                </a:tc>
+                <a:tc>
+                  <a:txBody>
+                    <a:bodyPr/>
+                    <a:lstStyle/>
+                    <a:p>
+                      <a:endParaRPr lang="en-US"/>
+                    </a:p>
+                  </a:txBody>
+                  <a:tcPr/>
+                </a:tc>
+                <a:tc>
+                  <a:txBody>
+                    <a:bodyPr/>
+                    <a:lstStyle/>
+                    <a:p>
+                      <a:endParaRPr lang="en-US"/>
+                    </a:p>
+                  </a:txBody>
+                  <a:tcPr/>
+                </a:tc>
+                <a:tc>
+                  <a:txBody>
+                    <a:bodyPr/>
+                    <a:lstStyle/>
+                    <a:p>
+                      <a:endParaRPr lang="en-US"/>
+                    </a:p>
+                  </a:txBody>
+                  <a:tcPr/>
+                </a:tc>
+                <a:tc>
+                  <a:txBody>
+                    <a:bodyPr/>
+                    <a:lstStyle/>
+                    <a:p>
+                      <a:endParaRPr lang="en-US"/>
+                    </a:p>
+                  </a:txBody>
+                  <a:tcPr/>
+                </a:tc>
+                <a:tc>
+                  <a:txBody>
+                    <a:bodyPr/>
+                    <a:lstStyle/>
+                    <a:p>
+                      <a:endParaRPr lang="en-US"/>
+                    </a:p>
+                  </a:txBody>
+                  <a:tcPr/>
+                </a:tc>
+                <a:tc>
+                  <a:txBody>
+                    <a:bodyPr/>
+                    <a:lstStyle/>
+                    <a:p>
+                      <a:endParaRPr lang="en-US"/>
+                    </a:p>
+                  </a:txBody>
+                  <a:tcPr/>
+                </a:tc>
+                <a:extLst>
+                  <a:ext uri="{0D108BD9-81ED-4DB2-BD59-A6C34878D82A}">
+                    <a16:rowId xmlns:a16="http://schemas.microsoft.com/office/drawing/2014/main" val="27235849"/>
+                  </a:ext>
+                </a:extLst>
+              </a:tr>
+              <a:tr h="629133">
+                <a:tc>
+                  <a:txBody>
+                    <a:bodyPr/>
+                    <a:lstStyle/>
+                    <a:p>
+                      <a:endParaRPr lang="en-US"/>
+                    </a:p>
+                  </a:txBody>
+                  <a:tcPr/>
+                </a:tc>
+                <a:tc>
+                  <a:txBody>
+                    <a:bodyPr/>
+                    <a:lstStyle/>
+                    <a:p>
+                      <a:endParaRPr lang="en-US"/>
+                    </a:p>
+                  </a:txBody>
+                  <a:tcPr/>
+                </a:tc>
+                <a:tc>
+                  <a:txBody>
+                    <a:bodyPr/>
+                    <a:lstStyle/>
+                    <a:p>
+                      <a:endParaRPr lang="en-US"/>
+                    </a:p>
+                  </a:txBody>
+                  <a:tcPr/>
+                </a:tc>
+                <a:tc>
+                  <a:txBody>
+                    <a:bodyPr/>
+                    <a:lstStyle/>
+                    <a:p>
+                      <a:endParaRPr lang="en-US"/>
+                    </a:p>
+                  </a:txBody>
+                  <a:tcPr/>
+                </a:tc>
+                <a:tc>
+                  <a:txBody>
+                    <a:bodyPr/>
+                    <a:lstStyle/>
+                    <a:p>
+                      <a:endParaRPr lang="en-US" dirty="0"/>
+                    </a:p>
+                  </a:txBody>
+                  <a:tcPr/>
+                </a:tc>
+                <a:tc>
+                  <a:txBody>
+                    <a:bodyPr/>
+                    <a:lstStyle/>
+                    <a:p>
+                      <a:endParaRPr lang="en-US" dirty="0"/>
+                    </a:p>
+                  </a:txBody>
+                  <a:tcPr/>
+                </a:tc>
+                <a:tc>
+                  <a:txBody>
+                    <a:bodyPr/>
+                    <a:lstStyle/>
+                    <a:p>
+                      <a:endParaRPr lang="en-US"/>
+                    </a:p>
+                  </a:txBody>
+                  <a:tcPr/>
+                </a:tc>
+                <a:extLst>
+                  <a:ext uri="{0D108BD9-81ED-4DB2-BD59-A6C34878D82A}">
+                    <a16:rowId xmlns:a16="http://schemas.microsoft.com/office/drawing/2014/main" val="3712690486"/>
+                  </a:ext>
+                </a:extLst>
+              </a:tr>
+              <a:tr h="629133">
+                <a:tc>
+                  <a:txBody>
+                    <a:bodyPr/>
+                    <a:lstStyle/>
+                    <a:p>
+                      <a:endParaRPr lang="en-US"/>
+                    </a:p>
+                  </a:txBody>
+                  <a:tcPr/>
+                </a:tc>
+                <a:tc>
+                  <a:txBody>
+                    <a:bodyPr/>
+                    <a:lstStyle/>
+                    <a:p>
+                      <a:endParaRPr lang="en-US"/>
+                    </a:p>
+                  </a:txBody>
+                  <a:tcPr/>
+                </a:tc>
+                <a:tc>
+                  <a:txBody>
+                    <a:bodyPr/>
+                    <a:lstStyle/>
+                    <a:p>
+                      <a:endParaRPr lang="en-US"/>
+                    </a:p>
+                  </a:txBody>
+                  <a:tcPr/>
+                </a:tc>
+                <a:tc>
+                  <a:txBody>
+                    <a:bodyPr/>
+                    <a:lstStyle/>
+                    <a:p>
+                      <a:endParaRPr lang="en-US"/>
+                    </a:p>
+                  </a:txBody>
+                  <a:tcPr/>
+                </a:tc>
+                <a:tc>
+                  <a:txBody>
+                    <a:bodyPr/>
+                    <a:lstStyle/>
+                    <a:p>
+                      <a:endParaRPr lang="en-US"/>
+                    </a:p>
+                  </a:txBody>
+                  <a:tcPr/>
+                </a:tc>
+                <a:tc>
+                  <a:txBody>
+                    <a:bodyPr/>
+                    <a:lstStyle/>
+                    <a:p>
+                      <a:endParaRPr lang="en-US"/>
+                    </a:p>
+                  </a:txBody>
+                  <a:tcPr/>
+                </a:tc>
+                <a:tc>
+                  <a:txBody>
+                    <a:bodyPr/>
+                    <a:lstStyle/>
+                    <a:p>
+                      <a:endParaRPr lang="en-US"/>
+                    </a:p>
+                  </a:txBody>
+                  <a:tcPr/>
+                </a:tc>
+                <a:extLst>
+                  <a:ext uri="{0D108BD9-81ED-4DB2-BD59-A6C34878D82A}">
+                    <a16:rowId xmlns:a16="http://schemas.microsoft.com/office/drawing/2014/main" val="957283354"/>
+                  </a:ext>
+                </a:extLst>
+              </a:tr>
+              <a:tr h="629133">
+                <a:tc>
+                  <a:txBody>
+                    <a:bodyPr/>
+                    <a:lstStyle/>
+                    <a:p>
+                      <a:endParaRPr lang="en-US"/>
+                    </a:p>
+                  </a:txBody>
+                  <a:tcPr/>
+                </a:tc>
+                <a:tc>
+                  <a:txBody>
+                    <a:bodyPr/>
+                    <a:lstStyle/>
+                    <a:p>
+                      <a:endParaRPr lang="en-US"/>
+                    </a:p>
+                  </a:txBody>
+                  <a:tcPr/>
+                </a:tc>
+                <a:tc>
+                  <a:txBody>
+                    <a:bodyPr/>
+                    <a:lstStyle/>
+                    <a:p>
+                      <a:endParaRPr lang="en-US"/>
+                    </a:p>
+                  </a:txBody>
+                  <a:tcPr/>
+                </a:tc>
+                <a:tc>
+                  <a:txBody>
+                    <a:bodyPr/>
+                    <a:lstStyle/>
+                    <a:p>
+                      <a:endParaRPr lang="en-US"/>
+                    </a:p>
+                  </a:txBody>
+                  <a:tcPr/>
+                </a:tc>
+                <a:tc>
+                  <a:txBody>
+                    <a:bodyPr/>
+                    <a:lstStyle/>
+                    <a:p>
+                      <a:endParaRPr lang="en-US" dirty="0"/>
+                    </a:p>
+                  </a:txBody>
+                  <a:tcPr/>
+                </a:tc>
+                <a:tc>
+                  <a:txBody>
+                    <a:bodyPr/>
+                    <a:lstStyle/>
+                    <a:p>
+                      <a:endParaRPr lang="en-US"/>
+                    </a:p>
+                  </a:txBody>
+                  <a:tcPr/>
+                </a:tc>
+                <a:tc>
+                  <a:txBody>
+                    <a:bodyPr/>
+                    <a:lstStyle/>
+                    <a:p>
+                      <a:endParaRPr lang="en-US" dirty="0"/>
+                    </a:p>
+                  </a:txBody>
+                  <a:tcPr/>
+                </a:tc>
+                <a:extLst>
+                  <a:ext uri="{0D108BD9-81ED-4DB2-BD59-A6C34878D82A}">
+                    <a16:rowId xmlns:a16="http://schemas.microsoft.com/office/drawing/2014/main" val="4070635010"/>
+                  </a:ext>
+                </a:extLst>
+              </a:tr>
+              <a:tr h="629133">
+                <a:tc>
+                  <a:txBody>
+                    <a:bodyPr/>
+                    <a:lstStyle/>
+                    <a:p>
+                      <a:endParaRPr lang="en-US"/>
+                    </a:p>
+                  </a:txBody>
+                  <a:tcPr/>
+                </a:tc>
+                <a:tc>
+                  <a:txBody>
+                    <a:bodyPr/>
+                    <a:lstStyle/>
+                    <a:p>
+                      <a:endParaRPr lang="en-US"/>
+                    </a:p>
+                  </a:txBody>
+                  <a:tcPr/>
+                </a:tc>
+                <a:tc>
+                  <a:txBody>
+                    <a:bodyPr/>
+                    <a:lstStyle/>
+                    <a:p>
+                      <a:endParaRPr lang="en-US" dirty="0"/>
+                    </a:p>
+                  </a:txBody>
+                  <a:tcPr/>
+                </a:tc>
+                <a:tc>
+                  <a:txBody>
+                    <a:bodyPr/>
+                    <a:lstStyle/>
+                    <a:p>
+                      <a:endParaRPr lang="en-US" dirty="0"/>
+                    </a:p>
+                  </a:txBody>
+                  <a:tcPr/>
+                </a:tc>
+                <a:tc>
+                  <a:txBody>
+                    <a:bodyPr/>
+                    <a:lstStyle/>
+                    <a:p>
+                      <a:endParaRPr lang="en-US" dirty="0"/>
+                    </a:p>
+                  </a:txBody>
+                  <a:tcPr/>
+                </a:tc>
+                <a:tc>
+                  <a:txBody>
+                    <a:bodyPr/>
+                    <a:lstStyle/>
+                    <a:p>
+                      <a:endParaRPr lang="en-US" dirty="0"/>
+                    </a:p>
+                  </a:txBody>
+                  <a:tcPr/>
+                </a:tc>
+                <a:tc>
+                  <a:txBody>
+                    <a:bodyPr/>
+                    <a:lstStyle/>
+                    <a:p>
+                      <a:endParaRPr lang="en-US" dirty="0"/>
+                    </a:p>
+                  </a:txBody>
+                  <a:tcPr/>
+                </a:tc>
+                <a:extLst>
+                  <a:ext uri="{0D108BD9-81ED-4DB2-BD59-A6C34878D82A}">
+                    <a16:rowId xmlns:a16="http://schemas.microsoft.com/office/drawing/2014/main" val="3555388192"/>
+                  </a:ext>
+                </a:extLst>
+              </a:tr>
+              <a:tr h="629133">
+                <a:tc>
+                  <a:txBody>
+                    <a:bodyPr/>
+                    <a:lstStyle/>
+                    <a:p>
+                      <a:endParaRPr lang="en-US"/>
+                    </a:p>
+                  </a:txBody>
+                  <a:tcPr/>
+                </a:tc>
+                <a:tc>
+                  <a:txBody>
+                    <a:bodyPr/>
+                    <a:lstStyle/>
+                    <a:p>
+                      <a:endParaRPr lang="en-US"/>
+                    </a:p>
+                  </a:txBody>
+                  <a:tcPr/>
+                </a:tc>
+                <a:tc>
+                  <a:txBody>
+                    <a:bodyPr/>
+                    <a:lstStyle/>
+                    <a:p>
+                      <a:endParaRPr lang="en-US"/>
+                    </a:p>
+                  </a:txBody>
+                  <a:tcPr/>
+                </a:tc>
+                <a:tc>
+                  <a:txBody>
+                    <a:bodyPr/>
+                    <a:lstStyle/>
+                    <a:p>
+                      <a:endParaRPr lang="en-US"/>
+                    </a:p>
+                  </a:txBody>
+                  <a:tcPr/>
+                </a:tc>
+                <a:tc>
+                  <a:txBody>
+                    <a:bodyPr/>
+                    <a:lstStyle/>
+                    <a:p>
+                      <a:endParaRPr lang="en-US" dirty="0"/>
+                    </a:p>
+                  </a:txBody>
+                  <a:tcPr/>
+                </a:tc>
+                <a:tc>
+                  <a:txBody>
+                    <a:bodyPr/>
+                    <a:lstStyle/>
+                    <a:p>
+                      <a:endParaRPr lang="en-US" dirty="0"/>
+                    </a:p>
+                  </a:txBody>
+                  <a:tcPr/>
+                </a:tc>
+                <a:tc>
+                  <a:txBody>
+                    <a:bodyPr/>
+                    <a:lstStyle/>
+                    <a:p>
+                      <a:endParaRPr lang="en-US" dirty="0"/>
+                    </a:p>
+                  </a:txBody>
+                  <a:tcPr/>
+                </a:tc>
+                <a:extLst>
+                  <a:ext uri="{0D108BD9-81ED-4DB2-BD59-A6C34878D82A}">
+                    <a16:rowId xmlns:a16="http://schemas.microsoft.com/office/drawing/2014/main" val="1261802608"/>
+                  </a:ext>
+                </a:extLst>
+              </a:tr>
+            </a:tbl>
+          </a:graphicData>
+        </a:graphic>
+      </p:graphicFrame>
+      <p:pic>
+        <p:nvPicPr>
+          <p:cNvPr id="7" name="Graphic 6" descr="Gold bars">
+            <a:extLst>
+              <a:ext uri="{FF2B5EF4-FFF2-40B4-BE49-F238E27FC236}">
+                <a16:creationId xmlns:a16="http://schemas.microsoft.com/office/drawing/2014/main" id="{0BB5A287-5DE3-4DB1-AAA5-7536DA872E5E}"/>
+              </a:ext>
+            </a:extLst>
+          </p:cNvPr>
+          <p:cNvPicPr>
+            <a:picLocks noChangeAspect="1"/>
+          </p:cNvPicPr>
+          <p:nvPr/>
+        </p:nvPicPr>
+        <p:blipFill>
+          <a:blip r:embed="rId2">
+            <a:extLst>
+              <a:ext uri="{28A0092B-C50C-407E-A947-70E740481C1C}">
+                <a14:useLocalDpi xmlns:a14="http://schemas.microsoft.com/office/drawing/2010/main" val="0"/>
+              </a:ext>
+              <a:ext uri="{96DAC541-7B7A-43D3-8B79-37D633B846F1}">
+                <asvg:svgBlip xmlns:asvg="http://schemas.microsoft.com/office/drawing/2016/SVG/main" r:embed="rId3"/>
+              </a:ext>
+            </a:extLst>
+          </a:blip>
+          <a:stretch>
+            <a:fillRect/>
+          </a:stretch>
+        </p:blipFill>
+        <p:spPr>
+          <a:xfrm>
+            <a:off x="3738979" y="3429000"/>
+            <a:ext cx="286305" cy="286305"/>
+          </a:xfrm>
+          <a:prstGeom prst="rect">
+            <a:avLst/>
+          </a:prstGeom>
+        </p:spPr>
+      </p:pic>
+      <p:pic>
+        <p:nvPicPr>
+          <p:cNvPr id="9" name="Graphic 8" descr="Gold bars">
+            <a:extLst>
+              <a:ext uri="{FF2B5EF4-FFF2-40B4-BE49-F238E27FC236}">
+                <a16:creationId xmlns:a16="http://schemas.microsoft.com/office/drawing/2014/main" id="{60A971DB-B0D3-43ED-8546-50FDAA7CB53D}"/>
+              </a:ext>
+            </a:extLst>
+          </p:cNvPr>
+          <p:cNvPicPr>
+            <a:picLocks noChangeAspect="1"/>
+          </p:cNvPicPr>
+          <p:nvPr/>
+        </p:nvPicPr>
+        <p:blipFill>
+          <a:blip r:embed="rId4">
+            <a:extLst>
+              <a:ext uri="{28A0092B-C50C-407E-A947-70E740481C1C}">
+                <a14:useLocalDpi xmlns:a14="http://schemas.microsoft.com/office/drawing/2010/main" val="0"/>
+              </a:ext>
+              <a:ext uri="{96DAC541-7B7A-43D3-8B79-37D633B846F1}">
+                <asvg:svgBlip xmlns:asvg="http://schemas.microsoft.com/office/drawing/2016/SVG/main" r:embed="rId5"/>
+              </a:ext>
+            </a:extLst>
+          </a:blip>
+          <a:stretch>
+            <a:fillRect/>
+          </a:stretch>
+        </p:blipFill>
+        <p:spPr>
+          <a:xfrm>
+            <a:off x="5952847" y="1530659"/>
+            <a:ext cx="286305" cy="286305"/>
+          </a:xfrm>
+          <a:prstGeom prst="rect">
+            <a:avLst/>
+          </a:prstGeom>
+        </p:spPr>
+      </p:pic>
+      <p:pic>
+        <p:nvPicPr>
+          <p:cNvPr id="10" name="Graphic 9" descr="Gold bars">
+            <a:extLst>
+              <a:ext uri="{FF2B5EF4-FFF2-40B4-BE49-F238E27FC236}">
+                <a16:creationId xmlns:a16="http://schemas.microsoft.com/office/drawing/2014/main" id="{D476480C-8BBA-4A04-B7B9-0DC4465AF58C}"/>
+              </a:ext>
+            </a:extLst>
+          </p:cNvPr>
+          <p:cNvPicPr>
+            <a:picLocks noChangeAspect="1"/>
+          </p:cNvPicPr>
+          <p:nvPr/>
+        </p:nvPicPr>
+        <p:blipFill>
+          <a:blip r:embed="rId4">
+            <a:extLst>
+              <a:ext uri="{28A0092B-C50C-407E-A947-70E740481C1C}">
+                <a14:useLocalDpi xmlns:a14="http://schemas.microsoft.com/office/drawing/2010/main" val="0"/>
+              </a:ext>
+              <a:ext uri="{96DAC541-7B7A-43D3-8B79-37D633B846F1}">
+                <asvg:svgBlip xmlns:asvg="http://schemas.microsoft.com/office/drawing/2016/SVG/main" r:embed="rId5"/>
+              </a:ext>
+            </a:extLst>
+          </a:blip>
+          <a:stretch>
+            <a:fillRect/>
+          </a:stretch>
+        </p:blipFill>
+        <p:spPr>
+          <a:xfrm>
+            <a:off x="5952847" y="4026763"/>
+            <a:ext cx="286305" cy="286305"/>
+          </a:xfrm>
+          <a:prstGeom prst="rect">
+            <a:avLst/>
+          </a:prstGeom>
+        </p:spPr>
+      </p:pic>
+      <p:pic>
+        <p:nvPicPr>
+          <p:cNvPr id="11" name="Graphic 10" descr="Gold bars">
+            <a:extLst>
+              <a:ext uri="{FF2B5EF4-FFF2-40B4-BE49-F238E27FC236}">
+                <a16:creationId xmlns:a16="http://schemas.microsoft.com/office/drawing/2014/main" id="{C25BE33C-9128-4E97-A1D7-AA2179C24F7D}"/>
+              </a:ext>
+            </a:extLst>
+          </p:cNvPr>
+          <p:cNvPicPr>
+            <a:picLocks noChangeAspect="1"/>
+          </p:cNvPicPr>
+          <p:nvPr/>
+        </p:nvPicPr>
+        <p:blipFill>
+          <a:blip r:embed="rId4">
+            <a:extLst>
+              <a:ext uri="{28A0092B-C50C-407E-A947-70E740481C1C}">
+                <a14:useLocalDpi xmlns:a14="http://schemas.microsoft.com/office/drawing/2010/main" val="0"/>
+              </a:ext>
+              <a:ext uri="{96DAC541-7B7A-43D3-8B79-37D633B846F1}">
+                <asvg:svgBlip xmlns:asvg="http://schemas.microsoft.com/office/drawing/2016/SVG/main" r:embed="rId5"/>
+              </a:ext>
+            </a:extLst>
+          </a:blip>
+          <a:stretch>
+            <a:fillRect/>
+          </a:stretch>
+        </p:blipFill>
+        <p:spPr>
+          <a:xfrm>
+            <a:off x="6673418" y="5297749"/>
+            <a:ext cx="286305" cy="286305"/>
+          </a:xfrm>
+          <a:prstGeom prst="rect">
+            <a:avLst/>
+          </a:prstGeom>
+        </p:spPr>
+      </p:pic>
+      <p:pic>
+        <p:nvPicPr>
+          <p:cNvPr id="12" name="Graphic 11" descr="Gold bars">
+            <a:extLst>
+              <a:ext uri="{FF2B5EF4-FFF2-40B4-BE49-F238E27FC236}">
+                <a16:creationId xmlns:a16="http://schemas.microsoft.com/office/drawing/2014/main" id="{18A99839-79E2-4E45-A21F-63E714C724BB}"/>
+              </a:ext>
+            </a:extLst>
+          </p:cNvPr>
+          <p:cNvPicPr>
+            <a:picLocks noChangeAspect="1"/>
+          </p:cNvPicPr>
+          <p:nvPr/>
+        </p:nvPicPr>
+        <p:blipFill>
+          <a:blip r:embed="rId4">
+            <a:extLst>
+              <a:ext uri="{28A0092B-C50C-407E-A947-70E740481C1C}">
+                <a14:useLocalDpi xmlns:a14="http://schemas.microsoft.com/office/drawing/2010/main" val="0"/>
+              </a:ext>
+              <a:ext uri="{96DAC541-7B7A-43D3-8B79-37D633B846F1}">
+                <asvg:svgBlip xmlns:asvg="http://schemas.microsoft.com/office/drawing/2016/SVG/main" r:embed="rId5"/>
+              </a:ext>
+            </a:extLst>
+          </a:blip>
+          <a:stretch>
+            <a:fillRect/>
+          </a:stretch>
+        </p:blipFill>
+        <p:spPr>
+          <a:xfrm>
+            <a:off x="4468305" y="2147656"/>
+            <a:ext cx="286305" cy="286305"/>
+          </a:xfrm>
+          <a:prstGeom prst="rect">
+            <a:avLst/>
+          </a:prstGeom>
+        </p:spPr>
+      </p:pic>
+      <p:pic>
+        <p:nvPicPr>
+          <p:cNvPr id="14" name="Graphic 13" descr="Robber">
+            <a:extLst>
+              <a:ext uri="{FF2B5EF4-FFF2-40B4-BE49-F238E27FC236}">
+                <a16:creationId xmlns:a16="http://schemas.microsoft.com/office/drawing/2014/main" id="{1C326312-C9AF-4772-A897-A39625883246}"/>
+              </a:ext>
+            </a:extLst>
+          </p:cNvPr>
+          <p:cNvPicPr>
+            <a:picLocks noChangeAspect="1"/>
+          </p:cNvPicPr>
+          <p:nvPr/>
+        </p:nvPicPr>
+        <p:blipFill>
+          <a:blip r:embed="rId6">
+            <a:extLst>
+              <a:ext uri="{28A0092B-C50C-407E-A947-70E740481C1C}">
+                <a14:useLocalDpi xmlns:a14="http://schemas.microsoft.com/office/drawing/2010/main" val="0"/>
+              </a:ext>
+              <a:ext uri="{96DAC541-7B7A-43D3-8B79-37D633B846F1}">
+                <asvg:svgBlip xmlns:asvg="http://schemas.microsoft.com/office/drawing/2016/SVG/main" r:embed="rId7"/>
+              </a:ext>
+            </a:extLst>
+          </a:blip>
+          <a:stretch>
+            <a:fillRect/>
+          </a:stretch>
+        </p:blipFill>
+        <p:spPr>
+          <a:xfrm>
+            <a:off x="2868967" y="4587536"/>
+            <a:ext cx="457200" cy="457200"/>
+          </a:xfrm>
+          <a:prstGeom prst="rect">
+            <a:avLst/>
+          </a:prstGeom>
+        </p:spPr>
+      </p:pic>
+      <p:pic>
+        <p:nvPicPr>
+          <p:cNvPr id="15" name="Graphic 14" descr="Robber">
+            <a:extLst>
+              <a:ext uri="{FF2B5EF4-FFF2-40B4-BE49-F238E27FC236}">
+                <a16:creationId xmlns:a16="http://schemas.microsoft.com/office/drawing/2014/main" id="{8EEB7EC0-12B8-4AD5-8C1A-EEE79CCD8DEB}"/>
+              </a:ext>
+            </a:extLst>
+          </p:cNvPr>
+          <p:cNvPicPr>
+            <a:picLocks noChangeAspect="1"/>
+          </p:cNvPicPr>
+          <p:nvPr/>
+        </p:nvPicPr>
+        <p:blipFill>
+          <a:blip r:embed="rId6">
+            <a:extLst>
+              <a:ext uri="{28A0092B-C50C-407E-A947-70E740481C1C}">
+                <a14:useLocalDpi xmlns:a14="http://schemas.microsoft.com/office/drawing/2010/main" val="0"/>
+              </a:ext>
+              <a:ext uri="{96DAC541-7B7A-43D3-8B79-37D633B846F1}">
+                <asvg:svgBlip xmlns:asvg="http://schemas.microsoft.com/office/drawing/2016/SVG/main" r:embed="rId8"/>
+              </a:ext>
+            </a:extLst>
+          </a:blip>
+          <a:stretch>
+            <a:fillRect/>
+          </a:stretch>
+        </p:blipFill>
+        <p:spPr>
+          <a:xfrm>
+            <a:off x="6587970" y="1445211"/>
+            <a:ext cx="457200" cy="457200"/>
+          </a:xfrm>
+          <a:prstGeom prst="rect">
+            <a:avLst/>
+          </a:prstGeom>
+        </p:spPr>
+      </p:pic>
+      <p:pic>
+        <p:nvPicPr>
+          <p:cNvPr id="17" name="Graphic 16" descr="Construction worker">
+            <a:extLst>
+              <a:ext uri="{FF2B5EF4-FFF2-40B4-BE49-F238E27FC236}">
+                <a16:creationId xmlns:a16="http://schemas.microsoft.com/office/drawing/2014/main" id="{13407DBC-507B-486C-B6B8-4AC64BF24D7C}"/>
+              </a:ext>
+            </a:extLst>
+          </p:cNvPr>
+          <p:cNvPicPr>
+            <a:picLocks noChangeAspect="1"/>
+          </p:cNvPicPr>
+          <p:nvPr/>
+        </p:nvPicPr>
+        <p:blipFill>
+          <a:blip r:embed="rId9">
+            <a:extLst>
+              <a:ext uri="{28A0092B-C50C-407E-A947-70E740481C1C}">
+                <a14:useLocalDpi xmlns:a14="http://schemas.microsoft.com/office/drawing/2010/main" val="0"/>
+              </a:ext>
+              <a:ext uri="{96DAC541-7B7A-43D3-8B79-37D633B846F1}">
+                <asvg:svgBlip xmlns:asvg="http://schemas.microsoft.com/office/drawing/2016/SVG/main" r:embed="rId10"/>
+              </a:ext>
+            </a:extLst>
+          </a:blip>
+          <a:stretch>
+            <a:fillRect/>
+          </a:stretch>
+        </p:blipFill>
+        <p:spPr>
+          <a:xfrm>
+            <a:off x="2213499" y="903119"/>
+            <a:ext cx="371753" cy="371753"/>
+          </a:xfrm>
+          <a:prstGeom prst="rect">
+            <a:avLst/>
+          </a:prstGeom>
+        </p:spPr>
+      </p:pic>
+      <p:pic>
+        <p:nvPicPr>
+          <p:cNvPr id="18" name="Graphic 17" descr="Construction worker">
+            <a:extLst>
+              <a:ext uri="{FF2B5EF4-FFF2-40B4-BE49-F238E27FC236}">
+                <a16:creationId xmlns:a16="http://schemas.microsoft.com/office/drawing/2014/main" id="{ECF47917-F07C-444E-A465-27000B631FF2}"/>
+              </a:ext>
+            </a:extLst>
+          </p:cNvPr>
+          <p:cNvPicPr>
+            <a:picLocks noChangeAspect="1"/>
+          </p:cNvPicPr>
+          <p:nvPr/>
+        </p:nvPicPr>
+        <p:blipFill>
+          <a:blip r:embed="rId9">
+            <a:extLst>
+              <a:ext uri="{28A0092B-C50C-407E-A947-70E740481C1C}">
+                <a14:useLocalDpi xmlns:a14="http://schemas.microsoft.com/office/drawing/2010/main" val="0"/>
+              </a:ext>
+              <a:ext uri="{96DAC541-7B7A-43D3-8B79-37D633B846F1}">
+                <asvg:svgBlip xmlns:asvg="http://schemas.microsoft.com/office/drawing/2016/SVG/main" r:embed="rId10"/>
+              </a:ext>
+            </a:extLst>
+          </a:blip>
+          <a:stretch>
+            <a:fillRect/>
+          </a:stretch>
+        </p:blipFill>
+        <p:spPr>
+          <a:xfrm>
+            <a:off x="3669437" y="3984038"/>
+            <a:ext cx="371753" cy="371753"/>
+          </a:xfrm>
+          <a:prstGeom prst="rect">
+            <a:avLst/>
+          </a:prstGeom>
+        </p:spPr>
+      </p:pic>
+      <p:sp>
+        <p:nvSpPr>
+          <p:cNvPr id="19" name="TextBox 18">
+            <a:extLst>
+              <a:ext uri="{FF2B5EF4-FFF2-40B4-BE49-F238E27FC236}">
+                <a16:creationId xmlns:a16="http://schemas.microsoft.com/office/drawing/2014/main" id="{ED353EC7-0B4D-4635-8159-A3F70959EAD7}"/>
+              </a:ext>
+            </a:extLst>
+          </p:cNvPr>
+          <p:cNvSpPr txBox="1"/>
+          <p:nvPr/>
+        </p:nvSpPr>
+        <p:spPr>
+          <a:xfrm>
+            <a:off x="8273496" y="759780"/>
+            <a:ext cx="3611237" cy="400110"/>
+          </a:xfrm>
+          <a:prstGeom prst="rect">
+            <a:avLst/>
+          </a:prstGeom>
+          <a:noFill/>
+        </p:spPr>
+        <p:txBody>
+          <a:bodyPr wrap="square" rtlCol="0">
+            <a:spAutoFit/>
+          </a:bodyPr>
+          <a:lstStyle/>
+          <a:p>
+            <a:r>
+              <a:rPr lang="en-US" sz="2000" b="1" dirty="0">
+                <a:latin typeface="Berlin Sans FB Demi" panose="020E0802020502020306" pitchFamily="34" charset="0"/>
+              </a:rPr>
+              <a:t>Gold Hunters</a:t>
+            </a:r>
+          </a:p>
+        </p:txBody>
+      </p:sp>
+      <p:pic>
+        <p:nvPicPr>
+          <p:cNvPr id="20" name="Graphic 19" descr="Construction worker">
+            <a:extLst>
+              <a:ext uri="{FF2B5EF4-FFF2-40B4-BE49-F238E27FC236}">
+                <a16:creationId xmlns:a16="http://schemas.microsoft.com/office/drawing/2014/main" id="{8385339E-E7F4-4CC6-A7D7-125A2CC7199E}"/>
+              </a:ext>
+            </a:extLst>
+          </p:cNvPr>
+          <p:cNvPicPr>
+            <a:picLocks noChangeAspect="1"/>
+          </p:cNvPicPr>
+          <p:nvPr/>
+        </p:nvPicPr>
+        <p:blipFill>
+          <a:blip r:embed="rId9">
+            <a:extLst>
+              <a:ext uri="{28A0092B-C50C-407E-A947-70E740481C1C}">
+                <a14:useLocalDpi xmlns:a14="http://schemas.microsoft.com/office/drawing/2010/main" val="0"/>
+              </a:ext>
+              <a:ext uri="{96DAC541-7B7A-43D3-8B79-37D633B846F1}">
+                <asvg:svgBlip xmlns:asvg="http://schemas.microsoft.com/office/drawing/2016/SVG/main" r:embed="rId10"/>
+              </a:ext>
+            </a:extLst>
+          </a:blip>
+          <a:stretch>
+            <a:fillRect/>
+          </a:stretch>
+        </p:blipFill>
+        <p:spPr>
+          <a:xfrm>
+            <a:off x="4611457" y="2147656"/>
+            <a:ext cx="371753" cy="371753"/>
+          </a:xfrm>
+          <a:prstGeom prst="rect">
+            <a:avLst/>
+          </a:prstGeom>
+        </p:spPr>
+      </p:pic>
+      <p:sp>
+        <p:nvSpPr>
+          <p:cNvPr id="21" name="Rectangle: Rounded Corners 20">
+            <a:extLst>
+              <a:ext uri="{FF2B5EF4-FFF2-40B4-BE49-F238E27FC236}">
+                <a16:creationId xmlns:a16="http://schemas.microsoft.com/office/drawing/2014/main" id="{2A1C8294-1DAD-4144-9057-3A7169E5BA7C}"/>
+              </a:ext>
+            </a:extLst>
+          </p:cNvPr>
+          <p:cNvSpPr/>
+          <p:nvPr/>
+        </p:nvSpPr>
+        <p:spPr>
+          <a:xfrm>
+            <a:off x="2112885" y="3925005"/>
+            <a:ext cx="2041865" cy="1757779"/>
+          </a:xfrm>
+          <a:prstGeom prst="roundRect">
+            <a:avLst/>
+          </a:prstGeom>
+          <a:solidFill>
+            <a:schemeClr val="accent1">
+              <a:alpha val="13000"/>
+            </a:schemeClr>
+          </a:solidFill>
+          <a:ln>
+            <a:solidFill>
+              <a:schemeClr val="accent5"/>
+            </a:solidFill>
+            <a:prstDash val="dash"/>
+          </a:ln>
+        </p:spPr>
+        <p:style>
+          <a:lnRef idx="2">
+            <a:schemeClr val="accent1">
+              <a:shade val="50000"/>
+            </a:schemeClr>
+          </a:lnRef>
+          <a:fillRef idx="1">
+            <a:schemeClr val="accent1"/>
+          </a:fillRef>
+          <a:effectRef idx="0">
+            <a:schemeClr val="accent1"/>
+          </a:effectRef>
+          <a:fontRef idx="minor">
+            <a:schemeClr val="lt1"/>
+          </a:fontRef>
+        </p:style>
+        <p:txBody>
+          <a:bodyPr rtlCol="0" anchor="ctr"/>
+          <a:lstStyle/>
+          <a:p>
+            <a:pPr algn="ctr"/>
+            <a:endParaRPr lang="en-US"/>
+          </a:p>
+        </p:txBody>
+      </p:sp>
+      <p:sp>
+        <p:nvSpPr>
+          <p:cNvPr id="25" name="Rectangle: Rounded Corners 24">
+            <a:extLst>
+              <a:ext uri="{FF2B5EF4-FFF2-40B4-BE49-F238E27FC236}">
+                <a16:creationId xmlns:a16="http://schemas.microsoft.com/office/drawing/2014/main" id="{DC77D5D1-3BB8-41B0-A3B0-30DA8DD895EE}"/>
+              </a:ext>
+            </a:extLst>
+          </p:cNvPr>
+          <p:cNvSpPr/>
+          <p:nvPr/>
+        </p:nvSpPr>
+        <p:spPr>
+          <a:xfrm>
+            <a:off x="1376120" y="144632"/>
+            <a:ext cx="2041865" cy="1757779"/>
+          </a:xfrm>
+          <a:prstGeom prst="roundRect">
+            <a:avLst/>
+          </a:prstGeom>
+          <a:solidFill>
+            <a:srgbClr val="C00000">
+              <a:alpha val="13000"/>
+            </a:srgbClr>
+          </a:solidFill>
+          <a:ln>
+            <a:solidFill>
+              <a:schemeClr val="accent5"/>
+            </a:solidFill>
+            <a:prstDash val="dash"/>
+          </a:ln>
+        </p:spPr>
+        <p:style>
+          <a:lnRef idx="2">
+            <a:schemeClr val="accent1">
+              <a:shade val="50000"/>
+            </a:schemeClr>
+          </a:lnRef>
+          <a:fillRef idx="1">
+            <a:schemeClr val="accent1"/>
+          </a:fillRef>
+          <a:effectRef idx="0">
+            <a:schemeClr val="accent1"/>
+          </a:effectRef>
+          <a:fontRef idx="minor">
+            <a:schemeClr val="lt1"/>
+          </a:fontRef>
+        </p:style>
+        <p:txBody>
+          <a:bodyPr rtlCol="0" anchor="ctr"/>
+          <a:lstStyle/>
+          <a:p>
+            <a:pPr algn="ctr"/>
+            <a:endParaRPr lang="en-US"/>
+          </a:p>
+        </p:txBody>
+      </p:sp>
+      <p:sp>
+        <p:nvSpPr>
+          <p:cNvPr id="26" name="Rectangle: Rounded Corners 25">
+            <a:extLst>
+              <a:ext uri="{FF2B5EF4-FFF2-40B4-BE49-F238E27FC236}">
+                <a16:creationId xmlns:a16="http://schemas.microsoft.com/office/drawing/2014/main" id="{6548A195-2DDB-4805-B493-613CF6BE285F}"/>
+              </a:ext>
+            </a:extLst>
+          </p:cNvPr>
+          <p:cNvSpPr/>
+          <p:nvPr/>
+        </p:nvSpPr>
+        <p:spPr>
+          <a:xfrm>
+            <a:off x="4249274" y="1992152"/>
+            <a:ext cx="693847" cy="597312"/>
+          </a:xfrm>
+          <a:prstGeom prst="roundRect">
+            <a:avLst/>
+          </a:prstGeom>
+          <a:solidFill>
+            <a:srgbClr val="C00000">
+              <a:alpha val="13000"/>
+            </a:srgbClr>
+          </a:solidFill>
+          <a:ln>
+            <a:solidFill>
+              <a:schemeClr val="accent5"/>
+            </a:solidFill>
+            <a:prstDash val="dash"/>
+          </a:ln>
+        </p:spPr>
+        <p:style>
+          <a:lnRef idx="2">
+            <a:schemeClr val="accent1">
+              <a:shade val="50000"/>
+            </a:schemeClr>
+          </a:lnRef>
+          <a:fillRef idx="1">
+            <a:schemeClr val="accent1"/>
+          </a:fillRef>
+          <a:effectRef idx="0">
+            <a:schemeClr val="accent1"/>
+          </a:effectRef>
+          <a:fontRef idx="minor">
+            <a:schemeClr val="lt1"/>
+          </a:fontRef>
+        </p:style>
+        <p:txBody>
+          <a:bodyPr rtlCol="0" anchor="ctr"/>
+          <a:lstStyle/>
+          <a:p>
+            <a:pPr algn="ctr"/>
+            <a:endParaRPr lang="en-US"/>
+          </a:p>
+        </p:txBody>
+      </p:sp>
+      <p:sp>
+        <p:nvSpPr>
+          <p:cNvPr id="27" name="Rectangle: Rounded Corners 26">
+            <a:extLst>
+              <a:ext uri="{FF2B5EF4-FFF2-40B4-BE49-F238E27FC236}">
+                <a16:creationId xmlns:a16="http://schemas.microsoft.com/office/drawing/2014/main" id="{D7A8E04A-B588-4568-A743-684DF05AD542}"/>
+              </a:ext>
+            </a:extLst>
+          </p:cNvPr>
+          <p:cNvSpPr/>
+          <p:nvPr/>
+        </p:nvSpPr>
+        <p:spPr>
+          <a:xfrm>
+            <a:off x="2868967" y="3300848"/>
+            <a:ext cx="2041865" cy="1757779"/>
+          </a:xfrm>
+          <a:prstGeom prst="roundRect">
+            <a:avLst/>
+          </a:prstGeom>
+          <a:solidFill>
+            <a:srgbClr val="C00000">
+              <a:alpha val="13000"/>
+            </a:srgbClr>
+          </a:solidFill>
+          <a:ln>
+            <a:solidFill>
+              <a:schemeClr val="accent5"/>
+            </a:solidFill>
+            <a:prstDash val="dash"/>
+          </a:ln>
+        </p:spPr>
+        <p:style>
+          <a:lnRef idx="2">
+            <a:schemeClr val="accent1">
+              <a:shade val="50000"/>
+            </a:schemeClr>
+          </a:lnRef>
+          <a:fillRef idx="1">
+            <a:schemeClr val="accent1"/>
+          </a:fillRef>
+          <a:effectRef idx="0">
+            <a:schemeClr val="accent1"/>
+          </a:effectRef>
+          <a:fontRef idx="minor">
+            <a:schemeClr val="lt1"/>
+          </a:fontRef>
+        </p:style>
+        <p:txBody>
+          <a:bodyPr rtlCol="0" anchor="ctr"/>
+          <a:lstStyle/>
+          <a:p>
+            <a:pPr algn="ctr"/>
+            <a:endParaRPr lang="en-US"/>
+          </a:p>
+        </p:txBody>
+      </p:sp>
+      <p:pic>
+        <p:nvPicPr>
+          <p:cNvPr id="28" name="Graphic 27" descr="Robber">
+            <a:extLst>
+              <a:ext uri="{FF2B5EF4-FFF2-40B4-BE49-F238E27FC236}">
+                <a16:creationId xmlns:a16="http://schemas.microsoft.com/office/drawing/2014/main" id="{A8563C7C-E9AD-4DC6-A29D-AF6D148527EB}"/>
+              </a:ext>
+            </a:extLst>
+          </p:cNvPr>
+          <p:cNvPicPr>
+            <a:picLocks noChangeAspect="1"/>
+          </p:cNvPicPr>
+          <p:nvPr/>
+        </p:nvPicPr>
+        <p:blipFill>
+          <a:blip r:embed="rId6">
+            <a:extLst>
+              <a:ext uri="{28A0092B-C50C-407E-A947-70E740481C1C}">
+                <a14:useLocalDpi xmlns:a14="http://schemas.microsoft.com/office/drawing/2010/main" val="0"/>
+              </a:ext>
+              <a:ext uri="{96DAC541-7B7A-43D3-8B79-37D633B846F1}">
+                <asvg:svgBlip xmlns:asvg="http://schemas.microsoft.com/office/drawing/2016/SVG/main" r:embed="rId8"/>
+              </a:ext>
+            </a:extLst>
+          </a:blip>
+          <a:stretch>
+            <a:fillRect/>
+          </a:stretch>
+        </p:blipFill>
+        <p:spPr>
+          <a:xfrm>
+            <a:off x="8320939" y="3526838"/>
+            <a:ext cx="457200" cy="457200"/>
+          </a:xfrm>
+          <a:prstGeom prst="rect">
+            <a:avLst/>
+          </a:prstGeom>
+        </p:spPr>
+      </p:pic>
+      <p:pic>
+        <p:nvPicPr>
+          <p:cNvPr id="29" name="Graphic 28" descr="Construction worker">
+            <a:extLst>
+              <a:ext uri="{FF2B5EF4-FFF2-40B4-BE49-F238E27FC236}">
+                <a16:creationId xmlns:a16="http://schemas.microsoft.com/office/drawing/2014/main" id="{696B7986-41B3-44C2-9FD7-0629A6C4563C}"/>
+              </a:ext>
+            </a:extLst>
+          </p:cNvPr>
+          <p:cNvPicPr>
+            <a:picLocks noChangeAspect="1"/>
+          </p:cNvPicPr>
+          <p:nvPr/>
+        </p:nvPicPr>
+        <p:blipFill>
+          <a:blip r:embed="rId9">
+            <a:extLst>
+              <a:ext uri="{28A0092B-C50C-407E-A947-70E740481C1C}">
+                <a14:useLocalDpi xmlns:a14="http://schemas.microsoft.com/office/drawing/2010/main" val="0"/>
+              </a:ext>
+              <a:ext uri="{96DAC541-7B7A-43D3-8B79-37D633B846F1}">
+                <asvg:svgBlip xmlns:asvg="http://schemas.microsoft.com/office/drawing/2016/SVG/main" r:embed="rId10"/>
+              </a:ext>
+            </a:extLst>
+          </a:blip>
+          <a:stretch>
+            <a:fillRect/>
+          </a:stretch>
+        </p:blipFill>
+        <p:spPr>
+          <a:xfrm>
+            <a:off x="8363663" y="3027217"/>
+            <a:ext cx="371753" cy="371753"/>
+          </a:xfrm>
+          <a:prstGeom prst="rect">
+            <a:avLst/>
+          </a:prstGeom>
+        </p:spPr>
+      </p:pic>
+      <p:sp>
+        <p:nvSpPr>
+          <p:cNvPr id="30" name="TextBox 29">
+            <a:extLst>
+              <a:ext uri="{FF2B5EF4-FFF2-40B4-BE49-F238E27FC236}">
+                <a16:creationId xmlns:a16="http://schemas.microsoft.com/office/drawing/2014/main" id="{6AEAA78D-64C0-4688-BDA5-A4D2E010F686}"/>
+              </a:ext>
+            </a:extLst>
+          </p:cNvPr>
+          <p:cNvSpPr txBox="1"/>
+          <p:nvPr/>
+        </p:nvSpPr>
+        <p:spPr>
+          <a:xfrm>
+            <a:off x="8959273" y="3027217"/>
+            <a:ext cx="1126836" cy="369332"/>
+          </a:xfrm>
+          <a:prstGeom prst="rect">
+            <a:avLst/>
+          </a:prstGeom>
+          <a:noFill/>
+        </p:spPr>
+        <p:txBody>
+          <a:bodyPr wrap="square" rtlCol="0">
+            <a:spAutoFit/>
+          </a:bodyPr>
+          <a:lstStyle/>
+          <a:p>
+            <a:r>
+              <a:rPr lang="en-US" dirty="0"/>
+              <a:t>Diggers</a:t>
+            </a:r>
+          </a:p>
+        </p:txBody>
+      </p:sp>
+      <p:sp>
+        <p:nvSpPr>
+          <p:cNvPr id="31" name="TextBox 30">
+            <a:extLst>
+              <a:ext uri="{FF2B5EF4-FFF2-40B4-BE49-F238E27FC236}">
+                <a16:creationId xmlns:a16="http://schemas.microsoft.com/office/drawing/2014/main" id="{46065960-76A0-4AC6-B4B4-2369BD71B7AF}"/>
+              </a:ext>
+            </a:extLst>
+          </p:cNvPr>
+          <p:cNvSpPr txBox="1"/>
+          <p:nvPr/>
+        </p:nvSpPr>
+        <p:spPr>
+          <a:xfrm>
+            <a:off x="8952279" y="3614706"/>
+            <a:ext cx="1126836" cy="369332"/>
+          </a:xfrm>
+          <a:prstGeom prst="rect">
+            <a:avLst/>
+          </a:prstGeom>
+          <a:noFill/>
+        </p:spPr>
+        <p:txBody>
+          <a:bodyPr wrap="square" rtlCol="0">
+            <a:spAutoFit/>
+          </a:bodyPr>
+          <a:lstStyle/>
+          <a:p>
+            <a:r>
+              <a:rPr lang="en-US" dirty="0"/>
+              <a:t>Robbers</a:t>
+            </a:r>
+          </a:p>
+        </p:txBody>
+      </p:sp>
+      <p:pic>
+        <p:nvPicPr>
+          <p:cNvPr id="32" name="Graphic 31" descr="Robber">
+            <a:extLst>
+              <a:ext uri="{FF2B5EF4-FFF2-40B4-BE49-F238E27FC236}">
+                <a16:creationId xmlns:a16="http://schemas.microsoft.com/office/drawing/2014/main" id="{C4764B2A-981F-4A3E-A1F2-3B584AA64BF6}"/>
+              </a:ext>
+            </a:extLst>
+          </p:cNvPr>
+          <p:cNvPicPr>
+            <a:picLocks noChangeAspect="1"/>
+          </p:cNvPicPr>
+          <p:nvPr/>
+        </p:nvPicPr>
+        <p:blipFill>
+          <a:blip r:embed="rId6">
+            <a:extLst>
+              <a:ext uri="{28A0092B-C50C-407E-A947-70E740481C1C}">
+                <a14:useLocalDpi xmlns:a14="http://schemas.microsoft.com/office/drawing/2010/main" val="0"/>
+              </a:ext>
+              <a:ext uri="{96DAC541-7B7A-43D3-8B79-37D633B846F1}">
+                <asvg:svgBlip xmlns:asvg="http://schemas.microsoft.com/office/drawing/2016/SVG/main" r:embed="rId8"/>
+              </a:ext>
+            </a:extLst>
+          </a:blip>
+          <a:stretch>
+            <a:fillRect/>
+          </a:stretch>
+        </p:blipFill>
+        <p:spPr>
+          <a:xfrm>
+            <a:off x="5838418" y="2028648"/>
+            <a:ext cx="457200" cy="457200"/>
+          </a:xfrm>
+          <a:prstGeom prst="rect">
+            <a:avLst/>
+          </a:prstGeom>
+        </p:spPr>
+      </p:pic>
+      <p:cxnSp>
+        <p:nvCxnSpPr>
+          <p:cNvPr id="3" name="Straight Arrow Connector 2">
+            <a:extLst>
+              <a:ext uri="{FF2B5EF4-FFF2-40B4-BE49-F238E27FC236}">
+                <a16:creationId xmlns:a16="http://schemas.microsoft.com/office/drawing/2014/main" id="{4409FEBB-F267-4C4F-BE15-7F1B2C6E7CC3}"/>
+              </a:ext>
+            </a:extLst>
+          </p:cNvPr>
+          <p:cNvCxnSpPr>
+            <a:stCxn id="32" idx="2"/>
+          </p:cNvCxnSpPr>
+          <p:nvPr/>
+        </p:nvCxnSpPr>
+        <p:spPr>
+          <a:xfrm flipH="1">
+            <a:off x="5317724" y="2485848"/>
+            <a:ext cx="749294" cy="541369"/>
+          </a:xfrm>
+          <a:prstGeom prst="straightConnector1">
+            <a:avLst/>
+          </a:prstGeom>
+          <a:ln>
+            <a:tailEnd type="triangle"/>
+          </a:ln>
+        </p:spPr>
+        <p:style>
+          <a:lnRef idx="1">
+            <a:schemeClr val="accent1"/>
+          </a:lnRef>
+          <a:fillRef idx="0">
+            <a:schemeClr val="accent1"/>
+          </a:fillRef>
+          <a:effectRef idx="0">
+            <a:schemeClr val="accent1"/>
+          </a:effectRef>
+          <a:fontRef idx="minor">
+            <a:schemeClr val="tx1"/>
+          </a:fontRef>
+        </p:style>
+      </p:cxnSp>
+      <p:sp>
+        <p:nvSpPr>
+          <p:cNvPr id="5" name="TextBox 4">
+            <a:extLst>
+              <a:ext uri="{FF2B5EF4-FFF2-40B4-BE49-F238E27FC236}">
+                <a16:creationId xmlns:a16="http://schemas.microsoft.com/office/drawing/2014/main" id="{A5F0FB71-8344-4550-85CF-686BF33E8A34}"/>
+              </a:ext>
+            </a:extLst>
+          </p:cNvPr>
+          <p:cNvSpPr txBox="1"/>
+          <p:nvPr/>
+        </p:nvSpPr>
+        <p:spPr>
+          <a:xfrm>
+            <a:off x="1526959" y="5682784"/>
+            <a:ext cx="686540" cy="369332"/>
+          </a:xfrm>
+          <a:prstGeom prst="rect">
+            <a:avLst/>
+          </a:prstGeom>
+          <a:noFill/>
+        </p:spPr>
+        <p:txBody>
+          <a:bodyPr wrap="square" rtlCol="0">
+            <a:spAutoFit/>
+          </a:bodyPr>
+          <a:lstStyle/>
+          <a:p>
+            <a:r>
+              <a:rPr lang="en-US" dirty="0"/>
+              <a:t>0, 0</a:t>
+            </a:r>
+          </a:p>
+        </p:txBody>
+      </p:sp>
+      <p:sp>
+        <p:nvSpPr>
+          <p:cNvPr id="34" name="TextBox 33">
+            <a:extLst>
+              <a:ext uri="{FF2B5EF4-FFF2-40B4-BE49-F238E27FC236}">
+                <a16:creationId xmlns:a16="http://schemas.microsoft.com/office/drawing/2014/main" id="{61F9BE80-3941-44CD-B7B1-547911BC382D}"/>
+              </a:ext>
+            </a:extLst>
+          </p:cNvPr>
+          <p:cNvSpPr txBox="1"/>
+          <p:nvPr/>
+        </p:nvSpPr>
+        <p:spPr>
+          <a:xfrm>
+            <a:off x="7045170" y="267876"/>
+            <a:ext cx="686540" cy="369332"/>
+          </a:xfrm>
+          <a:prstGeom prst="rect">
+            <a:avLst/>
+          </a:prstGeom>
+          <a:noFill/>
+        </p:spPr>
+        <p:txBody>
+          <a:bodyPr wrap="square" rtlCol="0">
+            <a:spAutoFit/>
+          </a:bodyPr>
+          <a:lstStyle/>
+          <a:p>
+            <a:r>
+              <a:rPr lang="en-US" dirty="0"/>
+              <a:t>N, m</a:t>
+            </a:r>
+          </a:p>
+        </p:txBody>
+      </p:sp>
+    </p:spTree>
+    <p:extLst>
+      <p:ext uri="{BB962C8B-B14F-4D97-AF65-F5344CB8AC3E}">
+        <p14:creationId xmlns:p14="http://schemas.microsoft.com/office/powerpoint/2010/main" val="2164477557"/>
+      </p:ext>
+    </p:extLst>
+  </p:cSld>
+  <p:clrMapOvr>
+    <a:masterClrMapping/>
+  </p:clrMapOvr>
+</p:sld>
+</file>
+
+<file path=ppt/slides/slide9.xml><?xml version="1.0" encoding="utf-8"?>
+<p:sld xmlns:a="http://schemas.openxmlformats.org/drawingml/2006/main" xmlns:r="http://schemas.openxmlformats.org/officeDocument/2006/relationships" xmlns:p="http://schemas.openxmlformats.org/presentationml/2006/main">
+  <p:cSld>
+    <p:spTree>
+      <p:nvGrpSpPr>
+        <p:cNvPr id="1" name=""/>
+        <p:cNvGrpSpPr/>
+        <p:nvPr/>
+      </p:nvGrpSpPr>
+      <p:grpSpPr>
+        <a:xfrm>
+          <a:off x="0" y="0"/>
+          <a:ext cx="0" cy="0"/>
+          <a:chOff x="0" y="0"/>
+          <a:chExt cx="0" cy="0"/>
+        </a:xfrm>
+      </p:grpSpPr>
       <p:sp>
         <p:nvSpPr>
           <p:cNvPr id="2" name="Title 1">
@@ -9871,106 +11650,6 @@
     <p:extLst>
       <p:ext uri="{BB962C8B-B14F-4D97-AF65-F5344CB8AC3E}">
         <p14:creationId xmlns:p14="http://schemas.microsoft.com/office/powerpoint/2010/main" val="1848345511"/>
-      </p:ext>
-    </p:extLst>
-  </p:cSld>
-  <p:clrMapOvr>
-    <a:masterClrMapping/>
-  </p:clrMapOvr>
-</p:sld>
-</file>
-
-<file path=ppt/slides/slide9.xml><?xml version="1.0" encoding="utf-8"?>
-<p:sld xmlns:a="http://schemas.openxmlformats.org/drawingml/2006/main" xmlns:r="http://schemas.openxmlformats.org/officeDocument/2006/relationships" xmlns:p="http://schemas.openxmlformats.org/presentationml/2006/main">
-  <p:cSld>
-    <p:spTree>
-      <p:nvGrpSpPr>
-        <p:cNvPr id="1" name=""/>
-        <p:cNvGrpSpPr/>
-        <p:nvPr/>
-      </p:nvGrpSpPr>
-      <p:grpSpPr>
-        <a:xfrm>
-          <a:off x="0" y="0"/>
-          <a:ext cx="0" cy="0"/>
-          <a:chOff x="0" y="0"/>
-          <a:chExt cx="0" cy="0"/>
-        </a:xfrm>
-      </p:grpSpPr>
-      <p:sp>
-        <p:nvSpPr>
-          <p:cNvPr id="2" name="Title 1">
-            <a:extLst>
-              <a:ext uri="{FF2B5EF4-FFF2-40B4-BE49-F238E27FC236}">
-                <a16:creationId xmlns:a16="http://schemas.microsoft.com/office/drawing/2014/main" id="{9FE12167-031B-4758-8BB8-AA2ECB02E181}"/>
-              </a:ext>
-            </a:extLst>
-          </p:cNvPr>
-          <p:cNvSpPr>
-            <a:spLocks noGrp="1"/>
-          </p:cNvSpPr>
-          <p:nvPr>
-            <p:ph type="title"/>
-          </p:nvPr>
-        </p:nvSpPr>
-        <p:spPr/>
-        <p:txBody>
-          <a:bodyPr/>
-          <a:lstStyle/>
-          <a:p>
-            <a:r>
-              <a:rPr lang="en-US" dirty="0"/>
-              <a:t>Object locations</a:t>
-            </a:r>
-          </a:p>
-        </p:txBody>
-      </p:sp>
-      <p:sp>
-        <p:nvSpPr>
-          <p:cNvPr id="3" name="Content Placeholder 2">
-            <a:extLst>
-              <a:ext uri="{FF2B5EF4-FFF2-40B4-BE49-F238E27FC236}">
-                <a16:creationId xmlns:a16="http://schemas.microsoft.com/office/drawing/2014/main" id="{0E50C394-A9AD-459C-B2A3-D8789970D140}"/>
-              </a:ext>
-            </a:extLst>
-          </p:cNvPr>
-          <p:cNvSpPr>
-            <a:spLocks noGrp="1"/>
-          </p:cNvSpPr>
-          <p:nvPr>
-            <p:ph idx="1"/>
-          </p:nvPr>
-        </p:nvSpPr>
-        <p:spPr/>
-        <p:txBody>
-          <a:bodyPr/>
-          <a:lstStyle/>
-          <a:p>
-            <a:r>
-              <a:rPr lang="en-US" dirty="0"/>
-              <a:t>In each agent or resource, we will have a position property. But how will the game know about object positions? If we have iterate through the positions </a:t>
-            </a:r>
-            <a:r>
-              <a:rPr lang="en-US" dirty="0" err="1"/>
-              <a:t>everytime</a:t>
-            </a:r>
-            <a:r>
-              <a:rPr lang="en-US" dirty="0"/>
-              <a:t> we need it, it would be very slow. Can we raise an event if the position is changed in an object? A pub-sub architecture.</a:t>
-            </a:r>
-          </a:p>
-          <a:p>
-            <a:r>
-              <a:rPr lang="en-US" dirty="0"/>
-              <a:t>We cannot use reactive programming as we don’t have control over event synchronization. We can use async programming to create coroutines and wait for all the tasks in a turn to be completed.</a:t>
-            </a:r>
-          </a:p>
-        </p:txBody>
-      </p:sp>
-    </p:spTree>
-    <p:extLst>
-      <p:ext uri="{BB962C8B-B14F-4D97-AF65-F5344CB8AC3E}">
-        <p14:creationId xmlns:p14="http://schemas.microsoft.com/office/powerpoint/2010/main" val="1241753297"/>
       </p:ext>
     </p:extLst>
   </p:cSld>

</xml_diff>